<commit_message>
Project - Presentation pre offer review
</commit_message>
<xml_diff>
--- a/project/presentation.pptx
+++ b/project/presentation.pptx
@@ -5,7 +5,7 @@
     <p:sldMasterId id="2147483987" r:id="rId1"/>
   </p:sldMasterIdLst>
   <p:notesMasterIdLst>
-    <p:notesMasterId r:id="rId45"/>
+    <p:notesMasterId r:id="rId46"/>
   </p:notesMasterIdLst>
   <p:sldIdLst>
     <p:sldId id="256" r:id="rId2"/>
@@ -21,36 +21,37 @@
     <p:sldId id="260" r:id="rId12"/>
     <p:sldId id="268" r:id="rId13"/>
     <p:sldId id="278" r:id="rId14"/>
-    <p:sldId id="270" r:id="rId15"/>
-    <p:sldId id="289" r:id="rId16"/>
-    <p:sldId id="290" r:id="rId17"/>
-    <p:sldId id="291" r:id="rId18"/>
-    <p:sldId id="292" r:id="rId19"/>
-    <p:sldId id="293" r:id="rId20"/>
-    <p:sldId id="294" r:id="rId21"/>
-    <p:sldId id="295" r:id="rId22"/>
-    <p:sldId id="261" r:id="rId23"/>
-    <p:sldId id="271" r:id="rId24"/>
-    <p:sldId id="272" r:id="rId25"/>
-    <p:sldId id="279" r:id="rId26"/>
-    <p:sldId id="296" r:id="rId27"/>
-    <p:sldId id="297" r:id="rId28"/>
-    <p:sldId id="280" r:id="rId29"/>
-    <p:sldId id="273" r:id="rId30"/>
-    <p:sldId id="262" r:id="rId31"/>
-    <p:sldId id="281" r:id="rId32"/>
-    <p:sldId id="274" r:id="rId33"/>
-    <p:sldId id="276" r:id="rId34"/>
-    <p:sldId id="304" r:id="rId35"/>
-    <p:sldId id="298" r:id="rId36"/>
-    <p:sldId id="299" r:id="rId37"/>
-    <p:sldId id="300" r:id="rId38"/>
-    <p:sldId id="301" r:id="rId39"/>
-    <p:sldId id="302" r:id="rId40"/>
-    <p:sldId id="303" r:id="rId41"/>
-    <p:sldId id="305" r:id="rId42"/>
-    <p:sldId id="306" r:id="rId43"/>
-    <p:sldId id="263" r:id="rId44"/>
+    <p:sldId id="307" r:id="rId15"/>
+    <p:sldId id="308" r:id="rId16"/>
+    <p:sldId id="270" r:id="rId17"/>
+    <p:sldId id="289" r:id="rId18"/>
+    <p:sldId id="290" r:id="rId19"/>
+    <p:sldId id="291" r:id="rId20"/>
+    <p:sldId id="292" r:id="rId21"/>
+    <p:sldId id="293" r:id="rId22"/>
+    <p:sldId id="294" r:id="rId23"/>
+    <p:sldId id="295" r:id="rId24"/>
+    <p:sldId id="261" r:id="rId25"/>
+    <p:sldId id="271" r:id="rId26"/>
+    <p:sldId id="272" r:id="rId27"/>
+    <p:sldId id="279" r:id="rId28"/>
+    <p:sldId id="296" r:id="rId29"/>
+    <p:sldId id="297" r:id="rId30"/>
+    <p:sldId id="280" r:id="rId31"/>
+    <p:sldId id="273" r:id="rId32"/>
+    <p:sldId id="262" r:id="rId33"/>
+    <p:sldId id="281" r:id="rId34"/>
+    <p:sldId id="274" r:id="rId35"/>
+    <p:sldId id="304" r:id="rId36"/>
+    <p:sldId id="298" r:id="rId37"/>
+    <p:sldId id="299" r:id="rId38"/>
+    <p:sldId id="300" r:id="rId39"/>
+    <p:sldId id="301" r:id="rId40"/>
+    <p:sldId id="302" r:id="rId41"/>
+    <p:sldId id="303" r:id="rId42"/>
+    <p:sldId id="305" r:id="rId43"/>
+    <p:sldId id="306" r:id="rId44"/>
+    <p:sldId id="263" r:id="rId45"/>
   </p:sldIdLst>
   <p:sldSz cx="12192000" cy="6858000"/>
   <p:notesSz cx="6858000" cy="9144000"/>
@@ -167,6 +168,8 @@
             <p14:sldId id="260"/>
             <p14:sldId id="268"/>
             <p14:sldId id="278"/>
+            <p14:sldId id="307"/>
+            <p14:sldId id="308"/>
             <p14:sldId id="270"/>
             <p14:sldId id="289"/>
             <p14:sldId id="290"/>
@@ -186,7 +189,6 @@
             <p14:sldId id="262"/>
             <p14:sldId id="281"/>
             <p14:sldId id="274"/>
-            <p14:sldId id="276"/>
             <p14:sldId id="304"/>
             <p14:sldId id="298"/>
             <p14:sldId id="299"/>
@@ -5514,7 +5516,11 @@
             </a:pPr>
             <a:r>
               <a:rPr lang="he-IL" dirty="0" smtClean="0"/>
-              <a:t>תיאור אלגוריתם ואופן פעולה.</a:t>
+              <a:t>תיאור אלגוריתם ואופן פעולה</a:t>
+            </a:r>
+            <a:r>
+              <a:rPr lang="he-IL" dirty="0" smtClean="0"/>
+              <a:t>.</a:t>
             </a:r>
           </a:p>
           <a:p>
@@ -5523,9 +5529,14 @@
               <a:buChar char="•"/>
             </a:pPr>
             <a:r>
-              <a:rPr lang="he-IL" dirty="0" smtClean="0"/>
-              <a:t>הוכחת היתכנות.</a:t>
-            </a:r>
+              <a:rPr lang="en-US" dirty="0" err="1" smtClean="0"/>
+              <a:t>Kmeans</a:t>
+            </a:r>
+            <a:r>
+              <a:rPr lang="en-US" dirty="0" smtClean="0"/>
+              <a:t>++</a:t>
+            </a:r>
+            <a:endParaRPr lang="he-IL" dirty="0" smtClean="0"/>
           </a:p>
           <a:p>
             <a:pPr algn="r">
@@ -5610,8 +5621,8 @@
           </a:p>
         </p:txBody>
       </p:sp>
-      <mc:AlternateContent xmlns:mc="http://schemas.openxmlformats.org/markup-compatibility/2006">
-        <mc:Choice xmlns:a14="http://schemas.microsoft.com/office/drawing/2010/main" Requires="a14">
+      <mc:AlternateContent xmlns:mc="http://schemas.openxmlformats.org/markup-compatibility/2006" xmlns:a14="http://schemas.microsoft.com/office/drawing/2010/main">
+        <mc:Choice Requires="a14">
           <p:sp>
             <p:nvSpPr>
               <p:cNvPr id="3" name="מציין מיקום תוכן 2"/>
@@ -6157,7 +6168,7 @@
             </p:txBody>
           </p:sp>
         </mc:Choice>
-        <mc:Fallback>
+        <mc:Fallback xmlns="">
           <p:sp>
             <p:nvSpPr>
               <p:cNvPr id="3" name="מציין מיקום תוכן 2"/>
@@ -6389,8 +6400,12 @@
           <a:p>
             <a:pPr algn="r"/>
             <a:r>
-              <a:rPr lang="he-IL" dirty="0" smtClean="0"/>
-              <a:t>דוגמת ריצה	</a:t>
+              <a:rPr lang="en-US" dirty="0" err="1" smtClean="0"/>
+              <a:t>Kmeans</a:t>
+            </a:r>
+            <a:r>
+              <a:rPr lang="en-US" dirty="0" smtClean="0"/>
+              <a:t>++</a:t>
             </a:r>
             <a:endParaRPr lang="he-IL" dirty="0"/>
           </a:p>
@@ -6411,6 +6426,405 @@
           <a:bodyPr/>
           <a:lstStyle/>
           <a:p>
+            <a:r>
+              <a:rPr lang="he-IL" dirty="0" smtClean="0"/>
+              <a:t>מה יקרה אם נגריל מרכזים קרובים?</a:t>
+            </a:r>
+          </a:p>
+          <a:p>
+            <a:r>
+              <a:rPr lang="he-IL" dirty="0" smtClean="0"/>
+              <a:t>מה יקרה אם נגריל מרכזים רחוקים?</a:t>
+            </a:r>
+            <a:endParaRPr lang="he-IL" dirty="0"/>
+          </a:p>
+          <a:p>
+            <a:r>
+              <a:rPr lang="he-IL" dirty="0" smtClean="0"/>
+              <a:t>להגרלת המרכזים הראשונה, יש מרכיב חשוב מאוד בזמן התכנסות האלגוריתם ובדיוקו.</a:t>
+            </a:r>
+          </a:p>
+          <a:p>
+            <a:r>
+              <a:rPr lang="he-IL" dirty="0" smtClean="0"/>
+              <a:t>על כן נשתמש באלגוריתם </a:t>
+            </a:r>
+            <a:r>
+              <a:rPr lang="en-US" dirty="0" err="1" smtClean="0"/>
+              <a:t>Kmeans</a:t>
+            </a:r>
+            <a:r>
+              <a:rPr lang="en-US" dirty="0" smtClean="0"/>
+              <a:t>++</a:t>
+            </a:r>
+            <a:r>
+              <a:rPr lang="he-IL" dirty="0" smtClean="0"/>
+              <a:t> אשר המרכזים נבחרים בו בצורה הבאה:</a:t>
+            </a:r>
+            <a:endParaRPr lang="he-IL" dirty="0"/>
+          </a:p>
+          <a:p>
+            <a:pPr marL="457200" indent="-457200">
+              <a:buFont typeface="+mj-lt"/>
+              <a:buAutoNum type="arabicPeriod"/>
+            </a:pPr>
+            <a:r>
+              <a:rPr lang="he-IL" dirty="0" smtClean="0"/>
+              <a:t>בחר מרכז.</a:t>
+            </a:r>
+          </a:p>
+          <a:p>
+            <a:pPr marL="457200" indent="-457200">
+              <a:buFont typeface="+mj-lt"/>
+              <a:buAutoNum type="arabicPeriod"/>
+            </a:pPr>
+            <a:r>
+              <a:rPr lang="he-IL" dirty="0" smtClean="0"/>
+              <a:t>משקל את שאר האובייקטים לפי מרחקם מהמרכזים שנבחרו.</a:t>
+            </a:r>
+          </a:p>
+          <a:p>
+            <a:pPr marL="457200" indent="-457200">
+              <a:buFont typeface="+mj-lt"/>
+              <a:buAutoNum type="arabicPeriod"/>
+            </a:pPr>
+            <a:r>
+              <a:rPr lang="he-IL" dirty="0" smtClean="0"/>
+              <a:t>בחר מרכז נוסף באופן הסתברותי לפי המשקל, משקל גבוה יותר הסתברות גבוהה יותר.</a:t>
+            </a:r>
+          </a:p>
+          <a:p>
+            <a:pPr marL="457200" indent="-457200">
+              <a:buFont typeface="+mj-lt"/>
+              <a:buAutoNum type="arabicPeriod"/>
+            </a:pPr>
+            <a:r>
+              <a:rPr lang="he-IL" dirty="0" smtClean="0"/>
+              <a:t>חזור על 2-3 </a:t>
+            </a:r>
+            <a:r>
+              <a:rPr lang="en-US" dirty="0" smtClean="0"/>
+              <a:t>K</a:t>
+            </a:r>
+            <a:r>
+              <a:rPr lang="he-IL" dirty="0" smtClean="0"/>
+              <a:t> פעמים.</a:t>
+            </a:r>
+          </a:p>
+          <a:p>
+            <a:pPr marL="457200" indent="-457200">
+              <a:buFont typeface="+mj-lt"/>
+              <a:buAutoNum type="arabicPeriod"/>
+            </a:pPr>
+            <a:endParaRPr lang="he-IL" dirty="0" smtClean="0"/>
+          </a:p>
+        </p:txBody>
+      </p:sp>
+    </p:spTree>
+    <p:extLst>
+      <p:ext uri="{BB962C8B-B14F-4D97-AF65-F5344CB8AC3E}">
+        <p14:creationId xmlns:p14="http://schemas.microsoft.com/office/powerpoint/2010/main" val="1124470066"/>
+      </p:ext>
+    </p:extLst>
+  </p:cSld>
+  <p:clrMapOvr>
+    <a:masterClrMapping/>
+  </p:clrMapOvr>
+  <p:timing>
+    <p:tnLst>
+      <p:par>
+        <p:cTn id="1" dur="indefinite" restart="never" nodeType="tmRoot"/>
+      </p:par>
+    </p:tnLst>
+  </p:timing>
+</p:sld>
+</file>
+
+<file path=ppt/slides/slide15.xml><?xml version="1.0" encoding="utf-8"?>
+<p:sld xmlns:a="http://schemas.openxmlformats.org/drawingml/2006/main" xmlns:r="http://schemas.openxmlformats.org/officeDocument/2006/relationships" xmlns:p="http://schemas.openxmlformats.org/presentationml/2006/main">
+  <p:cSld>
+    <p:spTree>
+      <p:nvGrpSpPr>
+        <p:cNvPr id="1" name=""/>
+        <p:cNvGrpSpPr/>
+        <p:nvPr/>
+      </p:nvGrpSpPr>
+      <p:grpSpPr>
+        <a:xfrm>
+          <a:off x="0" y="0"/>
+          <a:ext cx="0" cy="0"/>
+          <a:chOff x="0" y="0"/>
+          <a:chExt cx="0" cy="0"/>
+        </a:xfrm>
+      </p:grpSpPr>
+      <p:pic>
+        <p:nvPicPr>
+          <p:cNvPr id="2" name="תמונה 1"/>
+          <p:cNvPicPr>
+            <a:picLocks noChangeAspect="1"/>
+          </p:cNvPicPr>
+          <p:nvPr/>
+        </p:nvPicPr>
+        <p:blipFill>
+          <a:blip r:embed="rId2">
+            <a:extLst>
+              <a:ext uri="{28A0092B-C50C-407E-A947-70E740481C1C}">
+                <a14:useLocalDpi xmlns:a14="http://schemas.microsoft.com/office/drawing/2010/main" val="0"/>
+              </a:ext>
+            </a:extLst>
+          </a:blip>
+          <a:stretch>
+            <a:fillRect/>
+          </a:stretch>
+        </p:blipFill>
+        <p:spPr>
+          <a:xfrm>
+            <a:off x="6017623" y="1277977"/>
+            <a:ext cx="5852172" cy="4389129"/>
+          </a:xfrm>
+          <a:prstGeom prst="rect">
+            <a:avLst/>
+          </a:prstGeom>
+        </p:spPr>
+      </p:pic>
+      <p:pic>
+        <p:nvPicPr>
+          <p:cNvPr id="3" name="תמונה 2"/>
+          <p:cNvPicPr>
+            <a:picLocks noChangeAspect="1"/>
+          </p:cNvPicPr>
+          <p:nvPr/>
+        </p:nvPicPr>
+        <p:blipFill>
+          <a:blip r:embed="rId3">
+            <a:extLst>
+              <a:ext uri="{28A0092B-C50C-407E-A947-70E740481C1C}">
+                <a14:useLocalDpi xmlns:a14="http://schemas.microsoft.com/office/drawing/2010/main" val="0"/>
+              </a:ext>
+            </a:extLst>
+          </a:blip>
+          <a:stretch>
+            <a:fillRect/>
+          </a:stretch>
+        </p:blipFill>
+        <p:spPr>
+          <a:xfrm>
+            <a:off x="165451" y="1277978"/>
+            <a:ext cx="5852172" cy="4389129"/>
+          </a:xfrm>
+          <a:prstGeom prst="rect">
+            <a:avLst/>
+          </a:prstGeom>
+        </p:spPr>
+      </p:pic>
+      <p:sp>
+        <p:nvSpPr>
+          <p:cNvPr id="4" name="TextBox 3"/>
+          <p:cNvSpPr txBox="1"/>
+          <p:nvPr/>
+        </p:nvSpPr>
+        <p:spPr>
+          <a:xfrm>
+            <a:off x="2519874" y="1277977"/>
+            <a:ext cx="1143326" cy="369332"/>
+          </a:xfrm>
+          <a:prstGeom prst="rect">
+            <a:avLst/>
+          </a:prstGeom>
+          <a:noFill/>
+        </p:spPr>
+        <p:txBody>
+          <a:bodyPr wrap="none" rtlCol="1">
+            <a:spAutoFit/>
+          </a:bodyPr>
+          <a:lstStyle/>
+          <a:p>
+            <a:r>
+              <a:rPr lang="en-US" dirty="0" err="1" smtClean="0"/>
+              <a:t>kmeans</a:t>
+            </a:r>
+            <a:r>
+              <a:rPr lang="en-US" dirty="0" smtClean="0"/>
+              <a:t>++</a:t>
+            </a:r>
+            <a:endParaRPr lang="he-IL" dirty="0"/>
+          </a:p>
+        </p:txBody>
+      </p:sp>
+      <p:sp>
+        <p:nvSpPr>
+          <p:cNvPr id="5" name="TextBox 4"/>
+          <p:cNvSpPr txBox="1"/>
+          <p:nvPr/>
+        </p:nvSpPr>
+        <p:spPr>
+          <a:xfrm>
+            <a:off x="8488295" y="1277976"/>
+            <a:ext cx="910827" cy="369332"/>
+          </a:xfrm>
+          <a:prstGeom prst="rect">
+            <a:avLst/>
+          </a:prstGeom>
+          <a:noFill/>
+        </p:spPr>
+        <p:txBody>
+          <a:bodyPr wrap="none" rtlCol="1">
+            <a:spAutoFit/>
+          </a:bodyPr>
+          <a:lstStyle/>
+          <a:p>
+            <a:r>
+              <a:rPr lang="en-US" dirty="0" err="1" smtClean="0"/>
+              <a:t>kmeans</a:t>
+            </a:r>
+            <a:endParaRPr lang="he-IL" dirty="0"/>
+          </a:p>
+        </p:txBody>
+      </p:sp>
+      <p:sp>
+        <p:nvSpPr>
+          <p:cNvPr id="6" name="כותרת 1"/>
+          <p:cNvSpPr txBox="1">
+            <a:spLocks/>
+          </p:cNvSpPr>
+          <p:nvPr/>
+        </p:nvSpPr>
+        <p:spPr>
+          <a:xfrm>
+            <a:off x="1097280" y="286603"/>
+            <a:ext cx="10058400" cy="1450757"/>
+          </a:xfrm>
+          <a:prstGeom prst="rect">
+            <a:avLst/>
+          </a:prstGeom>
+        </p:spPr>
+        <p:txBody>
+          <a:bodyPr/>
+          <a:lstStyle>
+            <a:lvl1pPr algn="l" defTabSz="914400" rtl="1" eaLnBrk="1" latinLnBrk="0" hangingPunct="1">
+              <a:lnSpc>
+                <a:spcPct val="85000"/>
+              </a:lnSpc>
+              <a:spcBef>
+                <a:spcPct val="0"/>
+              </a:spcBef>
+              <a:buNone/>
+              <a:defRPr sz="4800" kern="1200" spc="-50" baseline="0">
+                <a:solidFill>
+                  <a:schemeClr val="tx1">
+                    <a:lumMod val="75000"/>
+                    <a:lumOff val="25000"/>
+                  </a:schemeClr>
+                </a:solidFill>
+                <a:latin typeface="+mj-lt"/>
+                <a:ea typeface="+mj-ea"/>
+                <a:cs typeface="+mj-cs"/>
+              </a:defRPr>
+            </a:lvl1pPr>
+          </a:lstStyle>
+          <a:p>
+            <a:pPr algn="r"/>
+            <a:r>
+              <a:rPr lang="he-IL" sz="4000" dirty="0" smtClean="0"/>
+              <a:t>השוואה בין </a:t>
+            </a:r>
+            <a:r>
+              <a:rPr lang="en-US" sz="4000" dirty="0" err="1" smtClean="0"/>
+              <a:t>kmeans</a:t>
+            </a:r>
+            <a:r>
+              <a:rPr lang="he-IL" sz="4000" dirty="0" smtClean="0"/>
+              <a:t> ל</a:t>
+            </a:r>
+            <a:r>
+              <a:rPr lang="en-US" sz="4000" dirty="0" smtClean="0"/>
+              <a:t>-</a:t>
+            </a:r>
+            <a:r>
+              <a:rPr lang="he-IL" sz="4000" dirty="0" smtClean="0"/>
+              <a:t> </a:t>
+            </a:r>
+            <a:r>
+              <a:rPr lang="en-US" sz="4000" dirty="0" err="1" smtClean="0"/>
+              <a:t>kmeans</a:t>
+            </a:r>
+            <a:r>
+              <a:rPr lang="en-US" sz="4000" dirty="0" smtClean="0"/>
+              <a:t>++</a:t>
+            </a:r>
+            <a:endParaRPr lang="he-IL" sz="4000" dirty="0"/>
+          </a:p>
+        </p:txBody>
+      </p:sp>
+    </p:spTree>
+    <p:extLst>
+      <p:ext uri="{BB962C8B-B14F-4D97-AF65-F5344CB8AC3E}">
+        <p14:creationId xmlns:p14="http://schemas.microsoft.com/office/powerpoint/2010/main" val="4105089132"/>
+      </p:ext>
+    </p:extLst>
+  </p:cSld>
+  <p:clrMapOvr>
+    <a:masterClrMapping/>
+  </p:clrMapOvr>
+</p:sld>
+</file>
+
+<file path=ppt/slides/slide16.xml><?xml version="1.0" encoding="utf-8"?>
+<p:sld xmlns:a="http://schemas.openxmlformats.org/drawingml/2006/main" xmlns:r="http://schemas.openxmlformats.org/officeDocument/2006/relationships" xmlns:p="http://schemas.openxmlformats.org/presentationml/2006/main">
+  <p:cSld>
+    <p:spTree>
+      <p:nvGrpSpPr>
+        <p:cNvPr id="1" name=""/>
+        <p:cNvGrpSpPr/>
+        <p:nvPr/>
+      </p:nvGrpSpPr>
+      <p:grpSpPr>
+        <a:xfrm>
+          <a:off x="0" y="0"/>
+          <a:ext cx="0" cy="0"/>
+          <a:chOff x="0" y="0"/>
+          <a:chExt cx="0" cy="0"/>
+        </a:xfrm>
+      </p:grpSpPr>
+      <p:sp>
+        <p:nvSpPr>
+          <p:cNvPr id="2" name="כותרת 1"/>
+          <p:cNvSpPr>
+            <a:spLocks noGrp="1"/>
+          </p:cNvSpPr>
+          <p:nvPr>
+            <p:ph type="title"/>
+          </p:nvPr>
+        </p:nvSpPr>
+        <p:spPr/>
+        <p:txBody>
+          <a:bodyPr/>
+          <a:lstStyle/>
+          <a:p>
+            <a:pPr algn="r"/>
+            <a:r>
+              <a:rPr lang="he-IL" dirty="0" smtClean="0"/>
+              <a:t>דוגמת ריצה	</a:t>
+            </a:r>
+            <a:endParaRPr lang="he-IL" dirty="0"/>
+          </a:p>
+        </p:txBody>
+      </p:sp>
+      <p:sp>
+        <p:nvSpPr>
+          <p:cNvPr id="3" name="מציין מיקום תוכן 2"/>
+          <p:cNvSpPr>
+            <a:spLocks noGrp="1"/>
+          </p:cNvSpPr>
+          <p:nvPr>
+            <p:ph idx="1"/>
+          </p:nvPr>
+        </p:nvSpPr>
+        <p:spPr/>
+        <p:txBody>
+          <a:bodyPr/>
+          <a:lstStyle/>
+          <a:p>
             <a:pPr marL="0" indent="0">
               <a:buNone/>
             </a:pPr>
@@ -6461,7 +6875,6 @@
               <a:rPr lang="he-IL" dirty="0" smtClean="0"/>
               <a:t>'...)</a:t>
             </a:r>
-            <a:endParaRPr lang="he-IL" dirty="0" smtClean="0"/>
           </a:p>
           <a:p>
             <a:pPr marL="0" indent="0">
@@ -6514,7 +6927,7 @@
 </p:sld>
 </file>
 
-<file path=ppt/slides/slide15.xml><?xml version="1.0" encoding="utf-8"?>
+<file path=ppt/slides/slide17.xml><?xml version="1.0" encoding="utf-8"?>
 <p:sld xmlns:a="http://schemas.openxmlformats.org/drawingml/2006/main" xmlns:r="http://schemas.openxmlformats.org/officeDocument/2006/relationships" xmlns:p="http://schemas.openxmlformats.org/presentationml/2006/main">
   <p:cSld>
     <p:spTree>
@@ -6605,7 +7018,7 @@
 </p:sld>
 </file>
 
-<file path=ppt/slides/slide16.xml><?xml version="1.0" encoding="utf-8"?>
+<file path=ppt/slides/slide18.xml><?xml version="1.0" encoding="utf-8"?>
 <p:sld xmlns:a="http://schemas.openxmlformats.org/drawingml/2006/main" xmlns:r="http://schemas.openxmlformats.org/officeDocument/2006/relationships" xmlns:p="http://schemas.openxmlformats.org/presentationml/2006/main">
   <p:cSld>
     <p:spTree>
@@ -6702,7 +7115,7 @@
 </p:sld>
 </file>
 
-<file path=ppt/slides/slide17.xml><?xml version="1.0" encoding="utf-8"?>
+<file path=ppt/slides/slide19.xml><?xml version="1.0" encoding="utf-8"?>
 <p:sld xmlns:a="http://schemas.openxmlformats.org/drawingml/2006/main" xmlns:r="http://schemas.openxmlformats.org/officeDocument/2006/relationships" xmlns:p="http://schemas.openxmlformats.org/presentationml/2006/main">
   <p:cSld>
     <p:spTree>
@@ -6783,200 +7196,6 @@
     <p:extLst>
       <p:ext uri="{BB962C8B-B14F-4D97-AF65-F5344CB8AC3E}">
         <p14:creationId xmlns:p14="http://schemas.microsoft.com/office/powerpoint/2010/main" val="2543868702"/>
-      </p:ext>
-    </p:extLst>
-  </p:cSld>
-  <p:clrMapOvr>
-    <a:masterClrMapping/>
-  </p:clrMapOvr>
-  <p:timing>
-    <p:tnLst>
-      <p:par>
-        <p:cTn id="1" dur="indefinite" restart="never" nodeType="tmRoot"/>
-      </p:par>
-    </p:tnLst>
-  </p:timing>
-</p:sld>
-</file>
-
-<file path=ppt/slides/slide18.xml><?xml version="1.0" encoding="utf-8"?>
-<p:sld xmlns:a="http://schemas.openxmlformats.org/drawingml/2006/main" xmlns:r="http://schemas.openxmlformats.org/officeDocument/2006/relationships" xmlns:p="http://schemas.openxmlformats.org/presentationml/2006/main">
-  <p:cSld>
-    <p:spTree>
-      <p:nvGrpSpPr>
-        <p:cNvPr id="1" name=""/>
-        <p:cNvGrpSpPr/>
-        <p:nvPr/>
-      </p:nvGrpSpPr>
-      <p:grpSpPr>
-        <a:xfrm>
-          <a:off x="0" y="0"/>
-          <a:ext cx="0" cy="0"/>
-          <a:chOff x="0" y="0"/>
-          <a:chExt cx="0" cy="0"/>
-        </a:xfrm>
-      </p:grpSpPr>
-      <p:pic>
-        <p:nvPicPr>
-          <p:cNvPr id="2" name="תמונה 1"/>
-          <p:cNvPicPr>
-            <a:picLocks noChangeAspect="1"/>
-          </p:cNvPicPr>
-          <p:nvPr/>
-        </p:nvPicPr>
-        <p:blipFill>
-          <a:blip r:embed="rId2">
-            <a:extLst>
-              <a:ext uri="{28A0092B-C50C-407E-A947-70E740481C1C}">
-                <a14:useLocalDpi xmlns:a14="http://schemas.microsoft.com/office/drawing/2010/main" val="0"/>
-              </a:ext>
-            </a:extLst>
-          </a:blip>
-          <a:stretch>
-            <a:fillRect/>
-          </a:stretch>
-        </p:blipFill>
-        <p:spPr>
-          <a:xfrm>
-            <a:off x="1956000" y="0"/>
-            <a:ext cx="8280000" cy="6210000"/>
-          </a:xfrm>
-          <a:prstGeom prst="rect">
-            <a:avLst/>
-          </a:prstGeom>
-        </p:spPr>
-      </p:pic>
-      <p:sp>
-        <p:nvSpPr>
-          <p:cNvPr id="7" name="TextBox 6"/>
-          <p:cNvSpPr txBox="1"/>
-          <p:nvPr/>
-        </p:nvSpPr>
-        <p:spPr>
-          <a:xfrm>
-            <a:off x="540857" y="731520"/>
-            <a:ext cx="2830286" cy="369332"/>
-          </a:xfrm>
-          <a:prstGeom prst="rect">
-            <a:avLst/>
-          </a:prstGeom>
-          <a:noFill/>
-        </p:spPr>
-        <p:txBody>
-          <a:bodyPr wrap="square" rtlCol="1">
-            <a:spAutoFit/>
-          </a:bodyPr>
-          <a:lstStyle/>
-          <a:p>
-            <a:pPr algn="l" rtl="0"/>
-            <a:r>
-              <a:rPr lang="en-US" dirty="0" smtClean="0"/>
-              <a:t>Iteration 3</a:t>
-            </a:r>
-          </a:p>
-        </p:txBody>
-      </p:sp>
-    </p:spTree>
-    <p:extLst>
-      <p:ext uri="{BB962C8B-B14F-4D97-AF65-F5344CB8AC3E}">
-        <p14:creationId xmlns:p14="http://schemas.microsoft.com/office/powerpoint/2010/main" val="3769810070"/>
-      </p:ext>
-    </p:extLst>
-  </p:cSld>
-  <p:clrMapOvr>
-    <a:masterClrMapping/>
-  </p:clrMapOvr>
-  <p:timing>
-    <p:tnLst>
-      <p:par>
-        <p:cTn id="1" dur="indefinite" restart="never" nodeType="tmRoot"/>
-      </p:par>
-    </p:tnLst>
-  </p:timing>
-</p:sld>
-</file>
-
-<file path=ppt/slides/slide19.xml><?xml version="1.0" encoding="utf-8"?>
-<p:sld xmlns:a="http://schemas.openxmlformats.org/drawingml/2006/main" xmlns:r="http://schemas.openxmlformats.org/officeDocument/2006/relationships" xmlns:p="http://schemas.openxmlformats.org/presentationml/2006/main">
-  <p:cSld>
-    <p:spTree>
-      <p:nvGrpSpPr>
-        <p:cNvPr id="1" name=""/>
-        <p:cNvGrpSpPr/>
-        <p:nvPr/>
-      </p:nvGrpSpPr>
-      <p:grpSpPr>
-        <a:xfrm>
-          <a:off x="0" y="0"/>
-          <a:ext cx="0" cy="0"/>
-          <a:chOff x="0" y="0"/>
-          <a:chExt cx="0" cy="0"/>
-        </a:xfrm>
-      </p:grpSpPr>
-      <p:pic>
-        <p:nvPicPr>
-          <p:cNvPr id="4" name="תמונה 3"/>
-          <p:cNvPicPr>
-            <a:picLocks noChangeAspect="1"/>
-          </p:cNvPicPr>
-          <p:nvPr/>
-        </p:nvPicPr>
-        <p:blipFill>
-          <a:blip r:embed="rId2">
-            <a:extLst>
-              <a:ext uri="{28A0092B-C50C-407E-A947-70E740481C1C}">
-                <a14:useLocalDpi xmlns:a14="http://schemas.microsoft.com/office/drawing/2010/main" val="0"/>
-              </a:ext>
-            </a:extLst>
-          </a:blip>
-          <a:stretch>
-            <a:fillRect/>
-          </a:stretch>
-        </p:blipFill>
-        <p:spPr>
-          <a:xfrm>
-            <a:off x="1956000" y="0"/>
-            <a:ext cx="8280000" cy="6210000"/>
-          </a:xfrm>
-          <a:prstGeom prst="rect">
-            <a:avLst/>
-          </a:prstGeom>
-        </p:spPr>
-      </p:pic>
-      <p:sp>
-        <p:nvSpPr>
-          <p:cNvPr id="8" name="TextBox 7"/>
-          <p:cNvSpPr txBox="1"/>
-          <p:nvPr/>
-        </p:nvSpPr>
-        <p:spPr>
-          <a:xfrm>
-            <a:off x="540857" y="740229"/>
-            <a:ext cx="2830286" cy="369332"/>
-          </a:xfrm>
-          <a:prstGeom prst="rect">
-            <a:avLst/>
-          </a:prstGeom>
-          <a:noFill/>
-        </p:spPr>
-        <p:txBody>
-          <a:bodyPr wrap="square" rtlCol="1">
-            <a:spAutoFit/>
-          </a:bodyPr>
-          <a:lstStyle/>
-          <a:p>
-            <a:pPr algn="l" rtl="0"/>
-            <a:r>
-              <a:rPr lang="en-US" dirty="0" smtClean="0"/>
-              <a:t>Iteration 4</a:t>
-            </a:r>
-          </a:p>
-        </p:txBody>
-      </p:sp>
-    </p:spTree>
-    <p:extLst>
-      <p:ext uri="{BB962C8B-B14F-4D97-AF65-F5344CB8AC3E}">
-        <p14:creationId xmlns:p14="http://schemas.microsoft.com/office/powerpoint/2010/main" val="3611648075"/>
       </p:ext>
     </p:extLst>
   </p:cSld>
@@ -7181,6 +7400,200 @@
             <a:pPr algn="l" rtl="0"/>
             <a:r>
               <a:rPr lang="en-US" dirty="0" smtClean="0"/>
+              <a:t>Iteration 3</a:t>
+            </a:r>
+          </a:p>
+        </p:txBody>
+      </p:sp>
+    </p:spTree>
+    <p:extLst>
+      <p:ext uri="{BB962C8B-B14F-4D97-AF65-F5344CB8AC3E}">
+        <p14:creationId xmlns:p14="http://schemas.microsoft.com/office/powerpoint/2010/main" val="3769810070"/>
+      </p:ext>
+    </p:extLst>
+  </p:cSld>
+  <p:clrMapOvr>
+    <a:masterClrMapping/>
+  </p:clrMapOvr>
+  <p:timing>
+    <p:tnLst>
+      <p:par>
+        <p:cTn id="1" dur="indefinite" restart="never" nodeType="tmRoot"/>
+      </p:par>
+    </p:tnLst>
+  </p:timing>
+</p:sld>
+</file>
+
+<file path=ppt/slides/slide21.xml><?xml version="1.0" encoding="utf-8"?>
+<p:sld xmlns:a="http://schemas.openxmlformats.org/drawingml/2006/main" xmlns:r="http://schemas.openxmlformats.org/officeDocument/2006/relationships" xmlns:p="http://schemas.openxmlformats.org/presentationml/2006/main">
+  <p:cSld>
+    <p:spTree>
+      <p:nvGrpSpPr>
+        <p:cNvPr id="1" name=""/>
+        <p:cNvGrpSpPr/>
+        <p:nvPr/>
+      </p:nvGrpSpPr>
+      <p:grpSpPr>
+        <a:xfrm>
+          <a:off x="0" y="0"/>
+          <a:ext cx="0" cy="0"/>
+          <a:chOff x="0" y="0"/>
+          <a:chExt cx="0" cy="0"/>
+        </a:xfrm>
+      </p:grpSpPr>
+      <p:pic>
+        <p:nvPicPr>
+          <p:cNvPr id="4" name="תמונה 3"/>
+          <p:cNvPicPr>
+            <a:picLocks noChangeAspect="1"/>
+          </p:cNvPicPr>
+          <p:nvPr/>
+        </p:nvPicPr>
+        <p:blipFill>
+          <a:blip r:embed="rId2">
+            <a:extLst>
+              <a:ext uri="{28A0092B-C50C-407E-A947-70E740481C1C}">
+                <a14:useLocalDpi xmlns:a14="http://schemas.microsoft.com/office/drawing/2010/main" val="0"/>
+              </a:ext>
+            </a:extLst>
+          </a:blip>
+          <a:stretch>
+            <a:fillRect/>
+          </a:stretch>
+        </p:blipFill>
+        <p:spPr>
+          <a:xfrm>
+            <a:off x="1956000" y="0"/>
+            <a:ext cx="8280000" cy="6210000"/>
+          </a:xfrm>
+          <a:prstGeom prst="rect">
+            <a:avLst/>
+          </a:prstGeom>
+        </p:spPr>
+      </p:pic>
+      <p:sp>
+        <p:nvSpPr>
+          <p:cNvPr id="8" name="TextBox 7"/>
+          <p:cNvSpPr txBox="1"/>
+          <p:nvPr/>
+        </p:nvSpPr>
+        <p:spPr>
+          <a:xfrm>
+            <a:off x="540857" y="740229"/>
+            <a:ext cx="2830286" cy="369332"/>
+          </a:xfrm>
+          <a:prstGeom prst="rect">
+            <a:avLst/>
+          </a:prstGeom>
+          <a:noFill/>
+        </p:spPr>
+        <p:txBody>
+          <a:bodyPr wrap="square" rtlCol="1">
+            <a:spAutoFit/>
+          </a:bodyPr>
+          <a:lstStyle/>
+          <a:p>
+            <a:pPr algn="l" rtl="0"/>
+            <a:r>
+              <a:rPr lang="en-US" dirty="0" smtClean="0"/>
+              <a:t>Iteration 4</a:t>
+            </a:r>
+          </a:p>
+        </p:txBody>
+      </p:sp>
+    </p:spTree>
+    <p:extLst>
+      <p:ext uri="{BB962C8B-B14F-4D97-AF65-F5344CB8AC3E}">
+        <p14:creationId xmlns:p14="http://schemas.microsoft.com/office/powerpoint/2010/main" val="3611648075"/>
+      </p:ext>
+    </p:extLst>
+  </p:cSld>
+  <p:clrMapOvr>
+    <a:masterClrMapping/>
+  </p:clrMapOvr>
+  <p:timing>
+    <p:tnLst>
+      <p:par>
+        <p:cTn id="1" dur="indefinite" restart="never" nodeType="tmRoot"/>
+      </p:par>
+    </p:tnLst>
+  </p:timing>
+</p:sld>
+</file>
+
+<file path=ppt/slides/slide22.xml><?xml version="1.0" encoding="utf-8"?>
+<p:sld xmlns:a="http://schemas.openxmlformats.org/drawingml/2006/main" xmlns:r="http://schemas.openxmlformats.org/officeDocument/2006/relationships" xmlns:p="http://schemas.openxmlformats.org/presentationml/2006/main">
+  <p:cSld>
+    <p:spTree>
+      <p:nvGrpSpPr>
+        <p:cNvPr id="1" name=""/>
+        <p:cNvGrpSpPr/>
+        <p:nvPr/>
+      </p:nvGrpSpPr>
+      <p:grpSpPr>
+        <a:xfrm>
+          <a:off x="0" y="0"/>
+          <a:ext cx="0" cy="0"/>
+          <a:chOff x="0" y="0"/>
+          <a:chExt cx="0" cy="0"/>
+        </a:xfrm>
+      </p:grpSpPr>
+      <p:pic>
+        <p:nvPicPr>
+          <p:cNvPr id="2" name="תמונה 1"/>
+          <p:cNvPicPr>
+            <a:picLocks noChangeAspect="1"/>
+          </p:cNvPicPr>
+          <p:nvPr/>
+        </p:nvPicPr>
+        <p:blipFill>
+          <a:blip r:embed="rId2">
+            <a:extLst>
+              <a:ext uri="{28A0092B-C50C-407E-A947-70E740481C1C}">
+                <a14:useLocalDpi xmlns:a14="http://schemas.microsoft.com/office/drawing/2010/main" val="0"/>
+              </a:ext>
+            </a:extLst>
+          </a:blip>
+          <a:stretch>
+            <a:fillRect/>
+          </a:stretch>
+        </p:blipFill>
+        <p:spPr>
+          <a:xfrm>
+            <a:off x="1956000" y="0"/>
+            <a:ext cx="8280000" cy="6210000"/>
+          </a:xfrm>
+          <a:prstGeom prst="rect">
+            <a:avLst/>
+          </a:prstGeom>
+        </p:spPr>
+      </p:pic>
+      <p:sp>
+        <p:nvSpPr>
+          <p:cNvPr id="7" name="TextBox 6"/>
+          <p:cNvSpPr txBox="1"/>
+          <p:nvPr/>
+        </p:nvSpPr>
+        <p:spPr>
+          <a:xfrm>
+            <a:off x="540857" y="731520"/>
+            <a:ext cx="2830286" cy="369332"/>
+          </a:xfrm>
+          <a:prstGeom prst="rect">
+            <a:avLst/>
+          </a:prstGeom>
+          <a:noFill/>
+        </p:spPr>
+        <p:txBody>
+          <a:bodyPr wrap="square" rtlCol="1">
+            <a:spAutoFit/>
+          </a:bodyPr>
+          <a:lstStyle/>
+          <a:p>
+            <a:pPr algn="l" rtl="0"/>
+            <a:r>
+              <a:rPr lang="en-US" dirty="0" smtClean="0"/>
               <a:t>Iteration 5</a:t>
             </a:r>
           </a:p>
@@ -7206,7 +7619,7 @@
 </p:sld>
 </file>
 
-<file path=ppt/slides/slide21.xml><?xml version="1.0" encoding="utf-8"?>
+<file path=ppt/slides/slide23.xml><?xml version="1.0" encoding="utf-8"?>
 <p:sld xmlns:a="http://schemas.openxmlformats.org/drawingml/2006/main" xmlns:r="http://schemas.openxmlformats.org/officeDocument/2006/relationships" xmlns:p="http://schemas.openxmlformats.org/presentationml/2006/main">
   <p:cSld>
     <p:spTree>
@@ -7303,7 +7716,7 @@
 </p:sld>
 </file>
 
-<file path=ppt/slides/slide22.xml><?xml version="1.0" encoding="utf-8"?>
+<file path=ppt/slides/slide24.xml><?xml version="1.0" encoding="utf-8"?>
 <p:sld xmlns:a="http://schemas.openxmlformats.org/drawingml/2006/main" xmlns:r="http://schemas.openxmlformats.org/officeDocument/2006/relationships" xmlns:p="http://schemas.openxmlformats.org/presentationml/2006/main">
   <p:cSld>
     <p:spTree>
@@ -7411,7 +7824,7 @@
 </p:sld>
 </file>
 
-<file path=ppt/slides/slide23.xml><?xml version="1.0" encoding="utf-8"?>
+<file path=ppt/slides/slide25.xml><?xml version="1.0" encoding="utf-8"?>
 <p:sld xmlns:a="http://schemas.openxmlformats.org/drawingml/2006/main" xmlns:r="http://schemas.openxmlformats.org/officeDocument/2006/relationships" xmlns:p="http://schemas.openxmlformats.org/presentationml/2006/main">
   <p:cSld>
     <p:spTree>
@@ -7452,8 +7865,8 @@
           </a:p>
         </p:txBody>
       </p:sp>
-      <mc:AlternateContent xmlns:mc="http://schemas.openxmlformats.org/markup-compatibility/2006">
-        <mc:Choice xmlns:a14="http://schemas.microsoft.com/office/drawing/2010/main" Requires="a14">
+      <mc:AlternateContent xmlns:mc="http://schemas.openxmlformats.org/markup-compatibility/2006" xmlns:a14="http://schemas.microsoft.com/office/drawing/2010/main">
+        <mc:Choice Requires="a14">
           <p:sp>
             <p:nvSpPr>
               <p:cNvPr id="3" name="מציין מיקום תוכן 2"/>
@@ -8036,7 +8449,7 @@
             </p:txBody>
           </p:sp>
         </mc:Choice>
-        <mc:Fallback>
+        <mc:Fallback xmlns="">
           <p:sp>
             <p:nvSpPr>
               <p:cNvPr id="3" name="מציין מיקום תוכן 2"/>
@@ -8090,7 +8503,7 @@
 </p:sld>
 </file>
 
-<file path=ppt/slides/slide24.xml><?xml version="1.0" encoding="utf-8"?>
+<file path=ppt/slides/slide26.xml><?xml version="1.0" encoding="utf-8"?>
 <p:sld xmlns:a="http://schemas.openxmlformats.org/drawingml/2006/main" xmlns:r="http://schemas.openxmlformats.org/officeDocument/2006/relationships" xmlns:p="http://schemas.openxmlformats.org/presentationml/2006/main">
   <p:cSld>
     <p:spTree>
@@ -8240,7 +8653,7 @@
 </p:sld>
 </file>
 
-<file path=ppt/slides/slide25.xml><?xml version="1.0" encoding="utf-8"?>
+<file path=ppt/slides/slide27.xml><?xml version="1.0" encoding="utf-8"?>
 <p:sld xmlns:a="http://schemas.openxmlformats.org/drawingml/2006/main" xmlns:r="http://schemas.openxmlformats.org/officeDocument/2006/relationships" xmlns:p="http://schemas.openxmlformats.org/presentationml/2006/main">
   <p:cSld>
     <p:spTree>
@@ -8472,7 +8885,7 @@
 </p:sld>
 </file>
 
-<file path=ppt/slides/slide26.xml><?xml version="1.0" encoding="utf-8"?>
+<file path=ppt/slides/slide28.xml><?xml version="1.0" encoding="utf-8"?>
 <p:sld xmlns:a="http://schemas.openxmlformats.org/drawingml/2006/main" xmlns:r="http://schemas.openxmlformats.org/officeDocument/2006/relationships" xmlns:p="http://schemas.openxmlformats.org/presentationml/2006/main">
   <p:cSld>
     <p:spTree>
@@ -8507,33 +8920,103 @@
             <a:pPr algn="r"/>
             <a:r>
               <a:rPr lang="he-IL" dirty="0" smtClean="0"/>
-              <a:t>דוגמת ריצה - אתחול</a:t>
+              <a:t>דוגמת ריצה </a:t>
+            </a:r>
+            <a:r>
+              <a:rPr lang="he-IL" dirty="0" smtClean="0"/>
+              <a:t>– יצירת נתונים</a:t>
             </a:r>
             <a:endParaRPr lang="he-IL" dirty="0"/>
           </a:p>
         </p:txBody>
       </p:sp>
-      <p:sp>
-        <p:nvSpPr>
-          <p:cNvPr id="3" name="מציין מיקום תוכן 2"/>
-          <p:cNvSpPr>
-            <a:spLocks noGrp="1"/>
-          </p:cNvSpPr>
-          <p:nvPr>
-            <p:ph idx="1"/>
-          </p:nvPr>
-        </p:nvSpPr>
-        <p:spPr/>
-        <p:txBody>
-          <a:bodyPr>
-            <a:normAutofit/>
-          </a:bodyPr>
-          <a:lstStyle/>
-          <a:p>
-            <a:endParaRPr lang="he-IL" dirty="0"/>
-          </a:p>
-        </p:txBody>
-      </p:sp>
+      <p:pic>
+        <p:nvPicPr>
+          <p:cNvPr id="4" name="תמונה 3"/>
+          <p:cNvPicPr>
+            <a:picLocks noChangeAspect="1"/>
+          </p:cNvPicPr>
+          <p:nvPr/>
+        </p:nvPicPr>
+        <p:blipFill rotWithShape="1">
+          <a:blip r:embed="rId2">
+            <a:extLst>
+              <a:ext uri="{28A0092B-C50C-407E-A947-70E740481C1C}">
+                <a14:useLocalDpi xmlns:a14="http://schemas.microsoft.com/office/drawing/2010/main" val="0"/>
+              </a:ext>
+            </a:extLst>
+          </a:blip>
+          <a:srcRect l="22768" t="13343" r="18899" b="4315"/>
+          <a:stretch/>
+        </p:blipFill>
+        <p:spPr>
+          <a:xfrm>
+            <a:off x="4419599" y="2209802"/>
+            <a:ext cx="3413761" cy="3614058"/>
+          </a:xfrm>
+          <a:prstGeom prst="rect">
+            <a:avLst/>
+          </a:prstGeom>
+        </p:spPr>
+      </p:pic>
+      <p:pic>
+        <p:nvPicPr>
+          <p:cNvPr id="5" name="תמונה 4"/>
+          <p:cNvPicPr>
+            <a:picLocks noChangeAspect="1"/>
+          </p:cNvPicPr>
+          <p:nvPr/>
+        </p:nvPicPr>
+        <p:blipFill rotWithShape="1">
+          <a:blip r:embed="rId3">
+            <a:extLst>
+              <a:ext uri="{28A0092B-C50C-407E-A947-70E740481C1C}">
+                <a14:useLocalDpi xmlns:a14="http://schemas.microsoft.com/office/drawing/2010/main" val="0"/>
+              </a:ext>
+            </a:extLst>
+          </a:blip>
+          <a:srcRect l="24850" t="15527" r="11459" b="15029"/>
+          <a:stretch/>
+        </p:blipFill>
+        <p:spPr>
+          <a:xfrm>
+            <a:off x="8133805" y="2492831"/>
+            <a:ext cx="3727269" cy="3048000"/>
+          </a:xfrm>
+          <a:prstGeom prst="rect">
+            <a:avLst/>
+          </a:prstGeom>
+        </p:spPr>
+      </p:pic>
+      <p:pic>
+        <p:nvPicPr>
+          <p:cNvPr id="6" name="תמונה 5"/>
+          <p:cNvPicPr>
+            <a:picLocks noChangeAspect="1"/>
+          </p:cNvPicPr>
+          <p:nvPr/>
+        </p:nvPicPr>
+        <p:blipFill rotWithShape="1">
+          <a:blip r:embed="rId4">
+            <a:extLst>
+              <a:ext uri="{28A0092B-C50C-407E-A947-70E740481C1C}">
+                <a14:useLocalDpi xmlns:a14="http://schemas.microsoft.com/office/drawing/2010/main" val="0"/>
+              </a:ext>
+            </a:extLst>
+          </a:blip>
+          <a:srcRect l="18006" t="9573" r="19643" b="3324"/>
+          <a:stretch/>
+        </p:blipFill>
+        <p:spPr>
+          <a:xfrm>
+            <a:off x="339635" y="2105300"/>
+            <a:ext cx="3648891" cy="3823063"/>
+          </a:xfrm>
+          <a:prstGeom prst="rect">
+            <a:avLst/>
+          </a:prstGeom>
+        </p:spPr>
+      </p:pic>
     </p:spTree>
     <p:extLst>
       <p:ext uri="{BB962C8B-B14F-4D97-AF65-F5344CB8AC3E}">
@@ -8554,7 +9037,7 @@
 </p:sld>
 </file>
 
-<file path=ppt/slides/slide27.xml><?xml version="1.0" encoding="utf-8"?>
+<file path=ppt/slides/slide29.xml><?xml version="1.0" encoding="utf-8"?>
 <p:sld xmlns:a="http://schemas.openxmlformats.org/drawingml/2006/main" xmlns:r="http://schemas.openxmlformats.org/officeDocument/2006/relationships" xmlns:p="http://schemas.openxmlformats.org/presentationml/2006/main">
   <p:cSld>
     <p:spTree>
@@ -8571,6 +9054,35 @@
           <a:chExt cx="0" cy="0"/>
         </a:xfrm>
       </p:grpSpPr>
+      <p:pic>
+        <p:nvPicPr>
+          <p:cNvPr id="5" name="תמונה 4"/>
+          <p:cNvPicPr>
+            <a:picLocks noChangeAspect="1"/>
+          </p:cNvPicPr>
+          <p:nvPr/>
+        </p:nvPicPr>
+        <p:blipFill rotWithShape="1">
+          <a:blip r:embed="rId2">
+            <a:extLst>
+              <a:ext uri="{28A0092B-C50C-407E-A947-70E740481C1C}">
+                <a14:useLocalDpi xmlns:a14="http://schemas.microsoft.com/office/drawing/2010/main" val="0"/>
+              </a:ext>
+            </a:extLst>
+          </a:blip>
+          <a:srcRect l="21577" t="12351" r="9970" b="10466"/>
+          <a:stretch/>
+        </p:blipFill>
+        <p:spPr>
+          <a:xfrm>
+            <a:off x="4326480" y="2414175"/>
+            <a:ext cx="3600000" cy="3044348"/>
+          </a:xfrm>
+          <a:prstGeom prst="rect">
+            <a:avLst/>
+          </a:prstGeom>
+        </p:spPr>
+      </p:pic>
       <p:sp>
         <p:nvSpPr>
           <p:cNvPr id="2" name="כותרת 1"/>
@@ -8589,33 +9101,74 @@
             <a:pPr algn="r"/>
             <a:r>
               <a:rPr lang="he-IL" dirty="0" smtClean="0"/>
-              <a:t>דוגמת ריצה – אשכול</a:t>
+              <a:t>דוגמת ריצה – </a:t>
+            </a:r>
+            <a:r>
+              <a:rPr lang="he-IL" dirty="0" smtClean="0"/>
+              <a:t>חישוב מרחקים צפויים</a:t>
             </a:r>
             <a:endParaRPr lang="he-IL" dirty="0"/>
           </a:p>
         </p:txBody>
       </p:sp>
-      <p:sp>
-        <p:nvSpPr>
-          <p:cNvPr id="3" name="מציין מיקום תוכן 2"/>
-          <p:cNvSpPr>
-            <a:spLocks noGrp="1"/>
-          </p:cNvSpPr>
-          <p:nvPr>
-            <p:ph idx="1"/>
-          </p:nvPr>
-        </p:nvSpPr>
-        <p:spPr/>
-        <p:txBody>
-          <a:bodyPr>
-            <a:normAutofit/>
-          </a:bodyPr>
-          <a:lstStyle/>
-          <a:p>
-            <a:endParaRPr lang="he-IL" dirty="0"/>
-          </a:p>
-        </p:txBody>
-      </p:sp>
+      <p:pic>
+        <p:nvPicPr>
+          <p:cNvPr id="4" name="תמונה 3"/>
+          <p:cNvPicPr>
+            <a:picLocks noChangeAspect="1"/>
+          </p:cNvPicPr>
+          <p:nvPr/>
+        </p:nvPicPr>
+        <p:blipFill rotWithShape="1">
+          <a:blip r:embed="rId3">
+            <a:extLst>
+              <a:ext uri="{28A0092B-C50C-407E-A947-70E740481C1C}">
+                <a14:useLocalDpi xmlns:a14="http://schemas.microsoft.com/office/drawing/2010/main" val="0"/>
+              </a:ext>
+            </a:extLst>
+          </a:blip>
+          <a:srcRect l="25251" t="13175" r="9367" b="10976"/>
+          <a:stretch/>
+        </p:blipFill>
+        <p:spPr>
+          <a:xfrm>
+            <a:off x="726480" y="2370224"/>
+            <a:ext cx="3600000" cy="3132249"/>
+          </a:xfrm>
+          <a:prstGeom prst="rect">
+            <a:avLst/>
+          </a:prstGeom>
+        </p:spPr>
+      </p:pic>
+      <p:pic>
+        <p:nvPicPr>
+          <p:cNvPr id="6" name="תמונה 5"/>
+          <p:cNvPicPr>
+            <a:picLocks noChangeAspect="1"/>
+          </p:cNvPicPr>
+          <p:nvPr/>
+        </p:nvPicPr>
+        <p:blipFill rotWithShape="1">
+          <a:blip r:embed="rId4">
+            <a:extLst>
+              <a:ext uri="{28A0092B-C50C-407E-A947-70E740481C1C}">
+                <a14:useLocalDpi xmlns:a14="http://schemas.microsoft.com/office/drawing/2010/main" val="0"/>
+              </a:ext>
+            </a:extLst>
+          </a:blip>
+          <a:srcRect l="16889" t="12451" r="5432" b="7193"/>
+          <a:stretch/>
+        </p:blipFill>
+        <p:spPr>
+          <a:xfrm>
+            <a:off x="7926480" y="2414175"/>
+            <a:ext cx="3600000" cy="2793103"/>
+          </a:xfrm>
+          <a:prstGeom prst="rect">
+            <a:avLst/>
+          </a:prstGeom>
+        </p:spPr>
+      </p:pic>
     </p:spTree>
     <p:extLst>
       <p:ext uri="{BB962C8B-B14F-4D97-AF65-F5344CB8AC3E}">
@@ -8636,7 +9189,141 @@
 </p:sld>
 </file>
 
-<file path=ppt/slides/slide28.xml><?xml version="1.0" encoding="utf-8"?>
+<file path=ppt/slides/slide3.xml><?xml version="1.0" encoding="utf-8"?>
+<p:sld xmlns:a="http://schemas.openxmlformats.org/drawingml/2006/main" xmlns:r="http://schemas.openxmlformats.org/officeDocument/2006/relationships" xmlns:p="http://schemas.openxmlformats.org/presentationml/2006/main">
+  <p:cSld>
+    <p:spTree>
+      <p:nvGrpSpPr>
+        <p:cNvPr id="1" name=""/>
+        <p:cNvGrpSpPr/>
+        <p:nvPr/>
+      </p:nvGrpSpPr>
+      <p:grpSpPr>
+        <a:xfrm>
+          <a:off x="0" y="0"/>
+          <a:ext cx="0" cy="0"/>
+          <a:chOff x="0" y="0"/>
+          <a:chExt cx="0" cy="0"/>
+        </a:xfrm>
+      </p:grpSpPr>
+      <p:sp>
+        <p:nvSpPr>
+          <p:cNvPr id="2" name="כותרת 1"/>
+          <p:cNvSpPr>
+            <a:spLocks noGrp="1"/>
+          </p:cNvSpPr>
+          <p:nvPr>
+            <p:ph type="title"/>
+          </p:nvPr>
+        </p:nvSpPr>
+        <p:spPr/>
+        <p:txBody>
+          <a:bodyPr/>
+          <a:lstStyle/>
+          <a:p>
+            <a:pPr algn="r"/>
+            <a:r>
+              <a:rPr lang="he-IL" dirty="0" smtClean="0"/>
+              <a:t>רקע</a:t>
+            </a:r>
+            <a:endParaRPr lang="he-IL" dirty="0"/>
+          </a:p>
+        </p:txBody>
+      </p:sp>
+      <p:sp>
+        <p:nvSpPr>
+          <p:cNvPr id="3" name="מציין מיקום תוכן 2"/>
+          <p:cNvSpPr>
+            <a:spLocks noGrp="1"/>
+          </p:cNvSpPr>
+          <p:nvPr>
+            <p:ph idx="1"/>
+          </p:nvPr>
+        </p:nvSpPr>
+        <p:spPr/>
+        <p:txBody>
+          <a:bodyPr>
+            <a:normAutofit/>
+          </a:bodyPr>
+          <a:lstStyle/>
+          <a:p>
+            <a:pPr>
+              <a:lnSpc>
+                <a:spcPct val="200000"/>
+              </a:lnSpc>
+            </a:pPr>
+            <a:r>
+              <a:rPr lang="he-IL" dirty="0" smtClean="0"/>
+              <a:t>בתחומים רבים כגון:</a:t>
+            </a:r>
+            <a:r>
+              <a:rPr lang="en-US" dirty="0" smtClean="0"/>
+              <a:t> </a:t>
+            </a:r>
+            <a:r>
+              <a:rPr lang="he-IL" dirty="0" smtClean="0"/>
+              <a:t>למידה חישובית, זיהוי תבניות, ניתוח תמונה, איסוף נתונים, ביו אינפורמטיקה ודחיסת מידע. יש כמות אדירה של מידע.</a:t>
+            </a:r>
+          </a:p>
+          <a:p>
+            <a:pPr>
+              <a:lnSpc>
+                <a:spcPct val="200000"/>
+              </a:lnSpc>
+            </a:pPr>
+            <a:r>
+              <a:rPr lang="he-IL" dirty="0" smtClean="0"/>
+              <a:t>על מנת שנוכל לעבוד עם כמות כזו של מידע, עלינו לבצע עיבוד מקדים.</a:t>
+            </a:r>
+          </a:p>
+          <a:p>
+            <a:pPr>
+              <a:lnSpc>
+                <a:spcPct val="200000"/>
+              </a:lnSpc>
+            </a:pPr>
+            <a:r>
+              <a:rPr lang="he-IL" dirty="0" smtClean="0"/>
+              <a:t>אחד הפתרונות הפופולריים הינו – ניתוח אשכולות באופן בלתי מונחה (</a:t>
+            </a:r>
+            <a:r>
+              <a:rPr lang="en-US" dirty="0" smtClean="0"/>
+              <a:t>unsupervised</a:t>
+            </a:r>
+            <a:r>
+              <a:rPr lang="he-IL" dirty="0" smtClean="0"/>
+              <a:t>).</a:t>
+            </a:r>
+          </a:p>
+          <a:p>
+            <a:pPr marL="0" indent="0">
+              <a:buNone/>
+            </a:pPr>
+            <a:endParaRPr lang="he-IL" dirty="0"/>
+          </a:p>
+        </p:txBody>
+      </p:sp>
+    </p:spTree>
+    <p:extLst>
+      <p:ext uri="{BB962C8B-B14F-4D97-AF65-F5344CB8AC3E}">
+        <p14:creationId xmlns:p14="http://schemas.microsoft.com/office/powerpoint/2010/main" val="1707580785"/>
+      </p:ext>
+    </p:extLst>
+  </p:cSld>
+  <p:clrMapOvr>
+    <a:masterClrMapping/>
+  </p:clrMapOvr>
+  <p:timing>
+    <p:tnLst>
+      <p:par>
+        <p:cTn id="1" dur="indefinite" restart="never" nodeType="tmRoot"/>
+      </p:par>
+    </p:tnLst>
+  </p:timing>
+</p:sld>
+</file>
+
+<file path=ppt/slides/slide30.xml><?xml version="1.0" encoding="utf-8"?>
 <p:sld xmlns:a="http://schemas.openxmlformats.org/drawingml/2006/main" xmlns:r="http://schemas.openxmlformats.org/officeDocument/2006/relationships" xmlns:p="http://schemas.openxmlformats.org/presentationml/2006/main">
   <p:cSld>
     <p:spTree>
@@ -8952,7 +9639,7 @@
 </p:sld>
 </file>
 
-<file path=ppt/slides/slide29.xml><?xml version="1.0" encoding="utf-8"?>
+<file path=ppt/slides/slide31.xml><?xml version="1.0" encoding="utf-8"?>
 <p:sld xmlns:a="http://schemas.openxmlformats.org/drawingml/2006/main" xmlns:r="http://schemas.openxmlformats.org/officeDocument/2006/relationships" xmlns:p="http://schemas.openxmlformats.org/presentationml/2006/main">
   <p:cSld>
     <p:spTree>
@@ -8987,46 +9674,71 @@
             <a:pPr algn="r"/>
             <a:r>
               <a:rPr lang="he-IL" dirty="0" smtClean="0"/>
-              <a:t>דוגמאות</a:t>
+              <a:t>תוצאות ריצה</a:t>
             </a:r>
             <a:endParaRPr lang="he-IL" dirty="0"/>
           </a:p>
         </p:txBody>
       </p:sp>
-      <p:sp>
-        <p:nvSpPr>
-          <p:cNvPr id="3" name="מציין מיקום תוכן 2"/>
-          <p:cNvSpPr>
-            <a:spLocks noGrp="1"/>
-          </p:cNvSpPr>
+      <p:pic>
+        <p:nvPicPr>
+          <p:cNvPr id="5" name="מציין מיקום תוכן 4"/>
+          <p:cNvPicPr>
+            <a:picLocks noGrp="1" noChangeAspect="1"/>
+          </p:cNvPicPr>
           <p:nvPr>
             <p:ph idx="1"/>
           </p:nvPr>
-        </p:nvSpPr>
-        <p:spPr/>
-        <p:txBody>
-          <a:bodyPr/>
-          <a:lstStyle/>
-          <a:p>
-            <a:r>
-              <a:rPr lang="he-IL" dirty="0" smtClean="0"/>
-              <a:t>תרשימים</a:t>
-            </a:r>
-          </a:p>
-          <a:p>
-            <a:r>
-              <a:rPr lang="he-IL" dirty="0" smtClean="0"/>
-              <a:t>גיף</a:t>
-            </a:r>
-          </a:p>
-          <a:p>
-            <a:pPr marL="0" indent="0">
-              <a:buNone/>
-            </a:pPr>
-            <a:endParaRPr lang="he-IL" dirty="0"/>
-          </a:p>
-        </p:txBody>
-      </p:sp>
+        </p:nvPicPr>
+        <p:blipFill>
+          <a:blip r:embed="rId2">
+            <a:extLst>
+              <a:ext uri="{28A0092B-C50C-407E-A947-70E740481C1C}">
+                <a14:useLocalDpi xmlns:a14="http://schemas.microsoft.com/office/drawing/2010/main" val="0"/>
+              </a:ext>
+            </a:extLst>
+          </a:blip>
+          <a:stretch>
+            <a:fillRect/>
+          </a:stretch>
+        </p:blipFill>
+        <p:spPr>
+          <a:xfrm>
+            <a:off x="202529" y="1894115"/>
+            <a:ext cx="5760000" cy="4320000"/>
+          </a:xfrm>
+        </p:spPr>
+      </p:pic>
+      <p:pic>
+        <p:nvPicPr>
+          <p:cNvPr id="7" name="תמונה 6"/>
+          <p:cNvPicPr>
+            <a:picLocks noChangeAspect="1"/>
+          </p:cNvPicPr>
+          <p:nvPr/>
+        </p:nvPicPr>
+        <p:blipFill>
+          <a:blip r:embed="rId3">
+            <a:extLst>
+              <a:ext uri="{28A0092B-C50C-407E-A947-70E740481C1C}">
+                <a14:useLocalDpi xmlns:a14="http://schemas.microsoft.com/office/drawing/2010/main" val="0"/>
+              </a:ext>
+            </a:extLst>
+          </a:blip>
+          <a:stretch>
+            <a:fillRect/>
+          </a:stretch>
+        </p:blipFill>
+        <p:spPr>
+          <a:xfrm>
+            <a:off x="5962529" y="1894115"/>
+            <a:ext cx="5852172" cy="4389129"/>
+          </a:xfrm>
+          <a:prstGeom prst="rect">
+            <a:avLst/>
+          </a:prstGeom>
+        </p:spPr>
+      </p:pic>
     </p:spTree>
     <p:extLst>
       <p:ext uri="{BB962C8B-B14F-4D97-AF65-F5344CB8AC3E}">
@@ -9047,141 +9759,7 @@
 </p:sld>
 </file>
 
-<file path=ppt/slides/slide3.xml><?xml version="1.0" encoding="utf-8"?>
-<p:sld xmlns:a="http://schemas.openxmlformats.org/drawingml/2006/main" xmlns:r="http://schemas.openxmlformats.org/officeDocument/2006/relationships" xmlns:p="http://schemas.openxmlformats.org/presentationml/2006/main">
-  <p:cSld>
-    <p:spTree>
-      <p:nvGrpSpPr>
-        <p:cNvPr id="1" name=""/>
-        <p:cNvGrpSpPr/>
-        <p:nvPr/>
-      </p:nvGrpSpPr>
-      <p:grpSpPr>
-        <a:xfrm>
-          <a:off x="0" y="0"/>
-          <a:ext cx="0" cy="0"/>
-          <a:chOff x="0" y="0"/>
-          <a:chExt cx="0" cy="0"/>
-        </a:xfrm>
-      </p:grpSpPr>
-      <p:sp>
-        <p:nvSpPr>
-          <p:cNvPr id="2" name="כותרת 1"/>
-          <p:cNvSpPr>
-            <a:spLocks noGrp="1"/>
-          </p:cNvSpPr>
-          <p:nvPr>
-            <p:ph type="title"/>
-          </p:nvPr>
-        </p:nvSpPr>
-        <p:spPr/>
-        <p:txBody>
-          <a:bodyPr/>
-          <a:lstStyle/>
-          <a:p>
-            <a:pPr algn="r"/>
-            <a:r>
-              <a:rPr lang="he-IL" dirty="0" smtClean="0"/>
-              <a:t>רקע</a:t>
-            </a:r>
-            <a:endParaRPr lang="he-IL" dirty="0"/>
-          </a:p>
-        </p:txBody>
-      </p:sp>
-      <p:sp>
-        <p:nvSpPr>
-          <p:cNvPr id="3" name="מציין מיקום תוכן 2"/>
-          <p:cNvSpPr>
-            <a:spLocks noGrp="1"/>
-          </p:cNvSpPr>
-          <p:nvPr>
-            <p:ph idx="1"/>
-          </p:nvPr>
-        </p:nvSpPr>
-        <p:spPr/>
-        <p:txBody>
-          <a:bodyPr>
-            <a:normAutofit/>
-          </a:bodyPr>
-          <a:lstStyle/>
-          <a:p>
-            <a:pPr>
-              <a:lnSpc>
-                <a:spcPct val="200000"/>
-              </a:lnSpc>
-            </a:pPr>
-            <a:r>
-              <a:rPr lang="he-IL" dirty="0" smtClean="0"/>
-              <a:t>בתחומים רבים כגון:</a:t>
-            </a:r>
-            <a:r>
-              <a:rPr lang="en-US" dirty="0" smtClean="0"/>
-              <a:t> </a:t>
-            </a:r>
-            <a:r>
-              <a:rPr lang="he-IL" dirty="0" smtClean="0"/>
-              <a:t>למידה חישובית, זיהוי תבניות, ניתוח תמונה, איסוף נתונים, ביו אינפורמטיקה ודחיסת מידע. יש כמות אדירה של מידע.</a:t>
-            </a:r>
-          </a:p>
-          <a:p>
-            <a:pPr>
-              <a:lnSpc>
-                <a:spcPct val="200000"/>
-              </a:lnSpc>
-            </a:pPr>
-            <a:r>
-              <a:rPr lang="he-IL" dirty="0" smtClean="0"/>
-              <a:t>על מנת שנוכל לעבוד עם כמות כזו של מידע, עלינו לבצע עיבוד מקדים.</a:t>
-            </a:r>
-          </a:p>
-          <a:p>
-            <a:pPr>
-              <a:lnSpc>
-                <a:spcPct val="200000"/>
-              </a:lnSpc>
-            </a:pPr>
-            <a:r>
-              <a:rPr lang="he-IL" dirty="0" smtClean="0"/>
-              <a:t>אחד הפתרונות הפופולריים הינו – ניתוח אשכולות באופן בלתי מונחה (</a:t>
-            </a:r>
-            <a:r>
-              <a:rPr lang="en-US" dirty="0" smtClean="0"/>
-              <a:t>unsupervised</a:t>
-            </a:r>
-            <a:r>
-              <a:rPr lang="he-IL" dirty="0" smtClean="0"/>
-              <a:t>).</a:t>
-            </a:r>
-          </a:p>
-          <a:p>
-            <a:pPr marL="0" indent="0">
-              <a:buNone/>
-            </a:pPr>
-            <a:endParaRPr lang="he-IL" dirty="0"/>
-          </a:p>
-        </p:txBody>
-      </p:sp>
-    </p:spTree>
-    <p:extLst>
-      <p:ext uri="{BB962C8B-B14F-4D97-AF65-F5344CB8AC3E}">
-        <p14:creationId xmlns:p14="http://schemas.microsoft.com/office/powerpoint/2010/main" val="1707580785"/>
-      </p:ext>
-    </p:extLst>
-  </p:cSld>
-  <p:clrMapOvr>
-    <a:masterClrMapping/>
-  </p:clrMapOvr>
-  <p:timing>
-    <p:tnLst>
-      <p:par>
-        <p:cTn id="1" dur="indefinite" restart="never" nodeType="tmRoot"/>
-      </p:par>
-    </p:tnLst>
-  </p:timing>
-</p:sld>
-</file>
-
-<file path=ppt/slides/slide30.xml><?xml version="1.0" encoding="utf-8"?>
+<file path=ppt/slides/slide32.xml><?xml version="1.0" encoding="utf-8"?>
 <p:sld xmlns:a="http://schemas.openxmlformats.org/drawingml/2006/main" xmlns:r="http://schemas.openxmlformats.org/officeDocument/2006/relationships" xmlns:p="http://schemas.openxmlformats.org/presentationml/2006/main">
   <p:cSld>
     <p:spTree>
@@ -9291,7 +9869,7 @@
 </p:sld>
 </file>
 
-<file path=ppt/slides/slide31.xml><?xml version="1.0" encoding="utf-8"?>
+<file path=ppt/slides/slide33.xml><?xml version="1.0" encoding="utf-8"?>
 <p:sld xmlns:a="http://schemas.openxmlformats.org/drawingml/2006/main" xmlns:r="http://schemas.openxmlformats.org/officeDocument/2006/relationships" xmlns:p="http://schemas.openxmlformats.org/presentationml/2006/main">
   <p:cSld>
     <p:spTree>
@@ -9494,7 +10072,7 @@
 </p:sld>
 </file>
 
-<file path=ppt/slides/slide32.xml><?xml version="1.0" encoding="utf-8"?>
+<file path=ppt/slides/slide34.xml><?xml version="1.0" encoding="utf-8"?>
 <p:sld xmlns:a="http://schemas.openxmlformats.org/drawingml/2006/main" xmlns:r="http://schemas.openxmlformats.org/officeDocument/2006/relationships" xmlns:p="http://schemas.openxmlformats.org/presentationml/2006/main">
   <p:cSld>
     <p:spTree>
@@ -9644,87 +10222,7 @@
 </p:sld>
 </file>
 
-<file path=ppt/slides/slide33.xml><?xml version="1.0" encoding="utf-8"?>
-<p:sld xmlns:a="http://schemas.openxmlformats.org/drawingml/2006/main" xmlns:r="http://schemas.openxmlformats.org/officeDocument/2006/relationships" xmlns:p="http://schemas.openxmlformats.org/presentationml/2006/main">
-  <p:cSld>
-    <p:spTree>
-      <p:nvGrpSpPr>
-        <p:cNvPr id="1" name=""/>
-        <p:cNvGrpSpPr/>
-        <p:nvPr/>
-      </p:nvGrpSpPr>
-      <p:grpSpPr>
-        <a:xfrm>
-          <a:off x="0" y="0"/>
-          <a:ext cx="0" cy="0"/>
-          <a:chOff x="0" y="0"/>
-          <a:chExt cx="0" cy="0"/>
-        </a:xfrm>
-      </p:grpSpPr>
-      <p:sp>
-        <p:nvSpPr>
-          <p:cNvPr id="2" name="כותרת 1"/>
-          <p:cNvSpPr>
-            <a:spLocks noGrp="1"/>
-          </p:cNvSpPr>
-          <p:nvPr>
-            <p:ph type="title"/>
-          </p:nvPr>
-        </p:nvSpPr>
-        <p:spPr/>
-        <p:txBody>
-          <a:bodyPr/>
-          <a:lstStyle/>
-          <a:p>
-            <a:pPr algn="r"/>
-            <a:r>
-              <a:rPr lang="he-IL" dirty="0" smtClean="0"/>
-              <a:t>דוגמאות</a:t>
-            </a:r>
-            <a:endParaRPr lang="he-IL" dirty="0"/>
-          </a:p>
-        </p:txBody>
-      </p:sp>
-      <p:sp>
-        <p:nvSpPr>
-          <p:cNvPr id="3" name="מציין מיקום תוכן 2"/>
-          <p:cNvSpPr>
-            <a:spLocks noGrp="1"/>
-          </p:cNvSpPr>
-          <p:nvPr>
-            <p:ph idx="1"/>
-          </p:nvPr>
-        </p:nvSpPr>
-        <p:spPr/>
-        <p:txBody>
-          <a:bodyPr/>
-          <a:lstStyle/>
-          <a:p>
-            <a:endParaRPr lang="he-IL"/>
-          </a:p>
-        </p:txBody>
-      </p:sp>
-    </p:spTree>
-    <p:extLst>
-      <p:ext uri="{BB962C8B-B14F-4D97-AF65-F5344CB8AC3E}">
-        <p14:creationId xmlns:p14="http://schemas.microsoft.com/office/powerpoint/2010/main" val="868849417"/>
-      </p:ext>
-    </p:extLst>
-  </p:cSld>
-  <p:clrMapOvr>
-    <a:masterClrMapping/>
-  </p:clrMapOvr>
-  <p:timing>
-    <p:tnLst>
-      <p:par>
-        <p:cTn id="1" dur="indefinite" restart="never" nodeType="tmRoot"/>
-      </p:par>
-    </p:tnLst>
-  </p:timing>
-</p:sld>
-</file>
-
-<file path=ppt/slides/slide34.xml><?xml version="1.0" encoding="utf-8"?>
+<file path=ppt/slides/slide35.xml><?xml version="1.0" encoding="utf-8"?>
 <p:sld xmlns:a="http://schemas.openxmlformats.org/drawingml/2006/main" xmlns:r="http://schemas.openxmlformats.org/officeDocument/2006/relationships" xmlns:p="http://schemas.openxmlformats.org/presentationml/2006/main">
   <p:cSld>
     <p:spTree>
@@ -9815,7 +10313,7 @@
 </p:sld>
 </file>
 
-<file path=ppt/slides/slide35.xml><?xml version="1.0" encoding="utf-8"?>
+<file path=ppt/slides/slide36.xml><?xml version="1.0" encoding="utf-8"?>
 <p:sld xmlns:a="http://schemas.openxmlformats.org/drawingml/2006/main" xmlns:r="http://schemas.openxmlformats.org/officeDocument/2006/relationships" xmlns:p="http://schemas.openxmlformats.org/presentationml/2006/main">
   <p:cSld>
     <p:spTree>
@@ -9912,7 +10410,7 @@
 </p:sld>
 </file>
 
-<file path=ppt/slides/slide36.xml><?xml version="1.0" encoding="utf-8"?>
+<file path=ppt/slides/slide37.xml><?xml version="1.0" encoding="utf-8"?>
 <p:sld xmlns:a="http://schemas.openxmlformats.org/drawingml/2006/main" xmlns:r="http://schemas.openxmlformats.org/officeDocument/2006/relationships" xmlns:p="http://schemas.openxmlformats.org/presentationml/2006/main">
   <p:cSld>
     <p:spTree>
@@ -10009,7 +10507,7 @@
 </p:sld>
 </file>
 
-<file path=ppt/slides/slide37.xml><?xml version="1.0" encoding="utf-8"?>
+<file path=ppt/slides/slide38.xml><?xml version="1.0" encoding="utf-8"?>
 <p:sld xmlns:a="http://schemas.openxmlformats.org/drawingml/2006/main" xmlns:r="http://schemas.openxmlformats.org/officeDocument/2006/relationships" xmlns:p="http://schemas.openxmlformats.org/presentationml/2006/main">
   <p:cSld>
     <p:spTree>
@@ -10106,7 +10604,7 @@
 </p:sld>
 </file>
 
-<file path=ppt/slides/slide38.xml><?xml version="1.0" encoding="utf-8"?>
+<file path=ppt/slides/slide39.xml><?xml version="1.0" encoding="utf-8"?>
 <p:sld xmlns:a="http://schemas.openxmlformats.org/drawingml/2006/main" xmlns:r="http://schemas.openxmlformats.org/officeDocument/2006/relationships" xmlns:p="http://schemas.openxmlformats.org/presentationml/2006/main">
   <p:cSld>
     <p:spTree>
@@ -10203,7 +10701,102 @@
 </p:sld>
 </file>
 
-<file path=ppt/slides/slide39.xml><?xml version="1.0" encoding="utf-8"?>
+<file path=ppt/slides/slide4.xml><?xml version="1.0" encoding="utf-8"?>
+<p:sld xmlns:a="http://schemas.openxmlformats.org/drawingml/2006/main" xmlns:r="http://schemas.openxmlformats.org/officeDocument/2006/relationships" xmlns:p="http://schemas.openxmlformats.org/presentationml/2006/main">
+  <p:cSld>
+    <p:spTree>
+      <p:nvGrpSpPr>
+        <p:cNvPr id="1" name=""/>
+        <p:cNvGrpSpPr/>
+        <p:nvPr/>
+      </p:nvGrpSpPr>
+      <p:grpSpPr>
+        <a:xfrm>
+          <a:off x="0" y="0"/>
+          <a:ext cx="0" cy="0"/>
+          <a:chOff x="0" y="0"/>
+          <a:chExt cx="0" cy="0"/>
+        </a:xfrm>
+      </p:grpSpPr>
+      <p:sp>
+        <p:nvSpPr>
+          <p:cNvPr id="2" name="כותרת 1"/>
+          <p:cNvSpPr>
+            <a:spLocks noGrp="1"/>
+          </p:cNvSpPr>
+          <p:nvPr>
+            <p:ph type="title"/>
+          </p:nvPr>
+        </p:nvSpPr>
+        <p:spPr/>
+        <p:txBody>
+          <a:bodyPr/>
+          <a:lstStyle/>
+          <a:p>
+            <a:pPr algn="r"/>
+            <a:r>
+              <a:rPr lang="he-IL" dirty="0" smtClean="0"/>
+              <a:t>הגדרה</a:t>
+            </a:r>
+            <a:endParaRPr lang="he-IL" dirty="0"/>
+          </a:p>
+        </p:txBody>
+      </p:sp>
+      <p:sp>
+        <p:nvSpPr>
+          <p:cNvPr id="4" name="מציין מיקום תוכן 3"/>
+          <p:cNvSpPr>
+            <a:spLocks noGrp="1"/>
+          </p:cNvSpPr>
+          <p:nvPr>
+            <p:ph idx="1"/>
+          </p:nvPr>
+        </p:nvSpPr>
+        <p:spPr/>
+        <p:txBody>
+          <a:bodyPr/>
+          <a:lstStyle/>
+          <a:p>
+            <a:r>
+              <a:rPr lang="he-IL" dirty="0" smtClean="0"/>
+              <a:t>ניתוח אשכולות היא המשימה של מציאת קבוצות של האיברים ה"דומים" ביותר.</a:t>
+            </a:r>
+          </a:p>
+          <a:p>
+            <a:r>
+              <a:rPr lang="he-IL" dirty="0" smtClean="0"/>
+              <a:t>*להוסיף תמונות*</a:t>
+            </a:r>
+          </a:p>
+          <a:p>
+            <a:endParaRPr lang="he-IL" dirty="0" smtClean="0"/>
+          </a:p>
+          <a:p>
+            <a:endParaRPr lang="he-IL" dirty="0"/>
+          </a:p>
+        </p:txBody>
+      </p:sp>
+    </p:spTree>
+    <p:extLst>
+      <p:ext uri="{BB962C8B-B14F-4D97-AF65-F5344CB8AC3E}">
+        <p14:creationId xmlns:p14="http://schemas.microsoft.com/office/powerpoint/2010/main" val="2040702384"/>
+      </p:ext>
+    </p:extLst>
+  </p:cSld>
+  <p:clrMapOvr>
+    <a:masterClrMapping/>
+  </p:clrMapOvr>
+  <p:timing>
+    <p:tnLst>
+      <p:par>
+        <p:cTn id="1" dur="indefinite" restart="never" nodeType="tmRoot"/>
+      </p:par>
+    </p:tnLst>
+  </p:timing>
+</p:sld>
+</file>
+
+<file path=ppt/slides/slide40.xml><?xml version="1.0" encoding="utf-8"?>
 <p:sld xmlns:a="http://schemas.openxmlformats.org/drawingml/2006/main" xmlns:r="http://schemas.openxmlformats.org/officeDocument/2006/relationships" xmlns:p="http://schemas.openxmlformats.org/presentationml/2006/main">
   <p:cSld>
     <p:spTree>
@@ -10300,102 +10893,7 @@
 </p:sld>
 </file>
 
-<file path=ppt/slides/slide4.xml><?xml version="1.0" encoding="utf-8"?>
-<p:sld xmlns:a="http://schemas.openxmlformats.org/drawingml/2006/main" xmlns:r="http://schemas.openxmlformats.org/officeDocument/2006/relationships" xmlns:p="http://schemas.openxmlformats.org/presentationml/2006/main">
-  <p:cSld>
-    <p:spTree>
-      <p:nvGrpSpPr>
-        <p:cNvPr id="1" name=""/>
-        <p:cNvGrpSpPr/>
-        <p:nvPr/>
-      </p:nvGrpSpPr>
-      <p:grpSpPr>
-        <a:xfrm>
-          <a:off x="0" y="0"/>
-          <a:ext cx="0" cy="0"/>
-          <a:chOff x="0" y="0"/>
-          <a:chExt cx="0" cy="0"/>
-        </a:xfrm>
-      </p:grpSpPr>
-      <p:sp>
-        <p:nvSpPr>
-          <p:cNvPr id="2" name="כותרת 1"/>
-          <p:cNvSpPr>
-            <a:spLocks noGrp="1"/>
-          </p:cNvSpPr>
-          <p:nvPr>
-            <p:ph type="title"/>
-          </p:nvPr>
-        </p:nvSpPr>
-        <p:spPr/>
-        <p:txBody>
-          <a:bodyPr/>
-          <a:lstStyle/>
-          <a:p>
-            <a:pPr algn="r"/>
-            <a:r>
-              <a:rPr lang="he-IL" dirty="0" smtClean="0"/>
-              <a:t>הגדרה</a:t>
-            </a:r>
-            <a:endParaRPr lang="he-IL" dirty="0"/>
-          </a:p>
-        </p:txBody>
-      </p:sp>
-      <p:sp>
-        <p:nvSpPr>
-          <p:cNvPr id="4" name="מציין מיקום תוכן 3"/>
-          <p:cNvSpPr>
-            <a:spLocks noGrp="1"/>
-          </p:cNvSpPr>
-          <p:nvPr>
-            <p:ph idx="1"/>
-          </p:nvPr>
-        </p:nvSpPr>
-        <p:spPr/>
-        <p:txBody>
-          <a:bodyPr/>
-          <a:lstStyle/>
-          <a:p>
-            <a:r>
-              <a:rPr lang="he-IL" dirty="0" smtClean="0"/>
-              <a:t>ניתוח אשכולות היא המשימה של מציאת קבוצות של האיברים ה"דומים" ביותר.</a:t>
-            </a:r>
-          </a:p>
-          <a:p>
-            <a:r>
-              <a:rPr lang="he-IL" dirty="0" smtClean="0"/>
-              <a:t>*להוסיף תמונות*</a:t>
-            </a:r>
-          </a:p>
-          <a:p>
-            <a:endParaRPr lang="he-IL" dirty="0" smtClean="0"/>
-          </a:p>
-          <a:p>
-            <a:endParaRPr lang="he-IL" dirty="0"/>
-          </a:p>
-        </p:txBody>
-      </p:sp>
-    </p:spTree>
-    <p:extLst>
-      <p:ext uri="{BB962C8B-B14F-4D97-AF65-F5344CB8AC3E}">
-        <p14:creationId xmlns:p14="http://schemas.microsoft.com/office/powerpoint/2010/main" val="2040702384"/>
-      </p:ext>
-    </p:extLst>
-  </p:cSld>
-  <p:clrMapOvr>
-    <a:masterClrMapping/>
-  </p:clrMapOvr>
-  <p:timing>
-    <p:tnLst>
-      <p:par>
-        <p:cTn id="1" dur="indefinite" restart="never" nodeType="tmRoot"/>
-      </p:par>
-    </p:tnLst>
-  </p:timing>
-</p:sld>
-</file>
-
-<file path=ppt/slides/slide40.xml><?xml version="1.0" encoding="utf-8"?>
+<file path=ppt/slides/slide41.xml><?xml version="1.0" encoding="utf-8"?>
 <p:sld xmlns:a="http://schemas.openxmlformats.org/drawingml/2006/main" xmlns:r="http://schemas.openxmlformats.org/officeDocument/2006/relationships" xmlns:p="http://schemas.openxmlformats.org/presentationml/2006/main">
   <p:cSld>
     <p:spTree>
@@ -10492,7 +10990,7 @@
 </p:sld>
 </file>
 
-<file path=ppt/slides/slide41.xml><?xml version="1.0" encoding="utf-8"?>
+<file path=ppt/slides/slide42.xml><?xml version="1.0" encoding="utf-8"?>
 <p:sld xmlns:a="http://schemas.openxmlformats.org/drawingml/2006/main" xmlns:r="http://schemas.openxmlformats.org/officeDocument/2006/relationships" xmlns:p="http://schemas.openxmlformats.org/presentationml/2006/main">
   <p:cSld>
     <p:spTree>
@@ -10589,7 +11087,7 @@
 </p:sld>
 </file>
 
-<file path=ppt/slides/slide42.xml><?xml version="1.0" encoding="utf-8"?>
+<file path=ppt/slides/slide43.xml><?xml version="1.0" encoding="utf-8"?>
 <p:sld xmlns:a="http://schemas.openxmlformats.org/drawingml/2006/main" xmlns:r="http://schemas.openxmlformats.org/officeDocument/2006/relationships" xmlns:p="http://schemas.openxmlformats.org/presentationml/2006/main">
   <p:cSld>
     <p:spTree>
@@ -10686,7 +11184,7 @@
 </p:sld>
 </file>
 
-<file path=ppt/slides/slide43.xml><?xml version="1.0" encoding="utf-8"?>
+<file path=ppt/slides/slide44.xml><?xml version="1.0" encoding="utf-8"?>
 <p:sld xmlns:a="http://schemas.openxmlformats.org/drawingml/2006/main" xmlns:r="http://schemas.openxmlformats.org/officeDocument/2006/relationships" xmlns:p="http://schemas.openxmlformats.org/presentationml/2006/main">
   <p:cSld>
     <p:spTree>
@@ -11965,15 +12463,7 @@
             <a:pPr algn="r"/>
             <a:r>
               <a:rPr lang="he-IL" dirty="0" smtClean="0"/>
-              <a:t>למה </a:t>
-            </a:r>
-            <a:r>
-              <a:rPr lang="he-IL" dirty="0" smtClean="0"/>
-              <a:t>קלסטרינג</a:t>
-            </a:r>
-            <a:r>
-              <a:rPr lang="he-IL" dirty="0" smtClean="0"/>
-              <a:t>	 </a:t>
+              <a:t>למה קלסטרינג	 </a:t>
             </a:r>
             <a:endParaRPr lang="he-IL" dirty="0"/>
           </a:p>

</xml_diff>

<commit_message>
Project - add ofer review
</commit_message>
<xml_diff>
--- a/project/presentation.pptx
+++ b/project/presentation.pptx
@@ -292,7 +292,7 @@
           <a:p>
             <a:fld id="{9379FA03-8AAC-48FC-B6D9-12B8EF5D5529}" type="datetimeFigureOut">
               <a:rPr lang="he-IL" smtClean="0"/>
-              <a:t>י"ב/סיון/תשע"ח</a:t>
+              <a:t>ט"ז.סיון.תשע"ח</a:t>
             </a:fld>
             <a:endParaRPr lang="he-IL"/>
           </a:p>
@@ -356,38 +356,37 @@
           <a:p>
             <a:pPr lvl="0"/>
             <a:r>
-              <a:rPr lang="he-IL" smtClean="0"/>
+              <a:rPr lang="he-IL"/>
               <a:t>ערוך סגנונות טקסט של תבנית בסיס</a:t>
             </a:r>
           </a:p>
           <a:p>
             <a:pPr lvl="1"/>
             <a:r>
-              <a:rPr lang="he-IL" smtClean="0"/>
+              <a:rPr lang="he-IL"/>
               <a:t>רמה שניה</a:t>
             </a:r>
           </a:p>
           <a:p>
             <a:pPr lvl="2"/>
             <a:r>
-              <a:rPr lang="he-IL" smtClean="0"/>
+              <a:rPr lang="he-IL"/>
               <a:t>רמה שלישית</a:t>
             </a:r>
           </a:p>
           <a:p>
             <a:pPr lvl="3"/>
             <a:r>
-              <a:rPr lang="he-IL" smtClean="0"/>
+              <a:rPr lang="he-IL"/>
               <a:t>רמה רביעית</a:t>
             </a:r>
           </a:p>
           <a:p>
             <a:pPr lvl="4"/>
             <a:r>
-              <a:rPr lang="he-IL" smtClean="0"/>
+              <a:rPr lang="he-IL"/>
               <a:t>רמה חמישית</a:t>
             </a:r>
-            <a:endParaRPr lang="he-IL"/>
           </a:p>
         </p:txBody>
       </p:sp>
@@ -690,7 +689,7 @@
           </a:lstStyle>
           <a:p>
             <a:r>
-              <a:rPr lang="he-IL" smtClean="0"/>
+              <a:rPr lang="he-IL"/>
               <a:t>לחץ כדי לערוך סגנון כותרת של תבנית בסיס</a:t>
             </a:r>
             <a:endParaRPr lang="en-US" dirty="0"/>
@@ -762,7 +761,7 @@
           </a:lstStyle>
           <a:p>
             <a:r>
-              <a:rPr lang="he-IL" smtClean="0"/>
+              <a:rPr lang="he-IL"/>
               <a:t>לחץ כדי לערוך סגנון כותרת משנה של תבנית בסיס</a:t>
             </a:r>
             <a:endParaRPr lang="en-US" dirty="0"/>
@@ -786,7 +785,7 @@
           <a:p>
             <a:fld id="{92704368-F2E3-4227-9BC5-E56D9C270A35}" type="datetimeFigureOut">
               <a:rPr lang="he-IL" smtClean="0"/>
-              <a:t>י"ב/סיון/תשע"ח</a:t>
+              <a:t>ט"ז.סיון.תשע"ח</a:t>
             </a:fld>
             <a:endParaRPr lang="he-IL"/>
           </a:p>
@@ -918,7 +917,7 @@
           <a:lstStyle/>
           <a:p>
             <a:r>
-              <a:rPr lang="he-IL" smtClean="0"/>
+              <a:rPr lang="he-IL"/>
               <a:t>לחץ כדי לערוך סגנון כותרת של תבנית בסיס</a:t>
             </a:r>
             <a:endParaRPr lang="en-US" dirty="0"/>
@@ -942,35 +941,35 @@
           <a:p>
             <a:pPr lvl="0"/>
             <a:r>
-              <a:rPr lang="he-IL" smtClean="0"/>
+              <a:rPr lang="he-IL"/>
               <a:t>ערוך סגנונות טקסט של תבנית בסיס</a:t>
             </a:r>
           </a:p>
           <a:p>
             <a:pPr lvl="1"/>
             <a:r>
-              <a:rPr lang="he-IL" smtClean="0"/>
+              <a:rPr lang="he-IL"/>
               <a:t>רמה שניה</a:t>
             </a:r>
           </a:p>
           <a:p>
             <a:pPr lvl="2"/>
             <a:r>
-              <a:rPr lang="he-IL" smtClean="0"/>
+              <a:rPr lang="he-IL"/>
               <a:t>רמה שלישית</a:t>
             </a:r>
           </a:p>
           <a:p>
             <a:pPr lvl="3"/>
             <a:r>
-              <a:rPr lang="he-IL" smtClean="0"/>
+              <a:rPr lang="he-IL"/>
               <a:t>רמה רביעית</a:t>
             </a:r>
           </a:p>
           <a:p>
             <a:pPr lvl="4"/>
             <a:r>
-              <a:rPr lang="he-IL" smtClean="0"/>
+              <a:rPr lang="he-IL"/>
               <a:t>רמה חמישית</a:t>
             </a:r>
             <a:endParaRPr lang="en-US" dirty="0"/>
@@ -994,7 +993,7 @@
           <a:p>
             <a:fld id="{92704368-F2E3-4227-9BC5-E56D9C270A35}" type="datetimeFigureOut">
               <a:rPr lang="he-IL" smtClean="0"/>
-              <a:t>י"ב/סיון/תשע"ח</a:t>
+              <a:t>ט"ז.סיון.תשע"ח</a:t>
             </a:fld>
             <a:endParaRPr lang="he-IL"/>
           </a:p>
@@ -1169,7 +1168,7 @@
           <a:lstStyle/>
           <a:p>
             <a:r>
-              <a:rPr lang="he-IL" smtClean="0"/>
+              <a:rPr lang="he-IL"/>
               <a:t>לחץ כדי לערוך סגנון כותרת של תבנית בסיס</a:t>
             </a:r>
             <a:endParaRPr lang="en-US" dirty="0"/>
@@ -1198,35 +1197,35 @@
           <a:p>
             <a:pPr lvl="0"/>
             <a:r>
-              <a:rPr lang="he-IL" smtClean="0"/>
+              <a:rPr lang="he-IL"/>
               <a:t>ערוך סגנונות טקסט של תבנית בסיס</a:t>
             </a:r>
           </a:p>
           <a:p>
             <a:pPr lvl="1"/>
             <a:r>
-              <a:rPr lang="he-IL" smtClean="0"/>
+              <a:rPr lang="he-IL"/>
               <a:t>רמה שניה</a:t>
             </a:r>
           </a:p>
           <a:p>
             <a:pPr lvl="2"/>
             <a:r>
-              <a:rPr lang="he-IL" smtClean="0"/>
+              <a:rPr lang="he-IL"/>
               <a:t>רמה שלישית</a:t>
             </a:r>
           </a:p>
           <a:p>
             <a:pPr lvl="3"/>
             <a:r>
-              <a:rPr lang="he-IL" smtClean="0"/>
+              <a:rPr lang="he-IL"/>
               <a:t>רמה רביעית</a:t>
             </a:r>
           </a:p>
           <a:p>
             <a:pPr lvl="4"/>
             <a:r>
-              <a:rPr lang="he-IL" smtClean="0"/>
+              <a:rPr lang="he-IL"/>
               <a:t>רמה חמישית</a:t>
             </a:r>
             <a:endParaRPr lang="en-US" dirty="0"/>
@@ -1250,7 +1249,7 @@
           <a:p>
             <a:fld id="{92704368-F2E3-4227-9BC5-E56D9C270A35}" type="datetimeFigureOut">
               <a:rPr lang="he-IL" smtClean="0"/>
-              <a:t>י"ב/סיון/תשע"ח</a:t>
+              <a:t>ט"ז.סיון.תשע"ח</a:t>
             </a:fld>
             <a:endParaRPr lang="he-IL"/>
           </a:p>
@@ -1344,7 +1343,7 @@
           <a:lstStyle/>
           <a:p>
             <a:r>
-              <a:rPr lang="he-IL" smtClean="0"/>
+              <a:rPr lang="he-IL"/>
               <a:t>לחץ כדי לערוך סגנון כותרת של תבנית בסיס</a:t>
             </a:r>
             <a:endParaRPr lang="en-US" dirty="0"/>
@@ -1368,35 +1367,35 @@
           <a:p>
             <a:pPr lvl="0"/>
             <a:r>
-              <a:rPr lang="he-IL" smtClean="0"/>
+              <a:rPr lang="he-IL"/>
               <a:t>ערוך סגנונות טקסט של תבנית בסיס</a:t>
             </a:r>
           </a:p>
           <a:p>
             <a:pPr lvl="1"/>
             <a:r>
-              <a:rPr lang="he-IL" smtClean="0"/>
+              <a:rPr lang="he-IL"/>
               <a:t>רמה שניה</a:t>
             </a:r>
           </a:p>
           <a:p>
             <a:pPr lvl="2"/>
             <a:r>
-              <a:rPr lang="he-IL" smtClean="0"/>
+              <a:rPr lang="he-IL"/>
               <a:t>רמה שלישית</a:t>
             </a:r>
           </a:p>
           <a:p>
             <a:pPr lvl="3"/>
             <a:r>
-              <a:rPr lang="he-IL" smtClean="0"/>
+              <a:rPr lang="he-IL"/>
               <a:t>רמה רביעית</a:t>
             </a:r>
           </a:p>
           <a:p>
             <a:pPr lvl="4"/>
             <a:r>
-              <a:rPr lang="he-IL" smtClean="0"/>
+              <a:rPr lang="he-IL"/>
               <a:t>רמה חמישית</a:t>
             </a:r>
             <a:endParaRPr lang="en-US" dirty="0"/>
@@ -1420,7 +1419,7 @@
           <a:p>
             <a:fld id="{92704368-F2E3-4227-9BC5-E56D9C270A35}" type="datetimeFigureOut">
               <a:rPr lang="he-IL" smtClean="0"/>
-              <a:t>י"ב/סיון/תשע"ח</a:t>
+              <a:t>ט"ז.סיון.תשע"ח</a:t>
             </a:fld>
             <a:endParaRPr lang="he-IL"/>
           </a:p>
@@ -1619,7 +1618,7 @@
           </a:lstStyle>
           <a:p>
             <a:r>
-              <a:rPr lang="he-IL" smtClean="0"/>
+              <a:rPr lang="he-IL"/>
               <a:t>לחץ כדי לערוך סגנון כותרת של תבנית בסיס</a:t>
             </a:r>
             <a:endParaRPr lang="en-US" dirty="0"/>
@@ -1740,7 +1739,7 @@
           <a:p>
             <a:pPr lvl="0"/>
             <a:r>
-              <a:rPr lang="he-IL" smtClean="0"/>
+              <a:rPr lang="he-IL"/>
               <a:t>ערוך סגנונות טקסט של תבנית בסיס</a:t>
             </a:r>
           </a:p>
@@ -1763,7 +1762,7 @@
           <a:p>
             <a:fld id="{92704368-F2E3-4227-9BC5-E56D9C270A35}" type="datetimeFigureOut">
               <a:rPr lang="he-IL" smtClean="0"/>
-              <a:t>י"ב/סיון/תשע"ח</a:t>
+              <a:t>ט"ז.סיון.תשע"ח</a:t>
             </a:fld>
             <a:endParaRPr lang="he-IL"/>
           </a:p>
@@ -1900,7 +1899,7 @@
           <a:lstStyle/>
           <a:p>
             <a:r>
-              <a:rPr lang="he-IL" smtClean="0"/>
+              <a:rPr lang="he-IL"/>
               <a:t>לחץ כדי לערוך סגנון כותרת של תבנית בסיס</a:t>
             </a:r>
             <a:endParaRPr lang="en-US" dirty="0"/>
@@ -1929,35 +1928,35 @@
           <a:p>
             <a:pPr lvl="0"/>
             <a:r>
-              <a:rPr lang="he-IL" smtClean="0"/>
+              <a:rPr lang="he-IL"/>
               <a:t>ערוך סגנונות טקסט של תבנית בסיס</a:t>
             </a:r>
           </a:p>
           <a:p>
             <a:pPr lvl="1"/>
             <a:r>
-              <a:rPr lang="he-IL" smtClean="0"/>
+              <a:rPr lang="he-IL"/>
               <a:t>רמה שניה</a:t>
             </a:r>
           </a:p>
           <a:p>
             <a:pPr lvl="2"/>
             <a:r>
-              <a:rPr lang="he-IL" smtClean="0"/>
+              <a:rPr lang="he-IL"/>
               <a:t>רמה שלישית</a:t>
             </a:r>
           </a:p>
           <a:p>
             <a:pPr lvl="3"/>
             <a:r>
-              <a:rPr lang="he-IL" smtClean="0"/>
+              <a:rPr lang="he-IL"/>
               <a:t>רמה רביעית</a:t>
             </a:r>
           </a:p>
           <a:p>
             <a:pPr lvl="4"/>
             <a:r>
-              <a:rPr lang="he-IL" smtClean="0"/>
+              <a:rPr lang="he-IL"/>
               <a:t>רמה חמישית</a:t>
             </a:r>
             <a:endParaRPr lang="en-US" dirty="0"/>
@@ -1986,35 +1985,35 @@
           <a:p>
             <a:pPr lvl="0"/>
             <a:r>
-              <a:rPr lang="he-IL" smtClean="0"/>
+              <a:rPr lang="he-IL"/>
               <a:t>ערוך סגנונות טקסט של תבנית בסיס</a:t>
             </a:r>
           </a:p>
           <a:p>
             <a:pPr lvl="1"/>
             <a:r>
-              <a:rPr lang="he-IL" smtClean="0"/>
+              <a:rPr lang="he-IL"/>
               <a:t>רמה שניה</a:t>
             </a:r>
           </a:p>
           <a:p>
             <a:pPr lvl="2"/>
             <a:r>
-              <a:rPr lang="he-IL" smtClean="0"/>
+              <a:rPr lang="he-IL"/>
               <a:t>רמה שלישית</a:t>
             </a:r>
           </a:p>
           <a:p>
             <a:pPr lvl="3"/>
             <a:r>
-              <a:rPr lang="he-IL" smtClean="0"/>
+              <a:rPr lang="he-IL"/>
               <a:t>רמה רביעית</a:t>
             </a:r>
           </a:p>
           <a:p>
             <a:pPr lvl="4"/>
             <a:r>
-              <a:rPr lang="he-IL" smtClean="0"/>
+              <a:rPr lang="he-IL"/>
               <a:t>רמה חמישית</a:t>
             </a:r>
             <a:endParaRPr lang="en-US" dirty="0"/>
@@ -2038,7 +2037,7 @@
           <a:p>
             <a:fld id="{92704368-F2E3-4227-9BC5-E56D9C270A35}" type="datetimeFigureOut">
               <a:rPr lang="he-IL" smtClean="0"/>
-              <a:t>י"ב/סיון/תשע"ח</a:t>
+              <a:t>ט"ז.סיון.תשע"ח</a:t>
             </a:fld>
             <a:endParaRPr lang="he-IL"/>
           </a:p>
@@ -2137,7 +2136,7 @@
           <a:lstStyle/>
           <a:p>
             <a:r>
-              <a:rPr lang="he-IL" smtClean="0"/>
+              <a:rPr lang="he-IL"/>
               <a:t>לחץ כדי לערוך סגנון כותרת של תבנית בסיס</a:t>
             </a:r>
             <a:endParaRPr lang="en-US" dirty="0"/>
@@ -2209,7 +2208,7 @@
           <a:p>
             <a:pPr lvl="0"/>
             <a:r>
-              <a:rPr lang="he-IL" smtClean="0"/>
+              <a:rPr lang="he-IL"/>
               <a:t>ערוך סגנונות טקסט של תבנית בסיס</a:t>
             </a:r>
           </a:p>
@@ -2237,35 +2236,35 @@
           <a:p>
             <a:pPr lvl="0"/>
             <a:r>
-              <a:rPr lang="he-IL" smtClean="0"/>
+              <a:rPr lang="he-IL"/>
               <a:t>ערוך סגנונות טקסט של תבנית בסיס</a:t>
             </a:r>
           </a:p>
           <a:p>
             <a:pPr lvl="1"/>
             <a:r>
-              <a:rPr lang="he-IL" smtClean="0"/>
+              <a:rPr lang="he-IL"/>
               <a:t>רמה שניה</a:t>
             </a:r>
           </a:p>
           <a:p>
             <a:pPr lvl="2"/>
             <a:r>
-              <a:rPr lang="he-IL" smtClean="0"/>
+              <a:rPr lang="he-IL"/>
               <a:t>רמה שלישית</a:t>
             </a:r>
           </a:p>
           <a:p>
             <a:pPr lvl="3"/>
             <a:r>
-              <a:rPr lang="he-IL" smtClean="0"/>
+              <a:rPr lang="he-IL"/>
               <a:t>רמה רביעית</a:t>
             </a:r>
           </a:p>
           <a:p>
             <a:pPr lvl="4"/>
             <a:r>
-              <a:rPr lang="he-IL" smtClean="0"/>
+              <a:rPr lang="he-IL"/>
               <a:t>רמה חמישית</a:t>
             </a:r>
             <a:endParaRPr lang="en-US" dirty="0"/>
@@ -2337,7 +2336,7 @@
           <a:p>
             <a:pPr lvl="0"/>
             <a:r>
-              <a:rPr lang="he-IL" smtClean="0"/>
+              <a:rPr lang="he-IL"/>
               <a:t>ערוך סגנונות טקסט של תבנית בסיס</a:t>
             </a:r>
           </a:p>
@@ -2365,35 +2364,35 @@
           <a:p>
             <a:pPr lvl="0"/>
             <a:r>
-              <a:rPr lang="he-IL" smtClean="0"/>
+              <a:rPr lang="he-IL"/>
               <a:t>ערוך סגנונות טקסט של תבנית בסיס</a:t>
             </a:r>
           </a:p>
           <a:p>
             <a:pPr lvl="1"/>
             <a:r>
-              <a:rPr lang="he-IL" smtClean="0"/>
+              <a:rPr lang="he-IL"/>
               <a:t>רמה שניה</a:t>
             </a:r>
           </a:p>
           <a:p>
             <a:pPr lvl="2"/>
             <a:r>
-              <a:rPr lang="he-IL" smtClean="0"/>
+              <a:rPr lang="he-IL"/>
               <a:t>רמה שלישית</a:t>
             </a:r>
           </a:p>
           <a:p>
             <a:pPr lvl="3"/>
             <a:r>
-              <a:rPr lang="he-IL" smtClean="0"/>
+              <a:rPr lang="he-IL"/>
               <a:t>רמה רביעית</a:t>
             </a:r>
           </a:p>
           <a:p>
             <a:pPr lvl="4"/>
             <a:r>
-              <a:rPr lang="he-IL" smtClean="0"/>
+              <a:rPr lang="he-IL"/>
               <a:t>רמה חמישית</a:t>
             </a:r>
             <a:endParaRPr lang="en-US" dirty="0"/>
@@ -2417,7 +2416,7 @@
           <a:p>
             <a:fld id="{92704368-F2E3-4227-9BC5-E56D9C270A35}" type="datetimeFigureOut">
               <a:rPr lang="he-IL" smtClean="0"/>
-              <a:t>י"ב/סיון/תשע"ח</a:t>
+              <a:t>ט"ז.סיון.תשע"ח</a:t>
             </a:fld>
             <a:endParaRPr lang="he-IL"/>
           </a:p>
@@ -2511,7 +2510,7 @@
           <a:lstStyle/>
           <a:p>
             <a:r>
-              <a:rPr lang="he-IL" smtClean="0"/>
+              <a:rPr lang="he-IL"/>
               <a:t>לחץ כדי לערוך סגנון כותרת של תבנית בסיס</a:t>
             </a:r>
             <a:endParaRPr lang="en-US" dirty="0"/>
@@ -2535,7 +2534,7 @@
           <a:p>
             <a:fld id="{92704368-F2E3-4227-9BC5-E56D9C270A35}" type="datetimeFigureOut">
               <a:rPr lang="he-IL" smtClean="0"/>
-              <a:t>י"ב/סיון/תשע"ח</a:t>
+              <a:t>ט"ז.סיון.תשע"ח</a:t>
             </a:fld>
             <a:endParaRPr lang="he-IL"/>
           </a:p>
@@ -2706,7 +2705,7 @@
           <a:p>
             <a:fld id="{92704368-F2E3-4227-9BC5-E56D9C270A35}" type="datetimeFigureOut">
               <a:rPr lang="he-IL" smtClean="0"/>
-              <a:t>י"ב/סיון/תשע"ח</a:t>
+              <a:t>ט"ז.סיון.תשע"ח</a:t>
             </a:fld>
             <a:endParaRPr lang="he-IL"/>
           </a:p>
@@ -2899,7 +2898,7 @@
           </a:lstStyle>
           <a:p>
             <a:r>
-              <a:rPr lang="he-IL" smtClean="0"/>
+              <a:rPr lang="he-IL"/>
               <a:t>לחץ כדי לערוך סגנון כותרת של תבנית בסיס</a:t>
             </a:r>
             <a:endParaRPr lang="en-US" dirty="0"/>
@@ -2928,35 +2927,35 @@
           <a:p>
             <a:pPr lvl="0"/>
             <a:r>
-              <a:rPr lang="he-IL" smtClean="0"/>
+              <a:rPr lang="he-IL"/>
               <a:t>ערוך סגנונות טקסט של תבנית בסיס</a:t>
             </a:r>
           </a:p>
           <a:p>
             <a:pPr lvl="1"/>
             <a:r>
-              <a:rPr lang="he-IL" smtClean="0"/>
+              <a:rPr lang="he-IL"/>
               <a:t>רמה שניה</a:t>
             </a:r>
           </a:p>
           <a:p>
             <a:pPr lvl="2"/>
             <a:r>
-              <a:rPr lang="he-IL" smtClean="0"/>
+              <a:rPr lang="he-IL"/>
               <a:t>רמה שלישית</a:t>
             </a:r>
           </a:p>
           <a:p>
             <a:pPr lvl="3"/>
             <a:r>
-              <a:rPr lang="he-IL" smtClean="0"/>
+              <a:rPr lang="he-IL"/>
               <a:t>רמה רביעית</a:t>
             </a:r>
           </a:p>
           <a:p>
             <a:pPr lvl="4"/>
             <a:r>
-              <a:rPr lang="he-IL" smtClean="0"/>
+              <a:rPr lang="he-IL"/>
               <a:t>רמה חמישית</a:t>
             </a:r>
             <a:endParaRPr lang="en-US" dirty="0"/>
@@ -3028,7 +3027,7 @@
           <a:p>
             <a:pPr lvl="0"/>
             <a:r>
-              <a:rPr lang="he-IL" smtClean="0"/>
+              <a:rPr lang="he-IL"/>
               <a:t>ערוך סגנונות טקסט של תבנית בסיס</a:t>
             </a:r>
           </a:p>
@@ -3060,7 +3059,7 @@
           <a:p>
             <a:fld id="{92704368-F2E3-4227-9BC5-E56D9C270A35}" type="datetimeFigureOut">
               <a:rPr lang="he-IL" smtClean="0"/>
-              <a:t>י"ב/סיון/תשע"ח</a:t>
+              <a:t>ט"ז.סיון.תשע"ח</a:t>
             </a:fld>
             <a:endParaRPr lang="he-IL"/>
           </a:p>
@@ -3266,7 +3265,7 @@
           </a:lstStyle>
           <a:p>
             <a:r>
-              <a:rPr lang="he-IL" smtClean="0"/>
+              <a:rPr lang="he-IL"/>
               <a:t>לחץ כדי לערוך סגנון כותרת של תבנית בסיס</a:t>
             </a:r>
             <a:endParaRPr lang="en-US" dirty="0"/>
@@ -3336,7 +3335,7 @@
           </a:lstStyle>
           <a:p>
             <a:r>
-              <a:rPr lang="he-IL" smtClean="0"/>
+              <a:rPr lang="he-IL"/>
               <a:t>לחץ על הסמל כדי להוסיף תמונה</a:t>
             </a:r>
             <a:endParaRPr lang="en-US" dirty="0"/>
@@ -3414,7 +3413,7 @@
           <a:p>
             <a:pPr lvl="0"/>
             <a:r>
-              <a:rPr lang="he-IL" smtClean="0"/>
+              <a:rPr lang="he-IL"/>
               <a:t>ערוך סגנונות טקסט של תבנית בסיס</a:t>
             </a:r>
           </a:p>
@@ -3437,7 +3436,7 @@
           <a:p>
             <a:fld id="{92704368-F2E3-4227-9BC5-E56D9C270A35}" type="datetimeFigureOut">
               <a:rPr lang="he-IL" smtClean="0"/>
-              <a:t>י"ב/סיון/תשע"ח</a:t>
+              <a:t>ט"ז.סיון.תשע"ח</a:t>
             </a:fld>
             <a:endParaRPr lang="he-IL"/>
           </a:p>
@@ -3622,7 +3621,7 @@
           <a:lstStyle/>
           <a:p>
             <a:r>
-              <a:rPr lang="he-IL" smtClean="0"/>
+              <a:rPr lang="he-IL"/>
               <a:t>לחץ כדי לערוך סגנון כותרת של תבנית בסיס</a:t>
             </a:r>
             <a:endParaRPr lang="en-US" dirty="0"/>
@@ -3656,35 +3655,35 @@
           <a:p>
             <a:pPr lvl="0"/>
             <a:r>
-              <a:rPr lang="he-IL" smtClean="0"/>
+              <a:rPr lang="he-IL"/>
               <a:t>ערוך סגנונות טקסט של תבנית בסיס</a:t>
             </a:r>
           </a:p>
           <a:p>
             <a:pPr lvl="1"/>
             <a:r>
-              <a:rPr lang="he-IL" smtClean="0"/>
+              <a:rPr lang="he-IL"/>
               <a:t>רמה שניה</a:t>
             </a:r>
           </a:p>
           <a:p>
             <a:pPr lvl="2"/>
             <a:r>
-              <a:rPr lang="he-IL" smtClean="0"/>
+              <a:rPr lang="he-IL"/>
               <a:t>רמה שלישית</a:t>
             </a:r>
           </a:p>
           <a:p>
             <a:pPr lvl="3"/>
             <a:r>
-              <a:rPr lang="he-IL" smtClean="0"/>
+              <a:rPr lang="he-IL"/>
               <a:t>רמה רביעית</a:t>
             </a:r>
           </a:p>
           <a:p>
             <a:pPr lvl="4"/>
             <a:r>
-              <a:rPr lang="he-IL" smtClean="0"/>
+              <a:rPr lang="he-IL"/>
               <a:t>רמה חמישית</a:t>
             </a:r>
             <a:endParaRPr lang="en-US" dirty="0"/>
@@ -3724,7 +3723,7 @@
           <a:p>
             <a:fld id="{92704368-F2E3-4227-9BC5-E56D9C270A35}" type="datetimeFigureOut">
               <a:rPr lang="he-IL" smtClean="0"/>
-              <a:t>י"ב/סיון/תשע"ח</a:t>
+              <a:t>ט"ז.סיון.תשע"ח</a:t>
             </a:fld>
             <a:endParaRPr lang="he-IL"/>
           </a:p>
@@ -4301,21 +4300,16 @@
             <a:pPr algn="r"/>
             <a:r>
               <a:rPr lang="he-IL" sz="4800" dirty="0"/>
-              <a:t>ניתוח אשכולות </a:t>
-            </a:r>
-            <a:r>
-              <a:rPr lang="he-IL" sz="4800" dirty="0" smtClean="0"/>
-              <a:t>- </a:t>
-            </a:r>
-            <a:r>
-              <a:rPr lang="en-US" sz="4800" dirty="0" smtClean="0"/>
+              <a:t>ניתוח אשכולות - </a:t>
+            </a:r>
+            <a:r>
+              <a:rPr lang="en-US" sz="4800" dirty="0"/>
               <a:t>Clustering</a:t>
             </a:r>
             <a:r>
-              <a:rPr lang="he-IL" sz="4800" dirty="0" smtClean="0"/>
+              <a:rPr lang="he-IL" sz="4800" dirty="0"/>
               <a:t> </a:t>
             </a:r>
-            <a:endParaRPr lang="he-IL" sz="4800" dirty="0"/>
           </a:p>
         </p:txBody>
       </p:sp>
@@ -4341,19 +4335,19 @@
           <a:p>
             <a:pPr algn="r" rtl="0"/>
             <a:r>
-              <a:rPr lang="en-US" dirty="0" err="1" smtClean="0"/>
+              <a:rPr lang="en-US" dirty="0" err="1"/>
               <a:t>Kmeans</a:t>
             </a:r>
             <a:r>
-              <a:rPr lang="en-US" dirty="0" smtClean="0"/>
+              <a:rPr lang="en-US" dirty="0"/>
               <a:t> , </a:t>
             </a:r>
             <a:r>
-              <a:rPr lang="en-US" dirty="0" err="1" smtClean="0"/>
+              <a:rPr lang="en-US" dirty="0" err="1"/>
               <a:t>Cmeans</a:t>
             </a:r>
             <a:r>
-              <a:rPr lang="en-US" dirty="0" smtClean="0"/>
+              <a:rPr lang="en-US" dirty="0"/>
               <a:t>, Gap Statistics.</a:t>
             </a:r>
             <a:endParaRPr lang="he-IL" dirty="0"/>
@@ -4424,13 +4418,6 @@
   <p:clrMapOvr>
     <a:masterClrMapping/>
   </p:clrMapOvr>
-  <p:timing>
-    <p:tnLst>
-      <p:par>
-        <p:cTn id="1" dur="indefinite" restart="never" nodeType="tmRoot"/>
-      </p:par>
-    </p:tnLst>
-  </p:timing>
 </p:sld>
 </file>
 
@@ -5427,10 +5414,9 @@
           <a:p>
             <a:pPr algn="r"/>
             <a:r>
-              <a:rPr lang="he-IL" dirty="0" smtClean="0"/>
+              <a:rPr lang="he-IL" dirty="0"/>
               <a:t>אלגוריתמים שונים	</a:t>
             </a:r>
-            <a:endParaRPr lang="he-IL" dirty="0"/>
           </a:p>
         </p:txBody>
       </p:sp>
@@ -5444,13 +5430,6 @@
   <p:clrMapOvr>
     <a:masterClrMapping/>
   </p:clrMapOvr>
-  <p:timing>
-    <p:tnLst>
-      <p:par>
-        <p:cTn id="1" dur="indefinite" restart="never" nodeType="tmRoot"/>
-      </p:par>
-    </p:tnLst>
-  </p:timing>
 </p:sld>
 </file>
 
@@ -5488,7 +5467,7 @@
           <a:p>
             <a:pPr algn="l" rtl="0"/>
             <a:r>
-              <a:rPr lang="en-US" dirty="0" err="1" smtClean="0"/>
+              <a:rPr lang="en-US" dirty="0" err="1"/>
               <a:t>Kmeans</a:t>
             </a:r>
             <a:endParaRPr lang="he-IL" dirty="0"/>
@@ -5515,12 +5494,8 @@
               <a:buChar char="•"/>
             </a:pPr>
             <a:r>
-              <a:rPr lang="he-IL" dirty="0" smtClean="0"/>
-              <a:t>תיאור אלגוריתם ואופן פעולה</a:t>
-            </a:r>
-            <a:r>
-              <a:rPr lang="he-IL" dirty="0" smtClean="0"/>
-              <a:t>.</a:t>
+              <a:rPr lang="he-IL" dirty="0"/>
+              <a:t>תיאור אלגוריתם ואופן פעולה.</a:t>
             </a:r>
           </a:p>
           <a:p>
@@ -5529,14 +5504,14 @@
               <a:buChar char="•"/>
             </a:pPr>
             <a:r>
-              <a:rPr lang="en-US" dirty="0" err="1" smtClean="0"/>
+              <a:rPr lang="en-US" dirty="0" err="1"/>
               <a:t>Kmeans</a:t>
             </a:r>
             <a:r>
-              <a:rPr lang="en-US" dirty="0" smtClean="0"/>
+              <a:rPr lang="en-US" dirty="0"/>
               <a:t>++</a:t>
             </a:r>
-            <a:endParaRPr lang="he-IL" dirty="0" smtClean="0"/>
+            <a:endParaRPr lang="he-IL" dirty="0"/>
           </a:p>
           <a:p>
             <a:pPr algn="r">
@@ -5544,7 +5519,7 @@
               <a:buChar char="•"/>
             </a:pPr>
             <a:r>
-              <a:rPr lang="he-IL" dirty="0" smtClean="0"/>
+              <a:rPr lang="he-IL" dirty="0"/>
               <a:t>דוגמאות.</a:t>
             </a:r>
           </a:p>
@@ -5553,10 +5528,9 @@
               <a:buNone/>
             </a:pPr>
             <a:r>
-              <a:rPr lang="he-IL" dirty="0" smtClean="0"/>
+              <a:rPr lang="he-IL" dirty="0"/>
               <a:t>  </a:t>
             </a:r>
-            <a:endParaRPr lang="he-IL" dirty="0"/>
           </a:p>
         </p:txBody>
       </p:sp>
@@ -5570,13 +5544,6 @@
   <p:clrMapOvr>
     <a:masterClrMapping/>
   </p:clrMapOvr>
-  <p:timing>
-    <p:tnLst>
-      <p:par>
-        <p:cTn id="1" dur="indefinite" restart="never" nodeType="tmRoot"/>
-      </p:par>
-    </p:tnLst>
-  </p:timing>
 </p:sld>
 </file>
 
@@ -5614,10 +5581,9 @@
           <a:p>
             <a:pPr algn="r"/>
             <a:r>
-              <a:rPr lang="he-IL" dirty="0" smtClean="0"/>
+              <a:rPr lang="he-IL" dirty="0"/>
               <a:t>תיאור אלגוריתם ואופן פעולה</a:t>
             </a:r>
-            <a:endParaRPr lang="he-IL" dirty="0"/>
           </a:p>
         </p:txBody>
       </p:sp>
@@ -5641,31 +5607,23 @@
               <a:lstStyle/>
               <a:p>
                 <a:r>
-                  <a:rPr lang="he-IL" dirty="0" smtClean="0"/>
+                  <a:rPr lang="he-IL" dirty="0"/>
                   <a:t>מציאת </a:t>
                 </a:r>
                 <a:r>
-                  <a:rPr lang="en-US" dirty="0" smtClean="0"/>
+                  <a:rPr lang="en-US" dirty="0"/>
                   <a:t>k</a:t>
                 </a:r>
                 <a:r>
-                  <a:rPr lang="he-IL" dirty="0" smtClean="0"/>
-                  <a:t> אשכולות באופן איטרטיבי על פי מרחק אוקלידי</a:t>
-                </a:r>
-                <a:r>
                   <a:rPr lang="he-IL" dirty="0"/>
-                  <a:t> </a:t>
-                </a:r>
-                <a:r>
-                  <a:rPr lang="he-IL" dirty="0" smtClean="0"/>
-                  <a:t>וצמצום הפונקציה:</a:t>
+                  <a:t> אשכולות באופן איטרטיבי על פי מרחק אוקלידי וצמצום הפונקציה:</a:t>
                 </a:r>
               </a:p>
               <a:p>
                 <a:pPr marL="0" indent="0" algn="l" rtl="0">
                   <a:buNone/>
                 </a:pPr>
-                <a:endParaRPr lang="en-US" b="0" i="1" dirty="0" smtClean="0">
+                <a:endParaRPr lang="en-US" b="0" i="1" dirty="0">
                   <a:latin typeface="Cambria Math" panose="02040503050406030204" pitchFamily="18" charset="0"/>
                 </a:endParaRPr>
               </a:p>
@@ -5898,17 +5856,17 @@
                     </m:oMath>
                   </m:oMathPara>
                 </a14:m>
-                <a:endParaRPr lang="en-US" b="0" dirty="0" smtClean="0"/>
+                <a:endParaRPr lang="en-US" b="0" dirty="0"/>
               </a:p>
               <a:p>
                 <a:pPr marL="0" indent="0" algn="ctr">
                   <a:buNone/>
                 </a:pPr>
                 <a:r>
-                  <a:rPr lang="he-IL" dirty="0" smtClean="0"/>
+                  <a:rPr lang="he-IL" dirty="0"/>
                   <a:t>כאשר:</a:t>
                 </a:r>
-                <a:endParaRPr lang="en-US" dirty="0" smtClean="0"/>
+                <a:endParaRPr lang="en-US" dirty="0"/>
               </a:p>
               <a:p>
                 <a:pPr marL="0" indent="0" algn="l" rtl="0">
@@ -5916,19 +5874,7 @@
                 </a:pPr>
                 <a:r>
                   <a:rPr lang="en-US" dirty="0"/>
-                  <a:t>	</a:t>
-                </a:r>
-                <a:r>
-                  <a:rPr lang="en-US" dirty="0" smtClean="0"/>
-                  <a:t>		</a:t>
-                </a:r>
-                <a:r>
-                  <a:rPr lang="en-US" dirty="0"/>
-                  <a:t> </a:t>
-                </a:r>
-                <a:r>
-                  <a:rPr lang="en-US" dirty="0" smtClean="0"/>
-                  <a:t>          </a:t>
+                  <a:t>			           </a:t>
                 </a:r>
                 <a14:m>
                   <m:oMath xmlns:m="http://schemas.openxmlformats.org/officeDocument/2006/math">
@@ -5999,13 +5945,7 @@
                               <a:rPr lang="en-US" b="0" i="1" smtClean="0">
                                 <a:latin typeface="Cambria Math" panose="02040503050406030204" pitchFamily="18" charset="0"/>
                               </a:rPr>
-                              <m:t>1</m:t>
-                            </m:r>
-                            <m:r>
-                              <a:rPr lang="en-US" b="0" i="1" smtClean="0">
-                                <a:latin typeface="Cambria Math" panose="02040503050406030204" pitchFamily="18" charset="0"/>
-                              </a:rPr>
-                              <m:t>     ,    </m:t>
+                              <m:t>1     ,    </m:t>
                             </m:r>
                             <m:r>
                               <a:rPr lang="en-US" b="0" i="1" smtClean="0">
@@ -6081,13 +6021,7 @@
                               <a:rPr lang="en-US" b="0" i="1" smtClean="0">
                                 <a:latin typeface="Cambria Math" panose="02040503050406030204" pitchFamily="18" charset="0"/>
                               </a:rPr>
-                              <m:t>0</m:t>
-                            </m:r>
-                            <m:r>
-                              <a:rPr lang="en-US" b="0" i="1" smtClean="0">
-                                <a:latin typeface="Cambria Math" panose="02040503050406030204" pitchFamily="18" charset="0"/>
-                              </a:rPr>
-                              <m:t>     ,    </m:t>
+                              <m:t>0     ,    </m:t>
                             </m:r>
                             <m:r>
                               <a:rPr lang="en-US" b="0" i="1" smtClean="0">
@@ -6163,7 +6097,7 @@
                     </m:d>
                   </m:oMath>
                 </a14:m>
-                <a:endParaRPr lang="he-IL" dirty="0" smtClean="0"/>
+                <a:endParaRPr lang="he-IL" dirty="0"/>
               </a:p>
             </p:txBody>
           </p:sp>
@@ -6212,13 +6146,6 @@
   <p:clrMapOvr>
     <a:masterClrMapping/>
   </p:clrMapOvr>
-  <p:timing>
-    <p:tnLst>
-      <p:par>
-        <p:cTn id="1" dur="indefinite" restart="never" nodeType="tmRoot"/>
-      </p:par>
-    </p:tnLst>
-  </p:timing>
 </p:sld>
 </file>
 
@@ -6256,10 +6183,9 @@
           <a:p>
             <a:pPr algn="r"/>
             <a:r>
-              <a:rPr lang="he-IL" dirty="0" smtClean="0"/>
+              <a:rPr lang="he-IL" dirty="0"/>
               <a:t>תיאור אלגוריתם ואופן פעולה</a:t>
             </a:r>
-            <a:endParaRPr lang="he-IL" dirty="0"/>
           </a:p>
         </p:txBody>
       </p:sp>
@@ -6279,7 +6205,7 @@
           <a:lstStyle/>
           <a:p>
             <a:r>
-              <a:rPr lang="he-IL" dirty="0" smtClean="0"/>
+              <a:rPr lang="he-IL" dirty="0"/>
               <a:t>אופן הפעולה:</a:t>
             </a:r>
           </a:p>
@@ -6289,17 +6215,18 @@
               <a:buAutoNum type="arabicPeriod"/>
             </a:pPr>
             <a:r>
-              <a:rPr lang="he-IL" dirty="0" smtClean="0"/>
-              <a:t>הגרל </a:t>
-            </a:r>
-            <a:r>
-              <a:rPr lang="en-US" dirty="0" smtClean="0"/>
+              <a:rPr lang="he-IL" dirty="0"/>
+              <a:t>הכנס </a:t>
+            </a:r>
+            <a:r>
+              <a:rPr lang="en-US" dirty="0"/>
               <a:t>k</a:t>
             </a:r>
             <a:r>
-              <a:rPr lang="he-IL" dirty="0" smtClean="0"/>
-              <a:t> מרכזים.</a:t>
-            </a:r>
+              <a:rPr lang="he-IL" dirty="0"/>
+              <a:t> רצוי.</a:t>
+            </a:r>
+            <a:endParaRPr lang="en-US" dirty="0"/>
           </a:p>
           <a:p>
             <a:pPr marL="914400" lvl="1" indent="-457200">
@@ -6307,8 +6234,16 @@
               <a:buAutoNum type="arabicPeriod"/>
             </a:pPr>
             <a:r>
-              <a:rPr lang="he-IL" dirty="0" smtClean="0"/>
-              <a:t>שייך כל אובייקט למרכז הקרוב ביותר.</a:t>
+              <a:rPr lang="he-IL" dirty="0"/>
+              <a:t>הגרל </a:t>
+            </a:r>
+            <a:r>
+              <a:rPr lang="en-US" dirty="0"/>
+              <a:t>k</a:t>
+            </a:r>
+            <a:r>
+              <a:rPr lang="he-IL" dirty="0"/>
+              <a:t> מרכזים.</a:t>
             </a:r>
           </a:p>
           <a:p>
@@ -6317,8 +6252,8 @@
               <a:buAutoNum type="arabicPeriod"/>
             </a:pPr>
             <a:r>
-              <a:rPr lang="he-IL" dirty="0" smtClean="0"/>
-              <a:t>חשב מחדש את כל המרכזים.</a:t>
+              <a:rPr lang="he-IL" dirty="0"/>
+              <a:t>שייך כל אובייקט למרכז הקרוב ביותר.</a:t>
             </a:r>
           </a:p>
           <a:p>
@@ -6327,8 +6262,8 @@
               <a:buAutoNum type="arabicPeriod"/>
             </a:pPr>
             <a:r>
-              <a:rPr lang="he-IL" dirty="0" smtClean="0"/>
-              <a:t>חזור על צעדים 2 ו 3 עד שהמרכזים אינם משתנים.</a:t>
+              <a:rPr lang="he-IL" dirty="0"/>
+              <a:t>חשב מחדש את כל המרכזים.</a:t>
             </a:r>
           </a:p>
           <a:p>
@@ -6336,7 +6271,17 @@
               <a:buFont typeface="+mj-lt"/>
               <a:buAutoNum type="arabicPeriod"/>
             </a:pPr>
-            <a:endParaRPr lang="he-IL" dirty="0" smtClean="0"/>
+            <a:r>
+              <a:rPr lang="he-IL" dirty="0"/>
+              <a:t>חזור על צעדים 2 ו 3 עד שהמרכזים אינם משתנים.</a:t>
+            </a:r>
+          </a:p>
+          <a:p>
+            <a:pPr marL="914400" lvl="1" indent="-457200">
+              <a:buFont typeface="+mj-lt"/>
+              <a:buAutoNum type="arabicPeriod"/>
+            </a:pPr>
+            <a:endParaRPr lang="he-IL" dirty="0"/>
           </a:p>
           <a:p>
             <a:pPr marL="457200" lvl="1" indent="0">
@@ -6356,13 +6301,6 @@
   <p:clrMapOvr>
     <a:masterClrMapping/>
   </p:clrMapOvr>
-  <p:timing>
-    <p:tnLst>
-      <p:par>
-        <p:cTn id="1" dur="indefinite" restart="never" nodeType="tmRoot"/>
-      </p:par>
-    </p:tnLst>
-  </p:timing>
 </p:sld>
 </file>
 
@@ -6400,11 +6338,11 @@
           <a:p>
             <a:pPr algn="r"/>
             <a:r>
-              <a:rPr lang="en-US" dirty="0" err="1" smtClean="0"/>
+              <a:rPr lang="en-US" dirty="0" err="1"/>
               <a:t>Kmeans</a:t>
             </a:r>
             <a:r>
-              <a:rPr lang="en-US" dirty="0" smtClean="0"/>
+              <a:rPr lang="en-US" dirty="0"/>
               <a:t>++</a:t>
             </a:r>
             <a:endParaRPr lang="he-IL" dirty="0"/>
@@ -6427,41 +6365,39 @@
           <a:lstStyle/>
           <a:p>
             <a:r>
-              <a:rPr lang="he-IL" dirty="0" smtClean="0"/>
+              <a:rPr lang="he-IL" dirty="0"/>
               <a:t>מה יקרה אם נגריל מרכזים קרובים?</a:t>
             </a:r>
           </a:p>
           <a:p>
             <a:r>
-              <a:rPr lang="he-IL" dirty="0" smtClean="0"/>
+              <a:rPr lang="he-IL" dirty="0"/>
               <a:t>מה יקרה אם נגריל מרכזים רחוקים?</a:t>
             </a:r>
-            <a:endParaRPr lang="he-IL" dirty="0"/>
-          </a:p>
-          <a:p>
-            <a:r>
-              <a:rPr lang="he-IL" dirty="0" smtClean="0"/>
+          </a:p>
+          <a:p>
+            <a:r>
+              <a:rPr lang="he-IL" dirty="0"/>
               <a:t>להגרלת המרכזים הראשונה, יש מרכיב חשוב מאוד בזמן התכנסות האלגוריתם ובדיוקו.</a:t>
             </a:r>
           </a:p>
           <a:p>
             <a:r>
-              <a:rPr lang="he-IL" dirty="0" smtClean="0"/>
+              <a:rPr lang="he-IL" dirty="0"/>
               <a:t>על כן נשתמש באלגוריתם </a:t>
             </a:r>
             <a:r>
-              <a:rPr lang="en-US" dirty="0" err="1" smtClean="0"/>
+              <a:rPr lang="en-US" dirty="0" err="1"/>
               <a:t>Kmeans</a:t>
             </a:r>
             <a:r>
-              <a:rPr lang="en-US" dirty="0" smtClean="0"/>
+              <a:rPr lang="en-US" dirty="0"/>
               <a:t>++</a:t>
             </a:r>
             <a:r>
-              <a:rPr lang="he-IL" dirty="0" smtClean="0"/>
+              <a:rPr lang="he-IL" dirty="0"/>
               <a:t> אשר המרכזים נבחרים בו בצורה הבאה:</a:t>
             </a:r>
-            <a:endParaRPr lang="he-IL" dirty="0"/>
           </a:p>
           <a:p>
             <a:pPr marL="457200" indent="-457200">
@@ -6469,7 +6405,7 @@
               <a:buAutoNum type="arabicPeriod"/>
             </a:pPr>
             <a:r>
-              <a:rPr lang="he-IL" dirty="0" smtClean="0"/>
+              <a:rPr lang="he-IL" dirty="0"/>
               <a:t>בחר מרכז.</a:t>
             </a:r>
           </a:p>
@@ -6479,7 +6415,7 @@
               <a:buAutoNum type="arabicPeriod"/>
             </a:pPr>
             <a:r>
-              <a:rPr lang="he-IL" dirty="0" smtClean="0"/>
+              <a:rPr lang="he-IL" dirty="0"/>
               <a:t>משקל את שאר האובייקטים לפי מרחקם מהמרכזים שנבחרו.</a:t>
             </a:r>
           </a:p>
@@ -6489,7 +6425,7 @@
               <a:buAutoNum type="arabicPeriod"/>
             </a:pPr>
             <a:r>
-              <a:rPr lang="he-IL" dirty="0" smtClean="0"/>
+              <a:rPr lang="he-IL" dirty="0"/>
               <a:t>בחר מרכז נוסף באופן הסתברותי לפי המשקל, משקל גבוה יותר הסתברות גבוהה יותר.</a:t>
             </a:r>
           </a:p>
@@ -6499,15 +6435,15 @@
               <a:buAutoNum type="arabicPeriod"/>
             </a:pPr>
             <a:r>
-              <a:rPr lang="he-IL" dirty="0" smtClean="0"/>
+              <a:rPr lang="he-IL" dirty="0"/>
               <a:t>חזור על 2-3 </a:t>
             </a:r>
             <a:r>
-              <a:rPr lang="en-US" dirty="0" smtClean="0"/>
+              <a:rPr lang="en-US" dirty="0"/>
               <a:t>K</a:t>
             </a:r>
             <a:r>
-              <a:rPr lang="he-IL" dirty="0" smtClean="0"/>
+              <a:rPr lang="he-IL" dirty="0"/>
               <a:t> פעמים.</a:t>
             </a:r>
           </a:p>
@@ -6516,7 +6452,7 @@
               <a:buFont typeface="+mj-lt"/>
               <a:buAutoNum type="arabicPeriod"/>
             </a:pPr>
-            <a:endParaRPr lang="he-IL" dirty="0" smtClean="0"/>
+            <a:endParaRPr lang="he-IL" dirty="0"/>
           </a:p>
         </p:txBody>
       </p:sp>
@@ -6530,13 +6466,6 @@
   <p:clrMapOvr>
     <a:masterClrMapping/>
   </p:clrMapOvr>
-  <p:timing>
-    <p:tnLst>
-      <p:par>
-        <p:cTn id="1" dur="indefinite" restart="never" nodeType="tmRoot"/>
-      </p:par>
-    </p:tnLst>
-  </p:timing>
 </p:sld>
 </file>
 
@@ -6640,11 +6569,11 @@
           <a:lstStyle/>
           <a:p>
             <a:r>
-              <a:rPr lang="en-US" dirty="0" err="1" smtClean="0"/>
+              <a:rPr lang="en-US" dirty="0" err="1"/>
               <a:t>kmeans</a:t>
             </a:r>
             <a:r>
-              <a:rPr lang="en-US" dirty="0" smtClean="0"/>
+              <a:rPr lang="en-US" dirty="0"/>
               <a:t>++</a:t>
             </a:r>
             <a:endParaRPr lang="he-IL" dirty="0"/>
@@ -6674,7 +6603,7 @@
           <a:lstStyle/>
           <a:p>
             <a:r>
-              <a:rPr lang="en-US" dirty="0" err="1" smtClean="0"/>
+              <a:rPr lang="en-US" dirty="0" err="1"/>
               <a:t>kmeans</a:t>
             </a:r>
             <a:endParaRPr lang="he-IL" dirty="0"/>
@@ -6725,31 +6654,31 @@
           <a:p>
             <a:pPr algn="r"/>
             <a:r>
-              <a:rPr lang="he-IL" sz="4000" dirty="0" smtClean="0"/>
+              <a:rPr lang="he-IL" sz="4000" dirty="0"/>
               <a:t>השוואה בין </a:t>
             </a:r>
             <a:r>
-              <a:rPr lang="en-US" sz="4000" dirty="0" err="1" smtClean="0"/>
+              <a:rPr lang="en-US" sz="4000" dirty="0" err="1"/>
               <a:t>kmeans</a:t>
             </a:r>
             <a:r>
-              <a:rPr lang="he-IL" sz="4000" dirty="0" smtClean="0"/>
+              <a:rPr lang="he-IL" sz="4000" dirty="0"/>
               <a:t> ל</a:t>
             </a:r>
             <a:r>
-              <a:rPr lang="en-US" sz="4000" dirty="0" smtClean="0"/>
+              <a:rPr lang="en-US" sz="4000" dirty="0"/>
               <a:t>-</a:t>
             </a:r>
             <a:r>
-              <a:rPr lang="he-IL" sz="4000" dirty="0" smtClean="0"/>
+              <a:rPr lang="he-IL" sz="4000" dirty="0"/>
               <a:t> </a:t>
             </a:r>
             <a:r>
-              <a:rPr lang="en-US" sz="4000" dirty="0" err="1" smtClean="0"/>
+              <a:rPr lang="en-US" sz="4000" dirty="0" err="1"/>
               <a:t>kmeans</a:t>
             </a:r>
             <a:r>
-              <a:rPr lang="en-US" sz="4000" dirty="0" smtClean="0"/>
+              <a:rPr lang="en-US" sz="4000" dirty="0"/>
               <a:t>++</a:t>
             </a:r>
             <a:endParaRPr lang="he-IL" sz="4000" dirty="0"/>
@@ -6803,10 +6732,9 @@
           <a:p>
             <a:pPr algn="r"/>
             <a:r>
-              <a:rPr lang="he-IL" dirty="0" smtClean="0"/>
+              <a:rPr lang="he-IL" dirty="0"/>
               <a:t>דוגמת ריצה	</a:t>
             </a:r>
-            <a:endParaRPr lang="he-IL" dirty="0"/>
           </a:p>
         </p:txBody>
       </p:sp>
@@ -6829,25 +6757,16 @@
               <a:buNone/>
             </a:pPr>
             <a:r>
-              <a:rPr lang="he-IL" dirty="0" smtClean="0"/>
-              <a:t>מסד נתונים:</a:t>
-            </a:r>
-            <a:r>
               <a:rPr lang="he-IL" dirty="0"/>
-              <a:t> </a:t>
-            </a:r>
-            <a:r>
-              <a:rPr lang="he-IL" dirty="0" smtClean="0"/>
-              <a:t>יין</a:t>
-            </a:r>
-            <a:endParaRPr lang="he-IL" dirty="0"/>
+              <a:t>מסד נתונים: יין</a:t>
+            </a:r>
           </a:p>
           <a:p>
             <a:pPr marL="0" indent="0">
               <a:buNone/>
             </a:pPr>
             <a:r>
-              <a:rPr lang="he-IL" dirty="0" smtClean="0"/>
+              <a:rPr lang="he-IL" dirty="0"/>
               <a:t>תיאור: ניתוח כימי של יינות איטלקיים העשויים משלושה זנים.</a:t>
             </a:r>
           </a:p>
@@ -6856,23 +6775,23 @@
               <a:buNone/>
             </a:pPr>
             <a:r>
-              <a:rPr lang="he-IL" dirty="0" smtClean="0"/>
+              <a:rPr lang="he-IL" dirty="0"/>
               <a:t>מאפיינים שונים: 13 (אחוז אלכוהול, חומצה </a:t>
             </a:r>
             <a:r>
-              <a:rPr lang="he-IL" dirty="0" err="1" smtClean="0"/>
+              <a:rPr lang="he-IL" dirty="0" err="1"/>
               <a:t>מאלית</a:t>
             </a:r>
             <a:r>
-              <a:rPr lang="he-IL" dirty="0" smtClean="0"/>
+              <a:rPr lang="he-IL" dirty="0"/>
               <a:t>, מגנזיום </a:t>
             </a:r>
             <a:r>
-              <a:rPr lang="he-IL" dirty="0" err="1" smtClean="0"/>
+              <a:rPr lang="he-IL" dirty="0" err="1"/>
               <a:t>וכו</a:t>
             </a:r>
             <a:r>
-              <a:rPr lang="he-IL" dirty="0" smtClean="0"/>
+              <a:rPr lang="he-IL" dirty="0"/>
               <a:t>'...)</a:t>
             </a:r>
           </a:p>
@@ -6881,15 +6800,15 @@
               <a:buNone/>
             </a:pPr>
             <a:r>
-              <a:rPr lang="he-IL" dirty="0" smtClean="0"/>
+              <a:rPr lang="he-IL" dirty="0"/>
               <a:t>מספר אשכולות צפוי:</a:t>
             </a:r>
             <a:r>
-              <a:rPr lang="en-US" dirty="0" smtClean="0"/>
+              <a:rPr lang="en-US" dirty="0"/>
               <a:t> </a:t>
             </a:r>
             <a:r>
-              <a:rPr lang="he-IL" dirty="0" smtClean="0"/>
+              <a:rPr lang="he-IL" dirty="0"/>
               <a:t>3.</a:t>
             </a:r>
           </a:p>
@@ -6897,13 +6816,13 @@
             <a:pPr marL="0" indent="0">
               <a:buNone/>
             </a:pPr>
-            <a:endParaRPr lang="he-IL" dirty="0" smtClean="0"/>
+            <a:endParaRPr lang="he-IL" dirty="0"/>
           </a:p>
           <a:p>
             <a:pPr marL="0" indent="0">
               <a:buNone/>
             </a:pPr>
-            <a:endParaRPr lang="he-IL" dirty="0" smtClean="0"/>
+            <a:endParaRPr lang="he-IL" dirty="0"/>
           </a:p>
         </p:txBody>
       </p:sp>
@@ -6917,13 +6836,6 @@
   <p:clrMapOvr>
     <a:masterClrMapping/>
   </p:clrMapOvr>
-  <p:timing>
-    <p:tnLst>
-      <p:par>
-        <p:cTn id="1" dur="indefinite" restart="never" nodeType="tmRoot"/>
-      </p:par>
-    </p:tnLst>
-  </p:timing>
 </p:sld>
 </file>
 
@@ -6961,10 +6873,9 @@
           <a:p>
             <a:pPr algn="r"/>
             <a:r>
-              <a:rPr lang="he-IL" dirty="0" smtClean="0"/>
+              <a:rPr lang="he-IL" dirty="0"/>
               <a:t>אתחול</a:t>
             </a:r>
-            <a:endParaRPr lang="he-IL" dirty="0"/>
           </a:p>
         </p:txBody>
       </p:sp>
@@ -7008,13 +6919,6 @@
   <p:clrMapOvr>
     <a:masterClrMapping/>
   </p:clrMapOvr>
-  <p:timing>
-    <p:tnLst>
-      <p:par>
-        <p:cTn id="1" dur="indefinite" restart="never" nodeType="tmRoot"/>
-      </p:par>
-    </p:tnLst>
-  </p:timing>
 </p:sld>
 </file>
 
@@ -7089,7 +6993,7 @@
           <a:p>
             <a:pPr algn="l" rtl="0"/>
             <a:r>
-              <a:rPr lang="en-US" dirty="0" smtClean="0"/>
+              <a:rPr lang="en-US" dirty="0"/>
               <a:t>Iteration 1</a:t>
             </a:r>
           </a:p>
@@ -7105,13 +7009,6 @@
   <p:clrMapOvr>
     <a:masterClrMapping/>
   </p:clrMapOvr>
-  <p:timing>
-    <p:tnLst>
-      <p:par>
-        <p:cTn id="1" dur="indefinite" restart="never" nodeType="tmRoot"/>
-      </p:par>
-    </p:tnLst>
-  </p:timing>
 </p:sld>
 </file>
 
@@ -7186,7 +7083,7 @@
           <a:p>
             <a:pPr algn="l" rtl="0"/>
             <a:r>
-              <a:rPr lang="en-US" dirty="0" smtClean="0"/>
+              <a:rPr lang="en-US" dirty="0"/>
               <a:t>Iteration 2</a:t>
             </a:r>
           </a:p>
@@ -7202,13 +7099,6 @@
   <p:clrMapOvr>
     <a:masterClrMapping/>
   </p:clrMapOvr>
-  <p:timing>
-    <p:tnLst>
-      <p:par>
-        <p:cTn id="1" dur="indefinite" restart="never" nodeType="tmRoot"/>
-      </p:par>
-    </p:tnLst>
-  </p:timing>
 </p:sld>
 </file>
 
@@ -7246,7 +7136,7 @@
           <a:p>
             <a:pPr algn="l" rtl="0"/>
             <a:r>
-              <a:rPr lang="en-US" dirty="0" smtClean="0"/>
+              <a:rPr lang="en-US" dirty="0"/>
               <a:t>Clustering</a:t>
             </a:r>
             <a:endParaRPr lang="he-IL" dirty="0"/>
@@ -7269,34 +7159,33 @@
           <a:lstStyle/>
           <a:p>
             <a:r>
-              <a:rPr lang="he-IL" dirty="0" smtClean="0"/>
+              <a:rPr lang="he-IL" dirty="0"/>
               <a:t>רקע</a:t>
             </a:r>
           </a:p>
           <a:p>
             <a:r>
-              <a:rPr lang="he-IL" dirty="0" smtClean="0"/>
+              <a:rPr lang="he-IL" dirty="0"/>
               <a:t>קשיים</a:t>
             </a:r>
           </a:p>
           <a:p>
             <a:r>
-              <a:rPr lang="he-IL" dirty="0" smtClean="0"/>
+              <a:rPr lang="he-IL" dirty="0"/>
               <a:t>הגדרה</a:t>
             </a:r>
           </a:p>
           <a:p>
             <a:r>
-              <a:rPr lang="he-IL" dirty="0" smtClean="0"/>
+              <a:rPr lang="he-IL" dirty="0"/>
               <a:t>למה קלסטרינג</a:t>
             </a:r>
           </a:p>
           <a:p>
             <a:r>
-              <a:rPr lang="he-IL" dirty="0" smtClean="0"/>
+              <a:rPr lang="he-IL" dirty="0"/>
               <a:t>אלגוריתמים שונים</a:t>
             </a:r>
-            <a:endParaRPr lang="he-IL" dirty="0"/>
           </a:p>
         </p:txBody>
       </p:sp>
@@ -7310,21 +7199,6 @@
   <p:clrMapOvr>
     <a:masterClrMapping/>
   </p:clrMapOvr>
-  <mc:AlternateContent xmlns:mc="http://schemas.openxmlformats.org/markup-compatibility/2006" xmlns:p14="http://schemas.microsoft.com/office/powerpoint/2010/main">
-    <mc:Choice Requires="p14">
-      <p:transition p14:dur="0"/>
-    </mc:Choice>
-    <mc:Fallback xmlns="">
-      <p:transition/>
-    </mc:Fallback>
-  </mc:AlternateContent>
-  <p:timing>
-    <p:tnLst>
-      <p:par>
-        <p:cTn id="1" dur="indefinite" restart="never" nodeType="tmRoot"/>
-      </p:par>
-    </p:tnLst>
-  </p:timing>
 </p:sld>
 </file>
 
@@ -7399,7 +7273,7 @@
           <a:p>
             <a:pPr algn="l" rtl="0"/>
             <a:r>
-              <a:rPr lang="en-US" dirty="0" smtClean="0"/>
+              <a:rPr lang="en-US" dirty="0"/>
               <a:t>Iteration 3</a:t>
             </a:r>
           </a:p>
@@ -7415,13 +7289,6 @@
   <p:clrMapOvr>
     <a:masterClrMapping/>
   </p:clrMapOvr>
-  <p:timing>
-    <p:tnLst>
-      <p:par>
-        <p:cTn id="1" dur="indefinite" restart="never" nodeType="tmRoot"/>
-      </p:par>
-    </p:tnLst>
-  </p:timing>
 </p:sld>
 </file>
 
@@ -7496,7 +7363,7 @@
           <a:p>
             <a:pPr algn="l" rtl="0"/>
             <a:r>
-              <a:rPr lang="en-US" dirty="0" smtClean="0"/>
+              <a:rPr lang="en-US" dirty="0"/>
               <a:t>Iteration 4</a:t>
             </a:r>
           </a:p>
@@ -7512,13 +7379,6 @@
   <p:clrMapOvr>
     <a:masterClrMapping/>
   </p:clrMapOvr>
-  <p:timing>
-    <p:tnLst>
-      <p:par>
-        <p:cTn id="1" dur="indefinite" restart="never" nodeType="tmRoot"/>
-      </p:par>
-    </p:tnLst>
-  </p:timing>
 </p:sld>
 </file>
 
@@ -7593,7 +7453,7 @@
           <a:p>
             <a:pPr algn="l" rtl="0"/>
             <a:r>
-              <a:rPr lang="en-US" dirty="0" smtClean="0"/>
+              <a:rPr lang="en-US" dirty="0"/>
               <a:t>Iteration 5</a:t>
             </a:r>
           </a:p>
@@ -7609,13 +7469,6 @@
   <p:clrMapOvr>
     <a:masterClrMapping/>
   </p:clrMapOvr>
-  <p:timing>
-    <p:tnLst>
-      <p:par>
-        <p:cTn id="1" dur="indefinite" restart="never" nodeType="tmRoot"/>
-      </p:par>
-    </p:tnLst>
-  </p:timing>
 </p:sld>
 </file>
 
@@ -7690,7 +7543,7 @@
           <a:p>
             <a:pPr algn="l" rtl="0"/>
             <a:r>
-              <a:rPr lang="en-US" dirty="0" smtClean="0"/>
+              <a:rPr lang="en-US" dirty="0"/>
               <a:t>Iteration 6 – final</a:t>
             </a:r>
           </a:p>
@@ -7706,13 +7559,6 @@
   <p:clrMapOvr>
     <a:masterClrMapping/>
   </p:clrMapOvr>
-  <p:timing>
-    <p:tnLst>
-      <p:par>
-        <p:cTn id="1" dur="indefinite" restart="never" nodeType="tmRoot"/>
-      </p:par>
-    </p:tnLst>
-  </p:timing>
 </p:sld>
 </file>
 
@@ -7750,7 +7596,7 @@
           <a:p>
             <a:pPr algn="l" rtl="0"/>
             <a:r>
-              <a:rPr lang="en-US" dirty="0" smtClean="0"/>
+              <a:rPr lang="en-US" dirty="0"/>
               <a:t>Gap Statistics.</a:t>
             </a:r>
             <a:endParaRPr lang="he-IL" dirty="0"/>
@@ -7774,21 +7620,21 @@
           <a:p>
             <a:pPr algn="r"/>
             <a:r>
-              <a:rPr lang="he-IL" dirty="0" smtClean="0"/>
+              <a:rPr lang="he-IL" dirty="0"/>
               <a:t>תיאור אלגוריתם ואופן פעולה.</a:t>
             </a:r>
           </a:p>
           <a:p>
             <a:pPr algn="r"/>
             <a:r>
-              <a:rPr lang="he-IL" dirty="0" smtClean="0"/>
+              <a:rPr lang="he-IL" dirty="0"/>
               <a:t>הוכחת היתכנות.</a:t>
             </a:r>
           </a:p>
           <a:p>
             <a:pPr algn="r"/>
             <a:r>
-              <a:rPr lang="he-IL" dirty="0" smtClean="0"/>
+              <a:rPr lang="he-IL" dirty="0"/>
               <a:t>דוגמאות.</a:t>
             </a:r>
           </a:p>
@@ -7797,10 +7643,9 @@
               <a:buNone/>
             </a:pPr>
             <a:r>
-              <a:rPr lang="he-IL" dirty="0" smtClean="0"/>
+              <a:rPr lang="he-IL" dirty="0"/>
               <a:t>  </a:t>
             </a:r>
-            <a:endParaRPr lang="he-IL" dirty="0"/>
           </a:p>
         </p:txBody>
       </p:sp>
@@ -7814,13 +7659,6 @@
   <p:clrMapOvr>
     <a:masterClrMapping/>
   </p:clrMapOvr>
-  <p:timing>
-    <p:tnLst>
-      <p:par>
-        <p:cTn id="1" dur="indefinite" restart="never" nodeType="tmRoot"/>
-      </p:par>
-    </p:tnLst>
-  </p:timing>
 </p:sld>
 </file>
 
@@ -7858,10 +7696,9 @@
           <a:p>
             <a:pPr algn="r"/>
             <a:r>
-              <a:rPr lang="he-IL" dirty="0" smtClean="0"/>
+              <a:rPr lang="he-IL" dirty="0"/>
               <a:t>תיאור אלגוריתם ואופן פעולה</a:t>
             </a:r>
-            <a:endParaRPr lang="he-IL" dirty="0"/>
           </a:p>
         </p:txBody>
       </p:sp>
@@ -7890,15 +7727,15 @@
                   </a:lnSpc>
                 </a:pPr>
                 <a:r>
-                  <a:rPr lang="he-IL" dirty="0" smtClean="0"/>
+                  <a:rPr lang="he-IL" dirty="0"/>
                   <a:t>מציאת מספר האשכולות – </a:t>
                 </a:r>
                 <a:r>
-                  <a:rPr lang="en-US" dirty="0" smtClean="0"/>
+                  <a:rPr lang="en-US" dirty="0"/>
                   <a:t>k</a:t>
                 </a:r>
                 <a:r>
-                  <a:rPr lang="he-IL" dirty="0" smtClean="0"/>
+                  <a:rPr lang="he-IL" dirty="0"/>
                   <a:t> אשר ימקסם את הפונקציה:</a:t>
                 </a:r>
               </a:p>
@@ -8105,7 +7942,7 @@
                     </m:oMath>
                   </m:oMathPara>
                 </a14:m>
-                <a:endParaRPr lang="en-US" b="0" dirty="0" smtClean="0"/>
+                <a:endParaRPr lang="en-US" b="0" dirty="0"/>
               </a:p>
               <a:p>
                 <a:pPr marL="0" indent="0" algn="l" rtl="0">
@@ -8358,7 +8195,7 @@
                     </m:oMath>
                   </m:oMathPara>
                 </a14:m>
-                <a:endParaRPr lang="he-IL" b="0" i="1" dirty="0" smtClean="0">
+                <a:endParaRPr lang="he-IL" b="0" i="1" dirty="0">
                   <a:latin typeface="Cambria Math" panose="02040503050406030204" pitchFamily="18" charset="0"/>
                 </a:endParaRPr>
               </a:p>
@@ -8434,7 +8271,7 @@
                   </m:oMath>
                 </a14:m>
                 <a:r>
-                  <a:rPr lang="he-IL" dirty="0" smtClean="0"/>
+                  <a:rPr lang="he-IL" dirty="0"/>
                   <a:t> - נקבע ע"י שיטת מונטה קרלו.</a:t>
                 </a:r>
               </a:p>
@@ -8493,13 +8330,6 @@
   <p:clrMapOvr>
     <a:masterClrMapping/>
   </p:clrMapOvr>
-  <p:timing>
-    <p:tnLst>
-      <p:par>
-        <p:cTn id="1" dur="indefinite" restart="never" nodeType="tmRoot"/>
-      </p:par>
-    </p:tnLst>
-  </p:timing>
 </p:sld>
 </file>
 
@@ -8537,10 +8367,9 @@
           <a:p>
             <a:pPr algn="r"/>
             <a:r>
-              <a:rPr lang="he-IL" dirty="0" smtClean="0"/>
+              <a:rPr lang="he-IL" dirty="0"/>
               <a:t>שיטת מונטה קרלו</a:t>
             </a:r>
-            <a:endParaRPr lang="he-IL" dirty="0"/>
           </a:p>
         </p:txBody>
       </p:sp>
@@ -8562,15 +8391,15 @@
           <a:lstStyle/>
           <a:p>
             <a:r>
-              <a:rPr lang="he-IL" dirty="0" smtClean="0"/>
+              <a:rPr lang="he-IL" dirty="0"/>
               <a:t>שיערוך פתרון לבעיות חישוביות באמצעות מספרים </a:t>
             </a:r>
             <a:r>
-              <a:rPr lang="he-IL" dirty="0" err="1" smtClean="0"/>
+              <a:rPr lang="he-IL" dirty="0" err="1"/>
               <a:t>רנדומלים</a:t>
             </a:r>
             <a:r>
-              <a:rPr lang="he-IL" dirty="0" smtClean="0"/>
+              <a:rPr lang="he-IL" dirty="0"/>
               <a:t>.</a:t>
             </a:r>
           </a:p>
@@ -8584,7 +8413,7 @@
             <a:pPr marL="0" indent="0">
               <a:buNone/>
             </a:pPr>
-            <a:endParaRPr lang="he-IL" dirty="0" smtClean="0"/>
+            <a:endParaRPr lang="he-IL" dirty="0"/>
           </a:p>
           <a:p>
             <a:pPr marL="0" indent="0">
@@ -8596,7 +8425,7 @@
             <a:pPr marL="0" indent="0">
               <a:buNone/>
             </a:pPr>
-            <a:endParaRPr lang="he-IL" dirty="0" smtClean="0"/>
+            <a:endParaRPr lang="he-IL" dirty="0"/>
           </a:p>
           <a:p>
             <a:endParaRPr lang="he-IL" dirty="0"/>
@@ -8643,13 +8472,6 @@
   <p:clrMapOvr>
     <a:masterClrMapping/>
   </p:clrMapOvr>
-  <p:timing>
-    <p:tnLst>
-      <p:par>
-        <p:cTn id="1" dur="indefinite" restart="never" nodeType="tmRoot"/>
-      </p:par>
-    </p:tnLst>
-  </p:timing>
 </p:sld>
 </file>
 
@@ -8687,10 +8509,9 @@
           <a:p>
             <a:pPr algn="r"/>
             <a:r>
-              <a:rPr lang="he-IL" dirty="0" smtClean="0"/>
+              <a:rPr lang="he-IL" dirty="0"/>
               <a:t>שיטת מונטה קרלו</a:t>
             </a:r>
-            <a:endParaRPr lang="he-IL" dirty="0"/>
           </a:p>
         </p:txBody>
       </p:sp>
@@ -8717,15 +8538,15 @@
               </a:lnSpc>
             </a:pPr>
             <a:r>
-              <a:rPr lang="he-IL" dirty="0" smtClean="0"/>
+              <a:rPr lang="he-IL" dirty="0"/>
               <a:t>על מנת לשערך את סכום המשקלים הפנימיים ה"מצופה" של </a:t>
             </a:r>
             <a:r>
-              <a:rPr lang="en-US" dirty="0" smtClean="0"/>
+              <a:rPr lang="en-US" dirty="0"/>
               <a:t>k</a:t>
             </a:r>
             <a:r>
-              <a:rPr lang="he-IL" dirty="0" smtClean="0"/>
+              <a:rPr lang="he-IL" dirty="0"/>
               <a:t> אשכולות על מרחב מסוים של נתונים נשתמש בשיטת מונטה קרלו.</a:t>
             </a:r>
           </a:p>
@@ -8736,7 +8557,7 @@
               </a:lnSpc>
             </a:pPr>
             <a:r>
-              <a:rPr lang="he-IL" dirty="0" smtClean="0"/>
+              <a:rPr lang="he-IL" dirty="0"/>
               <a:t>אופן הפעולה:</a:t>
             </a:r>
           </a:p>
@@ -8749,7 +8570,7 @@
               <a:buAutoNum type="arabicPeriod"/>
             </a:pPr>
             <a:r>
-              <a:rPr lang="he-IL" dirty="0" smtClean="0"/>
+              <a:rPr lang="he-IL" dirty="0"/>
               <a:t>נגריל אובייקטים באופן אחיד בגבולות מרחב הנתונים.</a:t>
             </a:r>
           </a:p>
@@ -8762,15 +8583,15 @@
               <a:buAutoNum type="arabicPeriod"/>
             </a:pPr>
             <a:r>
-              <a:rPr lang="he-IL" dirty="0" smtClean="0"/>
+              <a:rPr lang="he-IL" dirty="0"/>
               <a:t>נריץ </a:t>
             </a:r>
             <a:r>
-              <a:rPr lang="en-US" dirty="0" err="1" smtClean="0"/>
+              <a:rPr lang="en-US" dirty="0" err="1"/>
               <a:t>Kmeans</a:t>
             </a:r>
             <a:r>
-              <a:rPr lang="he-IL" dirty="0" smtClean="0"/>
+              <a:rPr lang="he-IL" dirty="0"/>
               <a:t> על הנתונים שהוגרלו.</a:t>
             </a:r>
           </a:p>
@@ -8783,7 +8604,7 @@
               <a:buAutoNum type="arabicPeriod"/>
             </a:pPr>
             <a:r>
-              <a:rPr lang="he-IL" dirty="0" smtClean="0"/>
+              <a:rPr lang="he-IL" dirty="0"/>
               <a:t>נחשב משקלים פנימיים עם האשכולות שקיבלנו.</a:t>
             </a:r>
           </a:p>
@@ -8796,23 +8617,23 @@
               <a:buAutoNum type="arabicPeriod"/>
             </a:pPr>
             <a:r>
-              <a:rPr lang="he-IL" dirty="0" smtClean="0"/>
+              <a:rPr lang="he-IL" dirty="0"/>
               <a:t>נבצע את 1-3 </a:t>
             </a:r>
             <a:r>
-              <a:rPr lang="en-US" dirty="0" smtClean="0"/>
+              <a:rPr lang="en-US" dirty="0"/>
               <a:t>n</a:t>
             </a:r>
             <a:r>
-              <a:rPr lang="he-IL" dirty="0" smtClean="0"/>
+              <a:rPr lang="he-IL" dirty="0"/>
               <a:t> </a:t>
             </a:r>
             <a:r>
-              <a:rPr lang="he-IL" dirty="0" err="1" smtClean="0"/>
+              <a:rPr lang="he-IL" dirty="0" err="1"/>
               <a:t>איטרציות</a:t>
             </a:r>
             <a:r>
-              <a:rPr lang="he-IL" dirty="0" smtClean="0"/>
+              <a:rPr lang="he-IL" dirty="0"/>
               <a:t>.</a:t>
             </a:r>
           </a:p>
@@ -8825,7 +8646,7 @@
               <a:buAutoNum type="arabicPeriod"/>
             </a:pPr>
             <a:r>
-              <a:rPr lang="he-IL" dirty="0" smtClean="0"/>
+              <a:rPr lang="he-IL" dirty="0"/>
               <a:t>נחזיר את ממוצע המשקלים הפנימיים.</a:t>
             </a:r>
           </a:p>
@@ -8836,15 +8657,15 @@
               </a:lnSpc>
             </a:pPr>
             <a:r>
-              <a:rPr lang="he-IL" dirty="0" smtClean="0"/>
+              <a:rPr lang="he-IL" dirty="0"/>
               <a:t>את השלבים 1-5 נעשה לכל </a:t>
             </a:r>
             <a:r>
-              <a:rPr lang="en-US" dirty="0" smtClean="0"/>
+              <a:rPr lang="en-US" dirty="0"/>
               <a:t>k</a:t>
             </a:r>
             <a:r>
-              <a:rPr lang="he-IL" dirty="0" smtClean="0"/>
+              <a:rPr lang="he-IL" dirty="0"/>
               <a:t> בטווח שנרצה לבדוק.</a:t>
             </a:r>
           </a:p>
@@ -8858,7 +8679,7 @@
             <a:pPr marL="0" indent="0">
               <a:buNone/>
             </a:pPr>
-            <a:endParaRPr lang="he-IL" dirty="0" smtClean="0"/>
+            <a:endParaRPr lang="he-IL" dirty="0"/>
           </a:p>
           <a:p>
             <a:endParaRPr lang="he-IL" dirty="0"/>
@@ -8875,13 +8696,6 @@
   <p:clrMapOvr>
     <a:masterClrMapping/>
   </p:clrMapOvr>
-  <p:timing>
-    <p:tnLst>
-      <p:par>
-        <p:cTn id="1" dur="indefinite" restart="never" nodeType="tmRoot"/>
-      </p:par>
-    </p:tnLst>
-  </p:timing>
 </p:sld>
 </file>
 
@@ -8919,14 +8733,9 @@
           <a:p>
             <a:pPr algn="r"/>
             <a:r>
-              <a:rPr lang="he-IL" dirty="0" smtClean="0"/>
-              <a:t>דוגמת ריצה </a:t>
-            </a:r>
-            <a:r>
-              <a:rPr lang="he-IL" dirty="0" smtClean="0"/>
-              <a:t>– יצירת נתונים</a:t>
-            </a:r>
-            <a:endParaRPr lang="he-IL" dirty="0"/>
+              <a:rPr lang="he-IL" dirty="0"/>
+              <a:t>דוגמת ריצה – יצירת נתונים</a:t>
+            </a:r>
           </a:p>
         </p:txBody>
       </p:sp>
@@ -9027,13 +8836,6 @@
   <p:clrMapOvr>
     <a:masterClrMapping/>
   </p:clrMapOvr>
-  <p:timing>
-    <p:tnLst>
-      <p:par>
-        <p:cTn id="1" dur="indefinite" restart="never" nodeType="tmRoot"/>
-      </p:par>
-    </p:tnLst>
-  </p:timing>
 </p:sld>
 </file>
 
@@ -9100,14 +8902,9 @@
           <a:p>
             <a:pPr algn="r"/>
             <a:r>
-              <a:rPr lang="he-IL" dirty="0" smtClean="0"/>
-              <a:t>דוגמת ריצה – </a:t>
-            </a:r>
-            <a:r>
-              <a:rPr lang="he-IL" dirty="0" smtClean="0"/>
-              <a:t>חישוב מרחקים צפויים</a:t>
-            </a:r>
-            <a:endParaRPr lang="he-IL" dirty="0"/>
+              <a:rPr lang="he-IL" dirty="0"/>
+              <a:t>דוגמת ריצה – חישוב מרחקים צפויים</a:t>
+            </a:r>
           </a:p>
         </p:txBody>
       </p:sp>
@@ -9179,13 +8976,6 @@
   <p:clrMapOvr>
     <a:masterClrMapping/>
   </p:clrMapOvr>
-  <p:timing>
-    <p:tnLst>
-      <p:par>
-        <p:cTn id="1" dur="indefinite" restart="never" nodeType="tmRoot"/>
-      </p:par>
-    </p:tnLst>
-  </p:timing>
 </p:sld>
 </file>
 
@@ -9223,10 +9013,9 @@
           <a:p>
             <a:pPr algn="r"/>
             <a:r>
-              <a:rPr lang="he-IL" dirty="0" smtClean="0"/>
+              <a:rPr lang="he-IL" dirty="0"/>
               <a:t>רקע</a:t>
             </a:r>
-            <a:endParaRPr lang="he-IL" dirty="0"/>
           </a:p>
         </p:txBody>
       </p:sp>
@@ -9253,15 +9042,15 @@
               </a:lnSpc>
             </a:pPr>
             <a:r>
-              <a:rPr lang="he-IL" dirty="0" smtClean="0"/>
+              <a:rPr lang="he-IL" dirty="0"/>
               <a:t>בתחומים רבים כגון:</a:t>
             </a:r>
             <a:r>
-              <a:rPr lang="en-US" dirty="0" smtClean="0"/>
+              <a:rPr lang="en-US" dirty="0"/>
               <a:t> </a:t>
             </a:r>
             <a:r>
-              <a:rPr lang="he-IL" dirty="0" smtClean="0"/>
+              <a:rPr lang="he-IL" dirty="0"/>
               <a:t>למידה חישובית, זיהוי תבניות, ניתוח תמונה, איסוף נתונים, ביו אינפורמטיקה ודחיסת מידע. יש כמות אדירה של מידע.</a:t>
             </a:r>
           </a:p>
@@ -9272,7 +9061,7 @@
               </a:lnSpc>
             </a:pPr>
             <a:r>
-              <a:rPr lang="he-IL" dirty="0" smtClean="0"/>
+              <a:rPr lang="he-IL" dirty="0"/>
               <a:t>על מנת שנוכל לעבוד עם כמות כזו של מידע, עלינו לבצע עיבוד מקדים.</a:t>
             </a:r>
           </a:p>
@@ -9283,15 +9072,15 @@
               </a:lnSpc>
             </a:pPr>
             <a:r>
-              <a:rPr lang="he-IL" dirty="0" smtClean="0"/>
+              <a:rPr lang="he-IL" dirty="0"/>
               <a:t>אחד הפתרונות הפופולריים הינו – ניתוח אשכולות באופן בלתי מונחה (</a:t>
             </a:r>
             <a:r>
-              <a:rPr lang="en-US" dirty="0" smtClean="0"/>
+              <a:rPr lang="en-US" dirty="0"/>
               <a:t>unsupervised</a:t>
             </a:r>
             <a:r>
-              <a:rPr lang="he-IL" dirty="0" smtClean="0"/>
+              <a:rPr lang="he-IL" dirty="0"/>
               <a:t>).</a:t>
             </a:r>
           </a:p>
@@ -9313,13 +9102,6 @@
   <p:clrMapOvr>
     <a:masterClrMapping/>
   </p:clrMapOvr>
-  <p:timing>
-    <p:tnLst>
-      <p:par>
-        <p:cTn id="1" dur="indefinite" restart="never" nodeType="tmRoot"/>
-      </p:par>
-    </p:tnLst>
-  </p:timing>
 </p:sld>
 </file>
 
@@ -9357,7 +9139,7 @@
           <a:p>
             <a:pPr algn="l" rtl="0"/>
             <a:r>
-              <a:rPr lang="en-US" dirty="0" smtClean="0"/>
+              <a:rPr lang="en-US" dirty="0"/>
               <a:t>Gap Statistics.</a:t>
             </a:r>
             <a:endParaRPr lang="he-IL" dirty="0"/>
@@ -9384,7 +9166,7 @@
               <a:lstStyle/>
               <a:p>
                 <a:r>
-                  <a:rPr lang="he-IL" dirty="0" smtClean="0"/>
+                  <a:rPr lang="he-IL" dirty="0"/>
                   <a:t>אופן פעולה: </a:t>
                 </a:r>
               </a:p>
@@ -9394,15 +9176,15 @@
                   <a:buAutoNum type="arabicPeriod"/>
                 </a:pPr>
                 <a:r>
-                  <a:rPr lang="he-IL" dirty="0" smtClean="0"/>
+                  <a:rPr lang="he-IL" dirty="0"/>
                   <a:t>נגדיר טווח של </a:t>
                 </a:r>
                 <a:r>
-                  <a:rPr lang="en-US" dirty="0" smtClean="0"/>
+                  <a:rPr lang="en-US" dirty="0"/>
                   <a:t>k</a:t>
                 </a:r>
                 <a:r>
-                  <a:rPr lang="he-IL" dirty="0" smtClean="0"/>
+                  <a:rPr lang="he-IL" dirty="0"/>
                   <a:t> חשודים.</a:t>
                 </a:r>
               </a:p>
@@ -9412,15 +9194,15 @@
                   <a:buAutoNum type="arabicPeriod"/>
                 </a:pPr>
                 <a:r>
-                  <a:rPr lang="he-IL" dirty="0" smtClean="0"/>
+                  <a:rPr lang="he-IL" dirty="0"/>
                   <a:t>לכל </a:t>
                 </a:r>
                 <a:r>
-                  <a:rPr lang="en-US" dirty="0" smtClean="0"/>
+                  <a:rPr lang="en-US" dirty="0"/>
                   <a:t>k</a:t>
                 </a:r>
                 <a:r>
-                  <a:rPr lang="he-IL" dirty="0" smtClean="0"/>
+                  <a:rPr lang="he-IL" dirty="0"/>
                   <a:t> נחשב את </a:t>
                 </a:r>
                 <a14:m>
@@ -9489,7 +9271,7 @@
                   </m:oMath>
                 </a14:m>
                 <a:r>
-                  <a:rPr lang="he-IL" dirty="0" smtClean="0"/>
+                  <a:rPr lang="he-IL" dirty="0"/>
                   <a:t>.</a:t>
                 </a:r>
               </a:p>
@@ -9499,15 +9281,15 @@
                   <a:buAutoNum type="arabicPeriod"/>
                 </a:pPr>
                 <a:r>
-                  <a:rPr lang="he-IL" dirty="0" smtClean="0"/>
+                  <a:rPr lang="he-IL" dirty="0"/>
                   <a:t>לכל </a:t>
                 </a:r>
                 <a:r>
-                  <a:rPr lang="en-US" dirty="0" smtClean="0"/>
+                  <a:rPr lang="en-US" dirty="0"/>
                   <a:t>k</a:t>
                 </a:r>
                 <a:r>
-                  <a:rPr lang="he-IL" dirty="0" smtClean="0"/>
+                  <a:rPr lang="he-IL" dirty="0"/>
                   <a:t> נחשב את </a:t>
                 </a:r>
                 <a14:m>
@@ -9540,7 +9322,7 @@
                   </m:oMath>
                 </a14:m>
                 <a:r>
-                  <a:rPr lang="he-IL" dirty="0" smtClean="0"/>
+                  <a:rPr lang="he-IL" dirty="0"/>
                   <a:t>.</a:t>
                 </a:r>
               </a:p>
@@ -9550,23 +9332,23 @@
                   <a:buAutoNum type="arabicPeriod"/>
                 </a:pPr>
                 <a:r>
-                  <a:rPr lang="he-IL" dirty="0" smtClean="0"/>
+                  <a:rPr lang="he-IL" dirty="0"/>
                   <a:t>נחזיר את ה </a:t>
                 </a:r>
                 <a:r>
-                  <a:rPr lang="en-US" dirty="0" smtClean="0"/>
+                  <a:rPr lang="en-US" dirty="0"/>
                   <a:t>k</a:t>
                 </a:r>
                 <a:r>
-                  <a:rPr lang="he-IL" dirty="0" smtClean="0"/>
+                  <a:rPr lang="he-IL" dirty="0"/>
                   <a:t> עבור </a:t>
                 </a:r>
                 <a:r>
-                  <a:rPr lang="en-US" dirty="0" smtClean="0"/>
+                  <a:rPr lang="en-US" dirty="0"/>
                   <a:t>J</a:t>
                 </a:r>
                 <a:r>
-                  <a:rPr lang="he-IL" dirty="0" smtClean="0"/>
+                  <a:rPr lang="he-IL" dirty="0"/>
                   <a:t> מקסימלי.</a:t>
                 </a:r>
               </a:p>
@@ -9574,10 +9356,10 @@
                 <a:pPr marL="457200" lvl="1" indent="0">
                   <a:buNone/>
                 </a:pPr>
-                <a:endParaRPr lang="he-IL" dirty="0" smtClean="0"/>
+                <a:endParaRPr lang="he-IL" dirty="0"/>
               </a:p>
               <a:p>
-                <a:endParaRPr lang="he-IL" dirty="0" smtClean="0"/>
+                <a:endParaRPr lang="he-IL" dirty="0"/>
               </a:p>
               <a:p>
                 <a:endParaRPr lang="he-IL" dirty="0"/>
@@ -9629,13 +9411,6 @@
   <p:clrMapOvr>
     <a:masterClrMapping/>
   </p:clrMapOvr>
-  <p:timing>
-    <p:tnLst>
-      <p:par>
-        <p:cTn id="1" dur="indefinite" restart="never" nodeType="tmRoot"/>
-      </p:par>
-    </p:tnLst>
-  </p:timing>
 </p:sld>
 </file>
 
@@ -9673,10 +9448,9 @@
           <a:p>
             <a:pPr algn="r"/>
             <a:r>
-              <a:rPr lang="he-IL" dirty="0" smtClean="0"/>
+              <a:rPr lang="he-IL" dirty="0"/>
               <a:t>תוצאות ריצה</a:t>
             </a:r>
-            <a:endParaRPr lang="he-IL" dirty="0"/>
           </a:p>
         </p:txBody>
       </p:sp>
@@ -9749,13 +9523,6 @@
   <p:clrMapOvr>
     <a:masterClrMapping/>
   </p:clrMapOvr>
-  <p:timing>
-    <p:tnLst>
-      <p:par>
-        <p:cTn id="1" dur="indefinite" restart="never" nodeType="tmRoot"/>
-      </p:par>
-    </p:tnLst>
-  </p:timing>
 </p:sld>
 </file>
 
@@ -9793,7 +9560,7 @@
           <a:p>
             <a:pPr algn="l" rtl="0"/>
             <a:r>
-              <a:rPr lang="en-US" dirty="0" err="1" smtClean="0"/>
+              <a:rPr lang="en-US" dirty="0" err="1"/>
               <a:t>Cmeans</a:t>
             </a:r>
             <a:endParaRPr lang="he-IL" dirty="0"/>
@@ -9816,24 +9583,24 @@
           <a:lstStyle/>
           <a:p>
             <a:r>
-              <a:rPr lang="he-IL" dirty="0" smtClean="0"/>
+              <a:rPr lang="he-IL" dirty="0"/>
               <a:t>לוגיקה עמומה - </a:t>
             </a:r>
             <a:r>
-              <a:rPr lang="en-US" dirty="0" smtClean="0"/>
+              <a:rPr lang="en-US" dirty="0"/>
               <a:t>Fuzzy logic</a:t>
             </a:r>
           </a:p>
           <a:p>
             <a:r>
-              <a:rPr lang="he-IL" dirty="0" smtClean="0"/>
+              <a:rPr lang="he-IL" dirty="0"/>
               <a:t>תיאור אלגוריתם ואופן פעולה.</a:t>
             </a:r>
           </a:p>
           <a:p>
             <a:pPr algn="r"/>
             <a:r>
-              <a:rPr lang="he-IL" dirty="0" smtClean="0"/>
+              <a:rPr lang="he-IL" dirty="0"/>
               <a:t>דוגמאות.</a:t>
             </a:r>
           </a:p>
@@ -9842,10 +9609,9 @@
               <a:buNone/>
             </a:pPr>
             <a:r>
-              <a:rPr lang="he-IL" dirty="0" smtClean="0"/>
+              <a:rPr lang="he-IL" dirty="0"/>
               <a:t>  </a:t>
             </a:r>
-            <a:endParaRPr lang="he-IL" dirty="0"/>
           </a:p>
         </p:txBody>
       </p:sp>
@@ -9859,13 +9625,6 @@
   <p:clrMapOvr>
     <a:masterClrMapping/>
   </p:clrMapOvr>
-  <p:timing>
-    <p:tnLst>
-      <p:par>
-        <p:cTn id="1" dur="indefinite" restart="never" nodeType="tmRoot"/>
-      </p:par>
-    </p:tnLst>
-  </p:timing>
 </p:sld>
 </file>
 
@@ -9903,11 +9662,11 @@
           <a:p>
             <a:pPr algn="r"/>
             <a:r>
-              <a:rPr lang="he-IL" dirty="0" smtClean="0"/>
+              <a:rPr lang="he-IL" dirty="0"/>
               <a:t>לוגיקה עמומה - </a:t>
             </a:r>
             <a:r>
-              <a:rPr lang="en-US" dirty="0" smtClean="0"/>
+              <a:rPr lang="en-US" dirty="0"/>
               <a:t>Fuzzy logic</a:t>
             </a:r>
             <a:endParaRPr lang="he-IL" dirty="0"/>
@@ -9932,7 +9691,7 @@
               <a:lstStyle/>
               <a:p>
                 <a:r>
-                  <a:rPr lang="he-IL" dirty="0" smtClean="0"/>
+                  <a:rPr lang="he-IL" dirty="0"/>
                   <a:t>בלוגיקה עמומה ערך האמת יכול לקבל כל ערך בתחום </a:t>
                 </a:r>
                 <a14:m>
@@ -9952,63 +9711,47 @@
                           <a:rPr lang="en-US" b="0" i="1" smtClean="0">
                             <a:latin typeface="Cambria Math" panose="02040503050406030204" pitchFamily="18" charset="0"/>
                           </a:rPr>
-                          <m:t>0</m:t>
-                        </m:r>
-                        <m:r>
-                          <a:rPr lang="en-US" b="0" i="1" smtClean="0">
-                            <a:latin typeface="Cambria Math" panose="02040503050406030204" pitchFamily="18" charset="0"/>
-                          </a:rPr>
-                          <m:t>,</m:t>
-                        </m:r>
-                        <m:r>
-                          <a:rPr lang="en-US" b="0" i="1" smtClean="0">
-                            <a:latin typeface="Cambria Math" panose="02040503050406030204" pitchFamily="18" charset="0"/>
-                          </a:rPr>
-                          <m:t>1</m:t>
+                          <m:t>0,1</m:t>
                         </m:r>
                       </m:e>
                     </m:d>
                   </m:oMath>
                 </a14:m>
                 <a:r>
-                  <a:rPr lang="he-IL" dirty="0" smtClean="0"/>
+                  <a:rPr lang="he-IL" dirty="0"/>
                   <a:t>.</a:t>
                 </a:r>
               </a:p>
               <a:p>
                 <a:r>
-                  <a:rPr lang="he-IL" dirty="0" smtClean="0"/>
+                  <a:rPr lang="he-IL" dirty="0"/>
                   <a:t>בעולם האמיתי,  הגדרת השייכות לקבוצה היא לא תמיד בינרית.</a:t>
                 </a:r>
-                <a:r>
-                  <a:rPr lang="en-US" dirty="0" smtClean="0"/>
-                  <a:t/>
-                </a:r>
                 <a:br>
-                  <a:rPr lang="en-US" dirty="0" smtClean="0"/>
+                  <a:rPr lang="en-US" dirty="0"/>
                 </a:br>
                 <a:r>
-                  <a:rPr lang="he-IL" dirty="0" smtClean="0"/>
+                  <a:rPr lang="he-IL" dirty="0"/>
                   <a:t>לדוגמא: בתיאור מזג האוויר לא מספקת התשובה חם או קר.</a:t>
                 </a:r>
               </a:p>
               <a:p>
                 <a:r>
-                  <a:rPr lang="he-IL" dirty="0" smtClean="0"/>
+                  <a:rPr lang="he-IL" dirty="0"/>
                   <a:t>כאמור </a:t>
                 </a:r>
                 <a:r>
-                  <a:rPr lang="en-US" dirty="0" err="1" smtClean="0"/>
+                  <a:rPr lang="en-US" dirty="0" err="1"/>
                   <a:t>Kmeans</a:t>
                 </a:r>
                 <a:r>
-                  <a:rPr lang="he-IL" dirty="0" smtClean="0"/>
+                  <a:rPr lang="he-IL" dirty="0"/>
                   <a:t> מחלק אשכולות בצורה "קשיחה" ובינרית.</a:t>
                 </a:r>
               </a:p>
               <a:p>
                 <a:r>
-                  <a:rPr lang="he-IL" dirty="0" smtClean="0"/>
+                  <a:rPr lang="he-IL" dirty="0"/>
                   <a:t>נרצה דרכים ליצור חלוקה בה לאובייקט יש רמות שייכות לאשכול.</a:t>
                 </a:r>
               </a:p>
@@ -10062,13 +9805,6 @@
   <p:clrMapOvr>
     <a:masterClrMapping/>
   </p:clrMapOvr>
-  <p:timing>
-    <p:tnLst>
-      <p:par>
-        <p:cTn id="1" dur="indefinite" restart="never" nodeType="tmRoot"/>
-      </p:par>
-    </p:tnLst>
-  </p:timing>
 </p:sld>
 </file>
 
@@ -10106,10 +9842,9 @@
           <a:p>
             <a:pPr algn="r"/>
             <a:r>
-              <a:rPr lang="he-IL" dirty="0" smtClean="0"/>
+              <a:rPr lang="he-IL" dirty="0"/>
               <a:t>תיאור אלגוריתם ואופן פעולה</a:t>
             </a:r>
-            <a:endParaRPr lang="he-IL" dirty="0"/>
           </a:p>
         </p:txBody>
       </p:sp>
@@ -10129,7 +9864,7 @@
           <a:lstStyle/>
           <a:p>
             <a:r>
-              <a:rPr lang="he-IL" dirty="0" smtClean="0"/>
+              <a:rPr lang="he-IL" dirty="0"/>
               <a:t>אופן הפעולה:</a:t>
             </a:r>
           </a:p>
@@ -10139,7 +9874,7 @@
               <a:buAutoNum type="arabicPeriod"/>
             </a:pPr>
             <a:r>
-              <a:rPr lang="he-IL" dirty="0" smtClean="0"/>
+              <a:rPr lang="he-IL" dirty="0"/>
               <a:t>הגרל </a:t>
             </a:r>
             <a:r>
@@ -10147,7 +9882,7 @@
               <a:t>c</a:t>
             </a:r>
             <a:r>
-              <a:rPr lang="he-IL" dirty="0" smtClean="0"/>
+              <a:rPr lang="he-IL" dirty="0"/>
               <a:t> מרכזים.</a:t>
             </a:r>
           </a:p>
@@ -10157,7 +9892,7 @@
               <a:buAutoNum type="arabicPeriod"/>
             </a:pPr>
             <a:r>
-              <a:rPr lang="he-IL" dirty="0" smtClean="0"/>
+              <a:rPr lang="he-IL" dirty="0"/>
               <a:t>עבור כל אובייקט, חשב את מידת השייכות שלו עבור כל מרכז.</a:t>
             </a:r>
           </a:p>
@@ -10167,7 +9902,7 @@
               <a:buAutoNum type="arabicPeriod"/>
             </a:pPr>
             <a:r>
-              <a:rPr lang="he-IL" dirty="0" smtClean="0"/>
+              <a:rPr lang="he-IL" dirty="0"/>
               <a:t>חשב מחדש את כל המרכזים.</a:t>
             </a:r>
           </a:p>
@@ -10177,7 +9912,7 @@
               <a:buAutoNum type="arabicPeriod"/>
             </a:pPr>
             <a:r>
-              <a:rPr lang="he-IL" dirty="0" smtClean="0"/>
+              <a:rPr lang="he-IL" dirty="0"/>
               <a:t>חזור על צעדים 2 ו 3 עד שהמרכזים אינם משתנים.</a:t>
             </a:r>
           </a:p>
@@ -10186,13 +9921,13 @@
               <a:buFont typeface="+mj-lt"/>
               <a:buAutoNum type="arabicPeriod"/>
             </a:pPr>
-            <a:endParaRPr lang="he-IL" dirty="0" smtClean="0"/>
+            <a:endParaRPr lang="he-IL" dirty="0"/>
           </a:p>
           <a:p>
             <a:pPr marL="457200" lvl="1" indent="0">
               <a:buNone/>
             </a:pPr>
-            <a:endParaRPr lang="he-IL" dirty="0" smtClean="0"/>
+            <a:endParaRPr lang="he-IL" dirty="0"/>
           </a:p>
           <a:p>
             <a:pPr marL="0" indent="0">
@@ -10212,13 +9947,6 @@
   <p:clrMapOvr>
     <a:masterClrMapping/>
   </p:clrMapOvr>
-  <p:timing>
-    <p:tnLst>
-      <p:par>
-        <p:cTn id="1" dur="indefinite" restart="never" nodeType="tmRoot"/>
-      </p:par>
-    </p:tnLst>
-  </p:timing>
 </p:sld>
 </file>
 
@@ -10256,10 +9984,9 @@
           <a:p>
             <a:pPr algn="r"/>
             <a:r>
-              <a:rPr lang="he-IL" dirty="0" smtClean="0"/>
+              <a:rPr lang="he-IL" dirty="0"/>
               <a:t>אתחול</a:t>
             </a:r>
-            <a:endParaRPr lang="he-IL" dirty="0"/>
           </a:p>
         </p:txBody>
       </p:sp>
@@ -10303,13 +10030,6 @@
   <p:clrMapOvr>
     <a:masterClrMapping/>
   </p:clrMapOvr>
-  <p:timing>
-    <p:tnLst>
-      <p:par>
-        <p:cTn id="1" dur="indefinite" restart="never" nodeType="tmRoot"/>
-      </p:par>
-    </p:tnLst>
-  </p:timing>
 </p:sld>
 </file>
 
@@ -10354,7 +10074,7 @@
           <a:p>
             <a:pPr algn="l" rtl="0"/>
             <a:r>
-              <a:rPr lang="en-US" dirty="0" smtClean="0"/>
+              <a:rPr lang="en-US" dirty="0"/>
               <a:t>Iteration 1</a:t>
             </a:r>
           </a:p>
@@ -10400,13 +10120,6 @@
   <p:clrMapOvr>
     <a:masterClrMapping/>
   </p:clrMapOvr>
-  <p:timing>
-    <p:tnLst>
-      <p:par>
-        <p:cTn id="1" dur="indefinite" restart="never" nodeType="tmRoot"/>
-      </p:par>
-    </p:tnLst>
-  </p:timing>
 </p:sld>
 </file>
 
@@ -10451,7 +10164,7 @@
           <a:p>
             <a:pPr algn="l" rtl="0"/>
             <a:r>
-              <a:rPr lang="en-US" dirty="0" smtClean="0"/>
+              <a:rPr lang="en-US" dirty="0"/>
               <a:t>Iteration 2</a:t>
             </a:r>
           </a:p>
@@ -10497,13 +10210,6 @@
   <p:clrMapOvr>
     <a:masterClrMapping/>
   </p:clrMapOvr>
-  <p:timing>
-    <p:tnLst>
-      <p:par>
-        <p:cTn id="1" dur="indefinite" restart="never" nodeType="tmRoot"/>
-      </p:par>
-    </p:tnLst>
-  </p:timing>
 </p:sld>
 </file>
 
@@ -10548,7 +10254,7 @@
           <a:p>
             <a:pPr algn="l" rtl="0"/>
             <a:r>
-              <a:rPr lang="en-US" dirty="0" smtClean="0"/>
+              <a:rPr lang="en-US" dirty="0"/>
               <a:t>Iteration 3</a:t>
             </a:r>
           </a:p>
@@ -10594,13 +10300,6 @@
   <p:clrMapOvr>
     <a:masterClrMapping/>
   </p:clrMapOvr>
-  <p:timing>
-    <p:tnLst>
-      <p:par>
-        <p:cTn id="1" dur="indefinite" restart="never" nodeType="tmRoot"/>
-      </p:par>
-    </p:tnLst>
-  </p:timing>
 </p:sld>
 </file>
 
@@ -10645,7 +10344,7 @@
           <a:p>
             <a:pPr algn="l" rtl="0"/>
             <a:r>
-              <a:rPr lang="en-US" dirty="0" smtClean="0"/>
+              <a:rPr lang="en-US" dirty="0"/>
               <a:t>Iteration 4</a:t>
             </a:r>
           </a:p>
@@ -10691,13 +10390,6 @@
   <p:clrMapOvr>
     <a:masterClrMapping/>
   </p:clrMapOvr>
-  <p:timing>
-    <p:tnLst>
-      <p:par>
-        <p:cTn id="1" dur="indefinite" restart="never" nodeType="tmRoot"/>
-      </p:par>
-    </p:tnLst>
-  </p:timing>
 </p:sld>
 </file>
 
@@ -10735,10 +10427,9 @@
           <a:p>
             <a:pPr algn="r"/>
             <a:r>
-              <a:rPr lang="he-IL" dirty="0" smtClean="0"/>
+              <a:rPr lang="he-IL" dirty="0"/>
               <a:t>הגדרה</a:t>
             </a:r>
-            <a:endParaRPr lang="he-IL" dirty="0"/>
           </a:p>
         </p:txBody>
       </p:sp>
@@ -10758,24 +10449,71 @@
           <a:lstStyle/>
           <a:p>
             <a:r>
-              <a:rPr lang="he-IL" dirty="0" smtClean="0"/>
+              <a:rPr lang="he-IL" dirty="0"/>
               <a:t>ניתוח אשכולות היא המשימה של מציאת קבוצות של האיברים ה"דומים" ביותר.</a:t>
             </a:r>
           </a:p>
           <a:p>
             <a:r>
-              <a:rPr lang="he-IL" dirty="0" smtClean="0"/>
-              <a:t>*להוסיף תמונות*</a:t>
-            </a:r>
-          </a:p>
-          <a:p>
-            <a:endParaRPr lang="he-IL" dirty="0" smtClean="0"/>
+              <a:rPr lang="he-IL" dirty="0"/>
+              <a:t>השיוך לקבוצות ע״פ דמיון הוא לפעמים מסובך, דמיון לקבוצה אחת אינו שולל דמיון לקבוצה אחרת.</a:t>
+            </a:r>
           </a:p>
           <a:p>
             <a:endParaRPr lang="he-IL" dirty="0"/>
           </a:p>
-        </p:txBody>
-      </p:sp>
+          <a:p>
+            <a:endParaRPr lang="he-IL" dirty="0"/>
+          </a:p>
+        </p:txBody>
+      </p:sp>
+      <p:pic>
+        <p:nvPicPr>
+          <p:cNvPr id="5" name="Picture 2" descr="תוצאת תמונה עבור ‪similarity‬‏">
+            <a:extLst>
+              <a:ext uri="{FF2B5EF4-FFF2-40B4-BE49-F238E27FC236}">
+                <a16:creationId xmlns:a16="http://schemas.microsoft.com/office/drawing/2014/main" id="{0C555E36-2C41-5C4A-B522-F29692AC02C5}"/>
+              </a:ext>
+            </a:extLst>
+          </p:cNvPr>
+          <p:cNvPicPr>
+            <a:picLocks noChangeAspect="1" noChangeArrowheads="1"/>
+          </p:cNvPicPr>
+          <p:nvPr/>
+        </p:nvPicPr>
+        <p:blipFill>
+          <a:blip r:embed="rId2">
+            <a:extLst>
+              <a:ext uri="{28A0092B-C50C-407E-A947-70E740481C1C}">
+                <a14:useLocalDpi xmlns:a14="http://schemas.microsoft.com/office/drawing/2010/main" val="0"/>
+              </a:ext>
+            </a:extLst>
+          </a:blip>
+          <a:srcRect/>
+          <a:stretch>
+            <a:fillRect/>
+          </a:stretch>
+        </p:blipFill>
+        <p:spPr bwMode="auto">
+          <a:xfrm>
+            <a:off x="1097280" y="3056021"/>
+            <a:ext cx="4044505" cy="3212432"/>
+          </a:xfrm>
+          <a:prstGeom prst="rect">
+            <a:avLst/>
+          </a:prstGeom>
+          <a:noFill/>
+          <a:extLst>
+            <a:ext uri="{909E8E84-426E-40DD-AFC4-6F175D3DCCD1}">
+              <a14:hiddenFill xmlns:a14="http://schemas.microsoft.com/office/drawing/2010/main">
+                <a:solidFill>
+                  <a:srgbClr val="FFFFFF"/>
+                </a:solidFill>
+              </a14:hiddenFill>
+            </a:ext>
+          </a:extLst>
+        </p:spPr>
+      </p:pic>
     </p:spTree>
     <p:extLst>
       <p:ext uri="{BB962C8B-B14F-4D97-AF65-F5344CB8AC3E}">
@@ -10786,13 +10524,6 @@
   <p:clrMapOvr>
     <a:masterClrMapping/>
   </p:clrMapOvr>
-  <p:timing>
-    <p:tnLst>
-      <p:par>
-        <p:cTn id="1" dur="indefinite" restart="never" nodeType="tmRoot"/>
-      </p:par>
-    </p:tnLst>
-  </p:timing>
 </p:sld>
 </file>
 
@@ -10837,7 +10568,7 @@
           <a:p>
             <a:pPr algn="l" rtl="0"/>
             <a:r>
-              <a:rPr lang="en-US" dirty="0" smtClean="0"/>
+              <a:rPr lang="en-US" dirty="0"/>
               <a:t>Iteration 5</a:t>
             </a:r>
           </a:p>
@@ -10883,13 +10614,6 @@
   <p:clrMapOvr>
     <a:masterClrMapping/>
   </p:clrMapOvr>
-  <p:timing>
-    <p:tnLst>
-      <p:par>
-        <p:cTn id="1" dur="indefinite" restart="never" nodeType="tmRoot"/>
-      </p:par>
-    </p:tnLst>
-  </p:timing>
 </p:sld>
 </file>
 
@@ -10934,7 +10658,7 @@
           <a:p>
             <a:pPr algn="l" rtl="0"/>
             <a:r>
-              <a:rPr lang="en-US" dirty="0" smtClean="0"/>
+              <a:rPr lang="en-US" dirty="0"/>
               <a:t>Iteration 6</a:t>
             </a:r>
           </a:p>
@@ -10980,13 +10704,6 @@
   <p:clrMapOvr>
     <a:masterClrMapping/>
   </p:clrMapOvr>
-  <p:timing>
-    <p:tnLst>
-      <p:par>
-        <p:cTn id="1" dur="indefinite" restart="never" nodeType="tmRoot"/>
-      </p:par>
-    </p:tnLst>
-  </p:timing>
 </p:sld>
 </file>
 
@@ -11031,7 +10748,7 @@
           <a:p>
             <a:pPr algn="l" rtl="0"/>
             <a:r>
-              <a:rPr lang="en-US" dirty="0" smtClean="0"/>
+              <a:rPr lang="en-US" dirty="0"/>
               <a:t>Iteration 7</a:t>
             </a:r>
           </a:p>
@@ -11077,13 +10794,6 @@
   <p:clrMapOvr>
     <a:masterClrMapping/>
   </p:clrMapOvr>
-  <p:timing>
-    <p:tnLst>
-      <p:par>
-        <p:cTn id="1" dur="indefinite" restart="never" nodeType="tmRoot"/>
-      </p:par>
-    </p:tnLst>
-  </p:timing>
 </p:sld>
 </file>
 
@@ -11158,7 +10868,7 @@
           <a:p>
             <a:pPr algn="l" rtl="0"/>
             <a:r>
-              <a:rPr lang="en-US" dirty="0" smtClean="0"/>
+              <a:rPr lang="en-US" dirty="0"/>
               <a:t>Iteration 8 - final</a:t>
             </a:r>
           </a:p>
@@ -11174,13 +10884,6 @@
   <p:clrMapOvr>
     <a:masterClrMapping/>
   </p:clrMapOvr>
-  <p:timing>
-    <p:tnLst>
-      <p:par>
-        <p:cTn id="1" dur="indefinite" restart="never" nodeType="tmRoot"/>
-      </p:par>
-    </p:tnLst>
-  </p:timing>
 </p:sld>
 </file>
 
@@ -11218,10 +10921,9 @@
           <a:p>
             <a:pPr algn="r"/>
             <a:r>
-              <a:rPr lang="he-IL" dirty="0" smtClean="0"/>
+              <a:rPr lang="he-IL" dirty="0"/>
               <a:t>סיכום</a:t>
             </a:r>
-            <a:endParaRPr lang="he-IL" dirty="0"/>
           </a:p>
         </p:txBody>
       </p:sp>
@@ -11254,13 +10956,6 @@
   <p:clrMapOvr>
     <a:masterClrMapping/>
   </p:clrMapOvr>
-  <p:timing>
-    <p:tnLst>
-      <p:par>
-        <p:cTn id="1" dur="indefinite" restart="never" nodeType="tmRoot"/>
-      </p:par>
-    </p:tnLst>
-  </p:timing>
 </p:sld>
 </file>
 
@@ -11298,10 +10993,9 @@
           <a:p>
             <a:pPr algn="r"/>
             <a:r>
-              <a:rPr lang="he-IL" dirty="0" smtClean="0"/>
+              <a:rPr lang="he-IL" dirty="0"/>
               <a:t>קשיים</a:t>
             </a:r>
-            <a:endParaRPr lang="he-IL" dirty="0"/>
           </a:p>
         </p:txBody>
       </p:sp>
@@ -11321,26 +11015,36 @@
           <a:lstStyle/>
           <a:p>
             <a:r>
-              <a:rPr lang="he-IL" dirty="0" smtClean="0"/>
+              <a:rPr lang="he-IL" dirty="0"/>
               <a:t>רבות הדרכים לקבוע דמיון בין אובייקטים. למשל:</a:t>
             </a:r>
           </a:p>
           <a:p>
             <a:r>
-              <a:rPr lang="he-IL" dirty="0" smtClean="0"/>
+              <a:rPr lang="he-IL" dirty="0"/>
               <a:t>מרכז משותף.</a:t>
             </a:r>
           </a:p>
           <a:p>
             <a:r>
-              <a:rPr lang="he-IL" dirty="0" smtClean="0"/>
+              <a:rPr lang="he-IL" dirty="0"/>
               <a:t>צפיפות.</a:t>
             </a:r>
           </a:p>
           <a:p>
             <a:r>
-              <a:rPr lang="he-IL" dirty="0" smtClean="0"/>
-              <a:t>להוסיף *דוגמאות לדמיון ותמונות*</a:t>
+              <a:rPr lang="he-IL" dirty="0"/>
+              <a:t>ממד נתונים גבוה.</a:t>
+            </a:r>
+          </a:p>
+          <a:p>
+            <a:r>
+              <a:rPr lang="en-US" dirty="0" err="1"/>
+              <a:t>ק</a:t>
+            </a:r>
+            <a:r>
+              <a:rPr lang="he-IL" dirty="0"/>
+              <a:t>ביעת מספר האשכולות.</a:t>
             </a:r>
           </a:p>
         </p:txBody>
@@ -11355,13 +11059,6 @@
   <p:clrMapOvr>
     <a:masterClrMapping/>
   </p:clrMapOvr>
-  <p:timing>
-    <p:tnLst>
-      <p:par>
-        <p:cTn id="1" dur="indefinite" restart="never" nodeType="tmRoot"/>
-      </p:par>
-    </p:tnLst>
-  </p:timing>
 </p:sld>
 </file>
 
@@ -11399,7 +11096,7 @@
           <a:p>
             <a:pPr algn="r"/>
             <a:r>
-              <a:rPr lang="he-IL" dirty="0" err="1" smtClean="0"/>
+              <a:rPr lang="he-IL" dirty="0" err="1"/>
               <a:t>הסימפסונים</a:t>
             </a:r>
             <a:endParaRPr lang="he-IL" dirty="0"/>
@@ -11448,13 +11145,6 @@
   <p:clrMapOvr>
     <a:masterClrMapping/>
   </p:clrMapOvr>
-  <p:timing>
-    <p:tnLst>
-      <p:par>
-        <p:cTn id="1" dur="indefinite" restart="never" nodeType="tmRoot"/>
-      </p:par>
-    </p:tnLst>
-  </p:timing>
 </p:sld>
 </file>
 
@@ -11673,10 +11363,9 @@
           <a:p>
             <a:pPr algn="r"/>
             <a:r>
-              <a:rPr lang="he-IL" dirty="0" smtClean="0"/>
+              <a:rPr lang="he-IL" dirty="0"/>
               <a:t>גווני הבגדים?</a:t>
             </a:r>
-            <a:endParaRPr lang="he-IL" dirty="0"/>
           </a:p>
         </p:txBody>
       </p:sp>
@@ -11922,13 +11611,6 @@
   <p:clrMapOvr>
     <a:masterClrMapping/>
   </p:clrMapOvr>
-  <p:timing>
-    <p:tnLst>
-      <p:par>
-        <p:cTn id="1" dur="indefinite" restart="never" nodeType="tmRoot"/>
-      </p:par>
-    </p:tnLst>
-  </p:timing>
 </p:sld>
 </file>
 
@@ -12080,10 +11762,9 @@
           <a:p>
             <a:pPr algn="r"/>
             <a:r>
-              <a:rPr lang="he-IL" dirty="0" smtClean="0"/>
+              <a:rPr lang="he-IL" dirty="0"/>
               <a:t>טווח גילאים?</a:t>
             </a:r>
-            <a:endParaRPr lang="he-IL" dirty="0"/>
           </a:p>
         </p:txBody>
       </p:sp>
@@ -12358,13 +12039,6 @@
   <p:clrMapOvr>
     <a:masterClrMapping/>
   </p:clrMapOvr>
-  <p:timing>
-    <p:tnLst>
-      <p:par>
-        <p:cTn id="1" dur="indefinite" restart="never" nodeType="tmRoot"/>
-      </p:par>
-    </p:tnLst>
-  </p:timing>
 </p:sld>
 </file>
 
@@ -12462,10 +12136,9 @@
           <a:p>
             <a:pPr algn="r"/>
             <a:r>
-              <a:rPr lang="he-IL" dirty="0" smtClean="0"/>
+              <a:rPr lang="he-IL" dirty="0"/>
               <a:t>למה קלסטרינג	 </a:t>
             </a:r>
-            <a:endParaRPr lang="he-IL" dirty="0"/>
           </a:p>
         </p:txBody>
       </p:sp>
@@ -12490,20 +12163,20 @@
           <a:lstStyle/>
           <a:p>
             <a:r>
-              <a:rPr lang="he-IL" dirty="0" smtClean="0"/>
-              <a:t>קלסטרינג נותן לנו את האפשרות ללמוד על הנתונים שאספנו מבלי לדעת שום דבר מראש על הנתונים.</a:t>
-            </a:r>
-          </a:p>
-          <a:p>
-            <a:r>
               <a:rPr lang="he-IL" dirty="0"/>
-              <a:t>נ</a:t>
-            </a:r>
-            <a:r>
-              <a:rPr lang="he-IL" dirty="0" smtClean="0"/>
-              <a:t>יתוח האשכולות מאפשר לנו למקד את המאמץ שלנו בקבוצה מסוימת ובכך להקטין את כמות הנתונים.</a:t>
+              <a:t>קלסטרינג נותן לנו את האפשרות ללמוד על הנתונים שאספנו מבלי לדעת שום דבר מראש </a:t>
+            </a:r>
+            <a:r>
+              <a:rPr lang="he-IL"/>
+              <a:t>על הנתונים, וללא קצה חוט בממדים גבוהים</a:t>
             </a:r>
             <a:endParaRPr lang="he-IL" dirty="0"/>
+          </a:p>
+          <a:p>
+            <a:r>
+              <a:rPr lang="he-IL" dirty="0"/>
+              <a:t>ניתוח האשכולות מאפשר לנו למקד את המאמץ שלנו בקבוצה מסוימת ובכך להקטין את כמות הנתונים.</a:t>
+            </a:r>
           </a:p>
         </p:txBody>
       </p:sp>
@@ -12517,13 +12190,6 @@
   <p:clrMapOvr>
     <a:masterClrMapping/>
   </p:clrMapOvr>
-  <p:timing>
-    <p:tnLst>
-      <p:par>
-        <p:cTn id="1" dur="indefinite" restart="never" nodeType="tmRoot"/>
-      </p:par>
-    </p:tnLst>
-  </p:timing>
 </p:sld>
 </file>
 

</xml_diff>